<commit_message>
Fixed a few typos in pp
</commit_message>
<xml_diff>
--- a/Hop or not to hop.pptx
+++ b/Hop or not to hop.pptx
@@ -146,7 +146,7 @@
           <p:cNvPr id="2" name="Titel 1">
             <a:extLst>
               <a:ext uri="{FF2B5EF4-FFF2-40B4-BE49-F238E27FC236}">
-                <a16:creationId xmlns:a16="http://schemas.microsoft.com/office/drawing/2014/main" xmlns="" id="{83DA5716-1613-4DF1-82FE-924825EE9F5C}"/>
+                <a16:creationId xmlns="" xmlns:a16="http://schemas.microsoft.com/office/drawing/2014/main" id="{83DA5716-1613-4DF1-82FE-924825EE9F5C}"/>
               </a:ext>
             </a:extLst>
           </p:cNvPr>
@@ -184,7 +184,7 @@
           <p:cNvPr id="3" name="Undertitel 2">
             <a:extLst>
               <a:ext uri="{FF2B5EF4-FFF2-40B4-BE49-F238E27FC236}">
-                <a16:creationId xmlns:a16="http://schemas.microsoft.com/office/drawing/2014/main" xmlns="" id="{C0F2D14D-259A-4BF5-8C03-6EFE30E153BB}"/>
+                <a16:creationId xmlns="" xmlns:a16="http://schemas.microsoft.com/office/drawing/2014/main" id="{C0F2D14D-259A-4BF5-8C03-6EFE30E153BB}"/>
               </a:ext>
             </a:extLst>
           </p:cNvPr>
@@ -255,7 +255,7 @@
           <p:cNvPr id="4" name="Pladsholder til dato 3">
             <a:extLst>
               <a:ext uri="{FF2B5EF4-FFF2-40B4-BE49-F238E27FC236}">
-                <a16:creationId xmlns:a16="http://schemas.microsoft.com/office/drawing/2014/main" xmlns="" id="{ECB50680-33AB-444A-A427-8E011FC22546}"/>
+                <a16:creationId xmlns="" xmlns:a16="http://schemas.microsoft.com/office/drawing/2014/main" id="{ECB50680-33AB-444A-A427-8E011FC22546}"/>
               </a:ext>
             </a:extLst>
           </p:cNvPr>
@@ -284,7 +284,7 @@
           <p:cNvPr id="5" name="Pladsholder til sidefod 4">
             <a:extLst>
               <a:ext uri="{FF2B5EF4-FFF2-40B4-BE49-F238E27FC236}">
-                <a16:creationId xmlns:a16="http://schemas.microsoft.com/office/drawing/2014/main" xmlns="" id="{C749EA99-CCAD-44D0-A050-E752A0E95EEA}"/>
+                <a16:creationId xmlns="" xmlns:a16="http://schemas.microsoft.com/office/drawing/2014/main" id="{C749EA99-CCAD-44D0-A050-E752A0E95EEA}"/>
               </a:ext>
             </a:extLst>
           </p:cNvPr>
@@ -309,7 +309,7 @@
           <p:cNvPr id="6" name="Pladsholder til slidenummer 5">
             <a:extLst>
               <a:ext uri="{FF2B5EF4-FFF2-40B4-BE49-F238E27FC236}">
-                <a16:creationId xmlns:a16="http://schemas.microsoft.com/office/drawing/2014/main" xmlns="" id="{267AC150-18CF-4939-8C57-6A16A707C52B}"/>
+                <a16:creationId xmlns="" xmlns:a16="http://schemas.microsoft.com/office/drawing/2014/main" id="{267AC150-18CF-4939-8C57-6A16A707C52B}"/>
               </a:ext>
             </a:extLst>
           </p:cNvPr>
@@ -368,7 +368,7 @@
           <p:cNvPr id="2" name="Titel 1">
             <a:extLst>
               <a:ext uri="{FF2B5EF4-FFF2-40B4-BE49-F238E27FC236}">
-                <a16:creationId xmlns:a16="http://schemas.microsoft.com/office/drawing/2014/main" xmlns="" id="{683DDF73-6641-4548-BFD6-FDC3DE6EA2BE}"/>
+                <a16:creationId xmlns="" xmlns:a16="http://schemas.microsoft.com/office/drawing/2014/main" id="{683DDF73-6641-4548-BFD6-FDC3DE6EA2BE}"/>
               </a:ext>
             </a:extLst>
           </p:cNvPr>
@@ -397,7 +397,7 @@
           <p:cNvPr id="3" name="Pladsholder til lodret titel 2">
             <a:extLst>
               <a:ext uri="{FF2B5EF4-FFF2-40B4-BE49-F238E27FC236}">
-                <a16:creationId xmlns:a16="http://schemas.microsoft.com/office/drawing/2014/main" xmlns="" id="{0F4F6C09-B0F4-4A0C-8C9E-6A7FA77A9455}"/>
+                <a16:creationId xmlns="" xmlns:a16="http://schemas.microsoft.com/office/drawing/2014/main" id="{0F4F6C09-B0F4-4A0C-8C9E-6A7FA77A9455}"/>
               </a:ext>
             </a:extLst>
           </p:cNvPr>
@@ -455,7 +455,7 @@
           <p:cNvPr id="4" name="Pladsholder til dato 3">
             <a:extLst>
               <a:ext uri="{FF2B5EF4-FFF2-40B4-BE49-F238E27FC236}">
-                <a16:creationId xmlns:a16="http://schemas.microsoft.com/office/drawing/2014/main" xmlns="" id="{0F6F7E18-171F-4A14-B01A-2035D36DFC90}"/>
+                <a16:creationId xmlns="" xmlns:a16="http://schemas.microsoft.com/office/drawing/2014/main" id="{0F6F7E18-171F-4A14-B01A-2035D36DFC90}"/>
               </a:ext>
             </a:extLst>
           </p:cNvPr>
@@ -484,7 +484,7 @@
           <p:cNvPr id="5" name="Pladsholder til sidefod 4">
             <a:extLst>
               <a:ext uri="{FF2B5EF4-FFF2-40B4-BE49-F238E27FC236}">
-                <a16:creationId xmlns:a16="http://schemas.microsoft.com/office/drawing/2014/main" xmlns="" id="{EF0CA616-4E61-4237-AD45-A41F966DDA9F}"/>
+                <a16:creationId xmlns="" xmlns:a16="http://schemas.microsoft.com/office/drawing/2014/main" id="{EF0CA616-4E61-4237-AD45-A41F966DDA9F}"/>
               </a:ext>
             </a:extLst>
           </p:cNvPr>
@@ -509,7 +509,7 @@
           <p:cNvPr id="6" name="Pladsholder til slidenummer 5">
             <a:extLst>
               <a:ext uri="{FF2B5EF4-FFF2-40B4-BE49-F238E27FC236}">
-                <a16:creationId xmlns:a16="http://schemas.microsoft.com/office/drawing/2014/main" xmlns="" id="{A247F0AA-5781-437A-B68E-AC739C4326FC}"/>
+                <a16:creationId xmlns="" xmlns:a16="http://schemas.microsoft.com/office/drawing/2014/main" id="{A247F0AA-5781-437A-B68E-AC739C4326FC}"/>
               </a:ext>
             </a:extLst>
           </p:cNvPr>
@@ -568,7 +568,7 @@
           <p:cNvPr id="2" name="Lodret titel 1">
             <a:extLst>
               <a:ext uri="{FF2B5EF4-FFF2-40B4-BE49-F238E27FC236}">
-                <a16:creationId xmlns:a16="http://schemas.microsoft.com/office/drawing/2014/main" xmlns="" id="{7F060D18-337C-429E-99A0-11555232CC3C}"/>
+                <a16:creationId xmlns="" xmlns:a16="http://schemas.microsoft.com/office/drawing/2014/main" id="{7F060D18-337C-429E-99A0-11555232CC3C}"/>
               </a:ext>
             </a:extLst>
           </p:cNvPr>
@@ -602,7 +602,7 @@
           <p:cNvPr id="3" name="Pladsholder til lodret titel 2">
             <a:extLst>
               <a:ext uri="{FF2B5EF4-FFF2-40B4-BE49-F238E27FC236}">
-                <a16:creationId xmlns:a16="http://schemas.microsoft.com/office/drawing/2014/main" xmlns="" id="{9585EFE8-B7B3-4DFC-A7F5-E83F1A0856F3}"/>
+                <a16:creationId xmlns="" xmlns:a16="http://schemas.microsoft.com/office/drawing/2014/main" id="{9585EFE8-B7B3-4DFC-A7F5-E83F1A0856F3}"/>
               </a:ext>
             </a:extLst>
           </p:cNvPr>
@@ -665,7 +665,7 @@
           <p:cNvPr id="4" name="Pladsholder til dato 3">
             <a:extLst>
               <a:ext uri="{FF2B5EF4-FFF2-40B4-BE49-F238E27FC236}">
-                <a16:creationId xmlns:a16="http://schemas.microsoft.com/office/drawing/2014/main" xmlns="" id="{E5079CE4-0246-4267-8F82-C16FE83BDBE0}"/>
+                <a16:creationId xmlns="" xmlns:a16="http://schemas.microsoft.com/office/drawing/2014/main" id="{E5079CE4-0246-4267-8F82-C16FE83BDBE0}"/>
               </a:ext>
             </a:extLst>
           </p:cNvPr>
@@ -694,7 +694,7 @@
           <p:cNvPr id="5" name="Pladsholder til sidefod 4">
             <a:extLst>
               <a:ext uri="{FF2B5EF4-FFF2-40B4-BE49-F238E27FC236}">
-                <a16:creationId xmlns:a16="http://schemas.microsoft.com/office/drawing/2014/main" xmlns="" id="{92074728-C091-4E1F-977E-A3AE3FDB2794}"/>
+                <a16:creationId xmlns="" xmlns:a16="http://schemas.microsoft.com/office/drawing/2014/main" id="{92074728-C091-4E1F-977E-A3AE3FDB2794}"/>
               </a:ext>
             </a:extLst>
           </p:cNvPr>
@@ -719,7 +719,7 @@
           <p:cNvPr id="6" name="Pladsholder til slidenummer 5">
             <a:extLst>
               <a:ext uri="{FF2B5EF4-FFF2-40B4-BE49-F238E27FC236}">
-                <a16:creationId xmlns:a16="http://schemas.microsoft.com/office/drawing/2014/main" xmlns="" id="{D388D3D5-5E40-4CBD-9E6C-65D36E5A178E}"/>
+                <a16:creationId xmlns="" xmlns:a16="http://schemas.microsoft.com/office/drawing/2014/main" id="{D388D3D5-5E40-4CBD-9E6C-65D36E5A178E}"/>
               </a:ext>
             </a:extLst>
           </p:cNvPr>
@@ -778,7 +778,7 @@
           <p:cNvPr id="2" name="Titel 1">
             <a:extLst>
               <a:ext uri="{FF2B5EF4-FFF2-40B4-BE49-F238E27FC236}">
-                <a16:creationId xmlns:a16="http://schemas.microsoft.com/office/drawing/2014/main" xmlns="" id="{76A9E908-CED0-4A5D-89A3-FC77EC5BB57D}"/>
+                <a16:creationId xmlns="" xmlns:a16="http://schemas.microsoft.com/office/drawing/2014/main" id="{76A9E908-CED0-4A5D-89A3-FC77EC5BB57D}"/>
               </a:ext>
             </a:extLst>
           </p:cNvPr>
@@ -807,7 +807,7 @@
           <p:cNvPr id="3" name="Pladsholder til indhold 2">
             <a:extLst>
               <a:ext uri="{FF2B5EF4-FFF2-40B4-BE49-F238E27FC236}">
-                <a16:creationId xmlns:a16="http://schemas.microsoft.com/office/drawing/2014/main" xmlns="" id="{E522CCA4-9C43-4B2E-8E86-DDA49D1C25CA}"/>
+                <a16:creationId xmlns="" xmlns:a16="http://schemas.microsoft.com/office/drawing/2014/main" id="{E522CCA4-9C43-4B2E-8E86-DDA49D1C25CA}"/>
               </a:ext>
             </a:extLst>
           </p:cNvPr>
@@ -865,7 +865,7 @@
           <p:cNvPr id="4" name="Pladsholder til dato 3">
             <a:extLst>
               <a:ext uri="{FF2B5EF4-FFF2-40B4-BE49-F238E27FC236}">
-                <a16:creationId xmlns:a16="http://schemas.microsoft.com/office/drawing/2014/main" xmlns="" id="{9C1BB299-D627-429D-AEFA-34FB7F874153}"/>
+                <a16:creationId xmlns="" xmlns:a16="http://schemas.microsoft.com/office/drawing/2014/main" id="{9C1BB299-D627-429D-AEFA-34FB7F874153}"/>
               </a:ext>
             </a:extLst>
           </p:cNvPr>
@@ -894,7 +894,7 @@
           <p:cNvPr id="5" name="Pladsholder til sidefod 4">
             <a:extLst>
               <a:ext uri="{FF2B5EF4-FFF2-40B4-BE49-F238E27FC236}">
-                <a16:creationId xmlns:a16="http://schemas.microsoft.com/office/drawing/2014/main" xmlns="" id="{E5CDB3C2-6831-496C-93CE-182DB2C3E4C4}"/>
+                <a16:creationId xmlns="" xmlns:a16="http://schemas.microsoft.com/office/drawing/2014/main" id="{E5CDB3C2-6831-496C-93CE-182DB2C3E4C4}"/>
               </a:ext>
             </a:extLst>
           </p:cNvPr>
@@ -919,7 +919,7 @@
           <p:cNvPr id="6" name="Pladsholder til slidenummer 5">
             <a:extLst>
               <a:ext uri="{FF2B5EF4-FFF2-40B4-BE49-F238E27FC236}">
-                <a16:creationId xmlns:a16="http://schemas.microsoft.com/office/drawing/2014/main" xmlns="" id="{8D5F99A7-775A-4709-9880-DF457C43F059}"/>
+                <a16:creationId xmlns="" xmlns:a16="http://schemas.microsoft.com/office/drawing/2014/main" id="{8D5F99A7-775A-4709-9880-DF457C43F059}"/>
               </a:ext>
             </a:extLst>
           </p:cNvPr>
@@ -978,7 +978,7 @@
           <p:cNvPr id="2" name="Titel 1">
             <a:extLst>
               <a:ext uri="{FF2B5EF4-FFF2-40B4-BE49-F238E27FC236}">
-                <a16:creationId xmlns:a16="http://schemas.microsoft.com/office/drawing/2014/main" xmlns="" id="{893B5DD0-0AB6-44D1-83EA-94421DA8D720}"/>
+                <a16:creationId xmlns="" xmlns:a16="http://schemas.microsoft.com/office/drawing/2014/main" id="{893B5DD0-0AB6-44D1-83EA-94421DA8D720}"/>
               </a:ext>
             </a:extLst>
           </p:cNvPr>
@@ -1016,7 +1016,7 @@
           <p:cNvPr id="3" name="Pladsholder til tekst 2">
             <a:extLst>
               <a:ext uri="{FF2B5EF4-FFF2-40B4-BE49-F238E27FC236}">
-                <a16:creationId xmlns:a16="http://schemas.microsoft.com/office/drawing/2014/main" xmlns="" id="{08218ED0-7648-4B69-96EF-93ADF6D777D9}"/>
+                <a16:creationId xmlns="" xmlns:a16="http://schemas.microsoft.com/office/drawing/2014/main" id="{08218ED0-7648-4B69-96EF-93ADF6D777D9}"/>
               </a:ext>
             </a:extLst>
           </p:cNvPr>
@@ -1141,7 +1141,7 @@
           <p:cNvPr id="4" name="Pladsholder til dato 3">
             <a:extLst>
               <a:ext uri="{FF2B5EF4-FFF2-40B4-BE49-F238E27FC236}">
-                <a16:creationId xmlns:a16="http://schemas.microsoft.com/office/drawing/2014/main" xmlns="" id="{94A0ED5B-5158-4BF8-BB94-89EA87A634B9}"/>
+                <a16:creationId xmlns="" xmlns:a16="http://schemas.microsoft.com/office/drawing/2014/main" id="{94A0ED5B-5158-4BF8-BB94-89EA87A634B9}"/>
               </a:ext>
             </a:extLst>
           </p:cNvPr>
@@ -1170,7 +1170,7 @@
           <p:cNvPr id="5" name="Pladsholder til sidefod 4">
             <a:extLst>
               <a:ext uri="{FF2B5EF4-FFF2-40B4-BE49-F238E27FC236}">
-                <a16:creationId xmlns:a16="http://schemas.microsoft.com/office/drawing/2014/main" xmlns="" id="{7C1F80DE-CB85-469F-95E7-1E6A7634F6BA}"/>
+                <a16:creationId xmlns="" xmlns:a16="http://schemas.microsoft.com/office/drawing/2014/main" id="{7C1F80DE-CB85-469F-95E7-1E6A7634F6BA}"/>
               </a:ext>
             </a:extLst>
           </p:cNvPr>
@@ -1195,7 +1195,7 @@
           <p:cNvPr id="6" name="Pladsholder til slidenummer 5">
             <a:extLst>
               <a:ext uri="{FF2B5EF4-FFF2-40B4-BE49-F238E27FC236}">
-                <a16:creationId xmlns:a16="http://schemas.microsoft.com/office/drawing/2014/main" xmlns="" id="{5A441220-9A4C-4B30-B4E0-9D93022F9BF7}"/>
+                <a16:creationId xmlns="" xmlns:a16="http://schemas.microsoft.com/office/drawing/2014/main" id="{5A441220-9A4C-4B30-B4E0-9D93022F9BF7}"/>
               </a:ext>
             </a:extLst>
           </p:cNvPr>
@@ -1254,7 +1254,7 @@
           <p:cNvPr id="2" name="Titel 1">
             <a:extLst>
               <a:ext uri="{FF2B5EF4-FFF2-40B4-BE49-F238E27FC236}">
-                <a16:creationId xmlns:a16="http://schemas.microsoft.com/office/drawing/2014/main" xmlns="" id="{BBD551F1-B499-4CAD-A58A-74E5F04AA319}"/>
+                <a16:creationId xmlns="" xmlns:a16="http://schemas.microsoft.com/office/drawing/2014/main" id="{BBD551F1-B499-4CAD-A58A-74E5F04AA319}"/>
               </a:ext>
             </a:extLst>
           </p:cNvPr>
@@ -1283,7 +1283,7 @@
           <p:cNvPr id="3" name="Pladsholder til indhold 2">
             <a:extLst>
               <a:ext uri="{FF2B5EF4-FFF2-40B4-BE49-F238E27FC236}">
-                <a16:creationId xmlns:a16="http://schemas.microsoft.com/office/drawing/2014/main" xmlns="" id="{D1AF6B27-9A6E-4F44-A9F9-01270AA0B379}"/>
+                <a16:creationId xmlns="" xmlns:a16="http://schemas.microsoft.com/office/drawing/2014/main" id="{D1AF6B27-9A6E-4F44-A9F9-01270AA0B379}"/>
               </a:ext>
             </a:extLst>
           </p:cNvPr>
@@ -1346,7 +1346,7 @@
           <p:cNvPr id="4" name="Pladsholder til indhold 3">
             <a:extLst>
               <a:ext uri="{FF2B5EF4-FFF2-40B4-BE49-F238E27FC236}">
-                <a16:creationId xmlns:a16="http://schemas.microsoft.com/office/drawing/2014/main" xmlns="" id="{386BCFCD-1EDF-4C6C-9E59-D0AE2B372168}"/>
+                <a16:creationId xmlns="" xmlns:a16="http://schemas.microsoft.com/office/drawing/2014/main" id="{386BCFCD-1EDF-4C6C-9E59-D0AE2B372168}"/>
               </a:ext>
             </a:extLst>
           </p:cNvPr>
@@ -1409,7 +1409,7 @@
           <p:cNvPr id="5" name="Pladsholder til dato 4">
             <a:extLst>
               <a:ext uri="{FF2B5EF4-FFF2-40B4-BE49-F238E27FC236}">
-                <a16:creationId xmlns:a16="http://schemas.microsoft.com/office/drawing/2014/main" xmlns="" id="{6FEB7C04-DFF4-4755-87F0-3A5F281C79AA}"/>
+                <a16:creationId xmlns="" xmlns:a16="http://schemas.microsoft.com/office/drawing/2014/main" id="{6FEB7C04-DFF4-4755-87F0-3A5F281C79AA}"/>
               </a:ext>
             </a:extLst>
           </p:cNvPr>
@@ -1438,7 +1438,7 @@
           <p:cNvPr id="6" name="Pladsholder til sidefod 5">
             <a:extLst>
               <a:ext uri="{FF2B5EF4-FFF2-40B4-BE49-F238E27FC236}">
-                <a16:creationId xmlns:a16="http://schemas.microsoft.com/office/drawing/2014/main" xmlns="" id="{F13B01AF-4211-49EC-90E1-DB41BABBAB4C}"/>
+                <a16:creationId xmlns="" xmlns:a16="http://schemas.microsoft.com/office/drawing/2014/main" id="{F13B01AF-4211-49EC-90E1-DB41BABBAB4C}"/>
               </a:ext>
             </a:extLst>
           </p:cNvPr>
@@ -1463,7 +1463,7 @@
           <p:cNvPr id="7" name="Pladsholder til slidenummer 6">
             <a:extLst>
               <a:ext uri="{FF2B5EF4-FFF2-40B4-BE49-F238E27FC236}">
-                <a16:creationId xmlns:a16="http://schemas.microsoft.com/office/drawing/2014/main" xmlns="" id="{D234B871-E779-4815-ACD9-43E19D4E8A82}"/>
+                <a16:creationId xmlns="" xmlns:a16="http://schemas.microsoft.com/office/drawing/2014/main" id="{D234B871-E779-4815-ACD9-43E19D4E8A82}"/>
               </a:ext>
             </a:extLst>
           </p:cNvPr>
@@ -1522,7 +1522,7 @@
           <p:cNvPr id="2" name="Titel 1">
             <a:extLst>
               <a:ext uri="{FF2B5EF4-FFF2-40B4-BE49-F238E27FC236}">
-                <a16:creationId xmlns:a16="http://schemas.microsoft.com/office/drawing/2014/main" xmlns="" id="{3987BDDA-200F-4C30-B468-D02C418224EE}"/>
+                <a16:creationId xmlns="" xmlns:a16="http://schemas.microsoft.com/office/drawing/2014/main" id="{3987BDDA-200F-4C30-B468-D02C418224EE}"/>
               </a:ext>
             </a:extLst>
           </p:cNvPr>
@@ -1556,7 +1556,7 @@
           <p:cNvPr id="3" name="Pladsholder til tekst 2">
             <a:extLst>
               <a:ext uri="{FF2B5EF4-FFF2-40B4-BE49-F238E27FC236}">
-                <a16:creationId xmlns:a16="http://schemas.microsoft.com/office/drawing/2014/main" xmlns="" id="{5EBCB7DA-FC76-488C-981F-70E3E7CD83F0}"/>
+                <a16:creationId xmlns="" xmlns:a16="http://schemas.microsoft.com/office/drawing/2014/main" id="{5EBCB7DA-FC76-488C-981F-70E3E7CD83F0}"/>
               </a:ext>
             </a:extLst>
           </p:cNvPr>
@@ -1627,7 +1627,7 @@
           <p:cNvPr id="4" name="Pladsholder til indhold 3">
             <a:extLst>
               <a:ext uri="{FF2B5EF4-FFF2-40B4-BE49-F238E27FC236}">
-                <a16:creationId xmlns:a16="http://schemas.microsoft.com/office/drawing/2014/main" xmlns="" id="{0CACCCD5-BE4C-4B63-88FF-4FB395629831}"/>
+                <a16:creationId xmlns="" xmlns:a16="http://schemas.microsoft.com/office/drawing/2014/main" id="{0CACCCD5-BE4C-4B63-88FF-4FB395629831}"/>
               </a:ext>
             </a:extLst>
           </p:cNvPr>
@@ -1690,7 +1690,7 @@
           <p:cNvPr id="5" name="Pladsholder til tekst 4">
             <a:extLst>
               <a:ext uri="{FF2B5EF4-FFF2-40B4-BE49-F238E27FC236}">
-                <a16:creationId xmlns:a16="http://schemas.microsoft.com/office/drawing/2014/main" xmlns="" id="{E85C42D7-E544-436E-87C6-82FF67E17DD3}"/>
+                <a16:creationId xmlns="" xmlns:a16="http://schemas.microsoft.com/office/drawing/2014/main" id="{E85C42D7-E544-436E-87C6-82FF67E17DD3}"/>
               </a:ext>
             </a:extLst>
           </p:cNvPr>
@@ -1761,7 +1761,7 @@
           <p:cNvPr id="6" name="Pladsholder til indhold 5">
             <a:extLst>
               <a:ext uri="{FF2B5EF4-FFF2-40B4-BE49-F238E27FC236}">
-                <a16:creationId xmlns:a16="http://schemas.microsoft.com/office/drawing/2014/main" xmlns="" id="{C19A2211-DB2C-4553-9ABD-2779DBC61C0A}"/>
+                <a16:creationId xmlns="" xmlns:a16="http://schemas.microsoft.com/office/drawing/2014/main" id="{C19A2211-DB2C-4553-9ABD-2779DBC61C0A}"/>
               </a:ext>
             </a:extLst>
           </p:cNvPr>
@@ -1824,7 +1824,7 @@
           <p:cNvPr id="7" name="Pladsholder til dato 6">
             <a:extLst>
               <a:ext uri="{FF2B5EF4-FFF2-40B4-BE49-F238E27FC236}">
-                <a16:creationId xmlns:a16="http://schemas.microsoft.com/office/drawing/2014/main" xmlns="" id="{30149C57-74E2-4C10-8B71-4C7363E9CBB3}"/>
+                <a16:creationId xmlns="" xmlns:a16="http://schemas.microsoft.com/office/drawing/2014/main" id="{30149C57-74E2-4C10-8B71-4C7363E9CBB3}"/>
               </a:ext>
             </a:extLst>
           </p:cNvPr>
@@ -1853,7 +1853,7 @@
           <p:cNvPr id="8" name="Pladsholder til sidefod 7">
             <a:extLst>
               <a:ext uri="{FF2B5EF4-FFF2-40B4-BE49-F238E27FC236}">
-                <a16:creationId xmlns:a16="http://schemas.microsoft.com/office/drawing/2014/main" xmlns="" id="{7F8BFB27-415E-48B4-A379-D3C496291EA4}"/>
+                <a16:creationId xmlns="" xmlns:a16="http://schemas.microsoft.com/office/drawing/2014/main" id="{7F8BFB27-415E-48B4-A379-D3C496291EA4}"/>
               </a:ext>
             </a:extLst>
           </p:cNvPr>
@@ -1878,7 +1878,7 @@
           <p:cNvPr id="9" name="Pladsholder til slidenummer 8">
             <a:extLst>
               <a:ext uri="{FF2B5EF4-FFF2-40B4-BE49-F238E27FC236}">
-                <a16:creationId xmlns:a16="http://schemas.microsoft.com/office/drawing/2014/main" xmlns="" id="{DA603132-ABCA-4F42-9C74-1FE11051A05B}"/>
+                <a16:creationId xmlns="" xmlns:a16="http://schemas.microsoft.com/office/drawing/2014/main" id="{DA603132-ABCA-4F42-9C74-1FE11051A05B}"/>
               </a:ext>
             </a:extLst>
           </p:cNvPr>
@@ -1937,7 +1937,7 @@
           <p:cNvPr id="2" name="Titel 1">
             <a:extLst>
               <a:ext uri="{FF2B5EF4-FFF2-40B4-BE49-F238E27FC236}">
-                <a16:creationId xmlns:a16="http://schemas.microsoft.com/office/drawing/2014/main" xmlns="" id="{F761509D-1E9F-4C3F-BB18-5A373F4CFD71}"/>
+                <a16:creationId xmlns="" xmlns:a16="http://schemas.microsoft.com/office/drawing/2014/main" id="{F761509D-1E9F-4C3F-BB18-5A373F4CFD71}"/>
               </a:ext>
             </a:extLst>
           </p:cNvPr>
@@ -1966,7 +1966,7 @@
           <p:cNvPr id="3" name="Pladsholder til dato 2">
             <a:extLst>
               <a:ext uri="{FF2B5EF4-FFF2-40B4-BE49-F238E27FC236}">
-                <a16:creationId xmlns:a16="http://schemas.microsoft.com/office/drawing/2014/main" xmlns="" id="{15EC24EA-4545-4D60-ACB8-A228500C4BBB}"/>
+                <a16:creationId xmlns="" xmlns:a16="http://schemas.microsoft.com/office/drawing/2014/main" id="{15EC24EA-4545-4D60-ACB8-A228500C4BBB}"/>
               </a:ext>
             </a:extLst>
           </p:cNvPr>
@@ -1995,7 +1995,7 @@
           <p:cNvPr id="4" name="Pladsholder til sidefod 3">
             <a:extLst>
               <a:ext uri="{FF2B5EF4-FFF2-40B4-BE49-F238E27FC236}">
-                <a16:creationId xmlns:a16="http://schemas.microsoft.com/office/drawing/2014/main" xmlns="" id="{88C3BB90-B008-4C14-B7CA-3D85C8AD5865}"/>
+                <a16:creationId xmlns="" xmlns:a16="http://schemas.microsoft.com/office/drawing/2014/main" id="{88C3BB90-B008-4C14-B7CA-3D85C8AD5865}"/>
               </a:ext>
             </a:extLst>
           </p:cNvPr>
@@ -2020,7 +2020,7 @@
           <p:cNvPr id="5" name="Pladsholder til slidenummer 4">
             <a:extLst>
               <a:ext uri="{FF2B5EF4-FFF2-40B4-BE49-F238E27FC236}">
-                <a16:creationId xmlns:a16="http://schemas.microsoft.com/office/drawing/2014/main" xmlns="" id="{42677285-BDB0-40D2-B7AB-D3A84B7B9D4E}"/>
+                <a16:creationId xmlns="" xmlns:a16="http://schemas.microsoft.com/office/drawing/2014/main" id="{42677285-BDB0-40D2-B7AB-D3A84B7B9D4E}"/>
               </a:ext>
             </a:extLst>
           </p:cNvPr>
@@ -2079,7 +2079,7 @@
           <p:cNvPr id="2" name="Pladsholder til dato 1">
             <a:extLst>
               <a:ext uri="{FF2B5EF4-FFF2-40B4-BE49-F238E27FC236}">
-                <a16:creationId xmlns:a16="http://schemas.microsoft.com/office/drawing/2014/main" xmlns="" id="{ED250B3F-8C08-4754-9C58-567607464B25}"/>
+                <a16:creationId xmlns="" xmlns:a16="http://schemas.microsoft.com/office/drawing/2014/main" id="{ED250B3F-8C08-4754-9C58-567607464B25}"/>
               </a:ext>
             </a:extLst>
           </p:cNvPr>
@@ -2108,7 +2108,7 @@
           <p:cNvPr id="3" name="Pladsholder til sidefod 2">
             <a:extLst>
               <a:ext uri="{FF2B5EF4-FFF2-40B4-BE49-F238E27FC236}">
-                <a16:creationId xmlns:a16="http://schemas.microsoft.com/office/drawing/2014/main" xmlns="" id="{50C50087-08C4-416C-8DF8-573E3D5D4C78}"/>
+                <a16:creationId xmlns="" xmlns:a16="http://schemas.microsoft.com/office/drawing/2014/main" id="{50C50087-08C4-416C-8DF8-573E3D5D4C78}"/>
               </a:ext>
             </a:extLst>
           </p:cNvPr>
@@ -2133,7 +2133,7 @@
           <p:cNvPr id="4" name="Pladsholder til slidenummer 3">
             <a:extLst>
               <a:ext uri="{FF2B5EF4-FFF2-40B4-BE49-F238E27FC236}">
-                <a16:creationId xmlns:a16="http://schemas.microsoft.com/office/drawing/2014/main" xmlns="" id="{3C47C40E-E236-4E81-955C-643804E28ED9}"/>
+                <a16:creationId xmlns="" xmlns:a16="http://schemas.microsoft.com/office/drawing/2014/main" id="{3C47C40E-E236-4E81-955C-643804E28ED9}"/>
               </a:ext>
             </a:extLst>
           </p:cNvPr>
@@ -2192,7 +2192,7 @@
           <p:cNvPr id="2" name="Titel 1">
             <a:extLst>
               <a:ext uri="{FF2B5EF4-FFF2-40B4-BE49-F238E27FC236}">
-                <a16:creationId xmlns:a16="http://schemas.microsoft.com/office/drawing/2014/main" xmlns="" id="{B8CAB6BE-1F33-48BC-ACC3-F8D377CFE7B5}"/>
+                <a16:creationId xmlns="" xmlns:a16="http://schemas.microsoft.com/office/drawing/2014/main" id="{B8CAB6BE-1F33-48BC-ACC3-F8D377CFE7B5}"/>
               </a:ext>
             </a:extLst>
           </p:cNvPr>
@@ -2230,7 +2230,7 @@
           <p:cNvPr id="3" name="Pladsholder til indhold 2">
             <a:extLst>
               <a:ext uri="{FF2B5EF4-FFF2-40B4-BE49-F238E27FC236}">
-                <a16:creationId xmlns:a16="http://schemas.microsoft.com/office/drawing/2014/main" xmlns="" id="{B22A5D56-EEB8-4540-B224-3C8BA54F9A8A}"/>
+                <a16:creationId xmlns="" xmlns:a16="http://schemas.microsoft.com/office/drawing/2014/main" id="{B22A5D56-EEB8-4540-B224-3C8BA54F9A8A}"/>
               </a:ext>
             </a:extLst>
           </p:cNvPr>
@@ -2321,7 +2321,7 @@
           <p:cNvPr id="4" name="Pladsholder til tekst 3">
             <a:extLst>
               <a:ext uri="{FF2B5EF4-FFF2-40B4-BE49-F238E27FC236}">
-                <a16:creationId xmlns:a16="http://schemas.microsoft.com/office/drawing/2014/main" xmlns="" id="{88AE391E-68DC-455A-A64E-ACF30903B30E}"/>
+                <a16:creationId xmlns="" xmlns:a16="http://schemas.microsoft.com/office/drawing/2014/main" id="{88AE391E-68DC-455A-A64E-ACF30903B30E}"/>
               </a:ext>
             </a:extLst>
           </p:cNvPr>
@@ -2392,7 +2392,7 @@
           <p:cNvPr id="5" name="Pladsholder til dato 4">
             <a:extLst>
               <a:ext uri="{FF2B5EF4-FFF2-40B4-BE49-F238E27FC236}">
-                <a16:creationId xmlns:a16="http://schemas.microsoft.com/office/drawing/2014/main" xmlns="" id="{A83B669A-A1C0-4CD2-A288-0DC3DBBA5A95}"/>
+                <a16:creationId xmlns="" xmlns:a16="http://schemas.microsoft.com/office/drawing/2014/main" id="{A83B669A-A1C0-4CD2-A288-0DC3DBBA5A95}"/>
               </a:ext>
             </a:extLst>
           </p:cNvPr>
@@ -2421,7 +2421,7 @@
           <p:cNvPr id="6" name="Pladsholder til sidefod 5">
             <a:extLst>
               <a:ext uri="{FF2B5EF4-FFF2-40B4-BE49-F238E27FC236}">
-                <a16:creationId xmlns:a16="http://schemas.microsoft.com/office/drawing/2014/main" xmlns="" id="{CA72206F-5A01-4A27-A41F-494574FCA1EE}"/>
+                <a16:creationId xmlns="" xmlns:a16="http://schemas.microsoft.com/office/drawing/2014/main" id="{CA72206F-5A01-4A27-A41F-494574FCA1EE}"/>
               </a:ext>
             </a:extLst>
           </p:cNvPr>
@@ -2446,7 +2446,7 @@
           <p:cNvPr id="7" name="Pladsholder til slidenummer 6">
             <a:extLst>
               <a:ext uri="{FF2B5EF4-FFF2-40B4-BE49-F238E27FC236}">
-                <a16:creationId xmlns:a16="http://schemas.microsoft.com/office/drawing/2014/main" xmlns="" id="{711701F3-479D-4B39-BABF-7F564A46B881}"/>
+                <a16:creationId xmlns="" xmlns:a16="http://schemas.microsoft.com/office/drawing/2014/main" id="{711701F3-479D-4B39-BABF-7F564A46B881}"/>
               </a:ext>
             </a:extLst>
           </p:cNvPr>
@@ -2505,7 +2505,7 @@
           <p:cNvPr id="2" name="Titel 1">
             <a:extLst>
               <a:ext uri="{FF2B5EF4-FFF2-40B4-BE49-F238E27FC236}">
-                <a16:creationId xmlns:a16="http://schemas.microsoft.com/office/drawing/2014/main" xmlns="" id="{8F75623F-0E14-4329-A74C-9CF88B1203F4}"/>
+                <a16:creationId xmlns="" xmlns:a16="http://schemas.microsoft.com/office/drawing/2014/main" id="{8F75623F-0E14-4329-A74C-9CF88B1203F4}"/>
               </a:ext>
             </a:extLst>
           </p:cNvPr>
@@ -2543,7 +2543,7 @@
           <p:cNvPr id="3" name="Pladsholder til billede 2">
             <a:extLst>
               <a:ext uri="{FF2B5EF4-FFF2-40B4-BE49-F238E27FC236}">
-                <a16:creationId xmlns:a16="http://schemas.microsoft.com/office/drawing/2014/main" xmlns="" id="{7C008369-B664-4B99-A10B-18D730F8BC40}"/>
+                <a16:creationId xmlns="" xmlns:a16="http://schemas.microsoft.com/office/drawing/2014/main" id="{7C008369-B664-4B99-A10B-18D730F8BC40}"/>
               </a:ext>
             </a:extLst>
           </p:cNvPr>
@@ -2610,7 +2610,7 @@
           <p:cNvPr id="4" name="Pladsholder til tekst 3">
             <a:extLst>
               <a:ext uri="{FF2B5EF4-FFF2-40B4-BE49-F238E27FC236}">
-                <a16:creationId xmlns:a16="http://schemas.microsoft.com/office/drawing/2014/main" xmlns="" id="{1E8213EF-C11F-446C-B3D0-022C7FC4AF7E}"/>
+                <a16:creationId xmlns="" xmlns:a16="http://schemas.microsoft.com/office/drawing/2014/main" id="{1E8213EF-C11F-446C-B3D0-022C7FC4AF7E}"/>
               </a:ext>
             </a:extLst>
           </p:cNvPr>
@@ -2681,7 +2681,7 @@
           <p:cNvPr id="5" name="Pladsholder til dato 4">
             <a:extLst>
               <a:ext uri="{FF2B5EF4-FFF2-40B4-BE49-F238E27FC236}">
-                <a16:creationId xmlns:a16="http://schemas.microsoft.com/office/drawing/2014/main" xmlns="" id="{D7C658B9-ADF9-4487-B757-1C8C8D178535}"/>
+                <a16:creationId xmlns="" xmlns:a16="http://schemas.microsoft.com/office/drawing/2014/main" id="{D7C658B9-ADF9-4487-B757-1C8C8D178535}"/>
               </a:ext>
             </a:extLst>
           </p:cNvPr>
@@ -2710,7 +2710,7 @@
           <p:cNvPr id="6" name="Pladsholder til sidefod 5">
             <a:extLst>
               <a:ext uri="{FF2B5EF4-FFF2-40B4-BE49-F238E27FC236}">
-                <a16:creationId xmlns:a16="http://schemas.microsoft.com/office/drawing/2014/main" xmlns="" id="{96E96B75-5E26-4D70-8F89-390D3955ACE2}"/>
+                <a16:creationId xmlns="" xmlns:a16="http://schemas.microsoft.com/office/drawing/2014/main" id="{96E96B75-5E26-4D70-8F89-390D3955ACE2}"/>
               </a:ext>
             </a:extLst>
           </p:cNvPr>
@@ -2735,7 +2735,7 @@
           <p:cNvPr id="7" name="Pladsholder til slidenummer 6">
             <a:extLst>
               <a:ext uri="{FF2B5EF4-FFF2-40B4-BE49-F238E27FC236}">
-                <a16:creationId xmlns:a16="http://schemas.microsoft.com/office/drawing/2014/main" xmlns="" id="{C60E841F-CB94-4AFD-B597-08D945070020}"/>
+                <a16:creationId xmlns="" xmlns:a16="http://schemas.microsoft.com/office/drawing/2014/main" id="{C60E841F-CB94-4AFD-B597-08D945070020}"/>
               </a:ext>
             </a:extLst>
           </p:cNvPr>
@@ -2799,7 +2799,7 @@
           <p:cNvPr id="2" name="Pladsholder til titel 1">
             <a:extLst>
               <a:ext uri="{FF2B5EF4-FFF2-40B4-BE49-F238E27FC236}">
-                <a16:creationId xmlns:a16="http://schemas.microsoft.com/office/drawing/2014/main" xmlns="" id="{3FA4AED4-20DF-475F-A5B9-6361C0877BF8}"/>
+                <a16:creationId xmlns="" xmlns:a16="http://schemas.microsoft.com/office/drawing/2014/main" id="{3FA4AED4-20DF-475F-A5B9-6361C0877BF8}"/>
               </a:ext>
             </a:extLst>
           </p:cNvPr>
@@ -2838,7 +2838,7 @@
           <p:cNvPr id="3" name="Pladsholder til tekst 2">
             <a:extLst>
               <a:ext uri="{FF2B5EF4-FFF2-40B4-BE49-F238E27FC236}">
-                <a16:creationId xmlns:a16="http://schemas.microsoft.com/office/drawing/2014/main" xmlns="" id="{C7050EAC-6B71-4482-B365-976D574AE415}"/>
+                <a16:creationId xmlns="" xmlns:a16="http://schemas.microsoft.com/office/drawing/2014/main" id="{C7050EAC-6B71-4482-B365-976D574AE415}"/>
               </a:ext>
             </a:extLst>
           </p:cNvPr>
@@ -2906,7 +2906,7 @@
           <p:cNvPr id="4" name="Pladsholder til dato 3">
             <a:extLst>
               <a:ext uri="{FF2B5EF4-FFF2-40B4-BE49-F238E27FC236}">
-                <a16:creationId xmlns:a16="http://schemas.microsoft.com/office/drawing/2014/main" xmlns="" id="{C2DA935C-C0C8-4B49-B1EA-FF82C5E4A83E}"/>
+                <a16:creationId xmlns="" xmlns:a16="http://schemas.microsoft.com/office/drawing/2014/main" id="{C2DA935C-C0C8-4B49-B1EA-FF82C5E4A83E}"/>
               </a:ext>
             </a:extLst>
           </p:cNvPr>
@@ -2953,7 +2953,7 @@
           <p:cNvPr id="5" name="Pladsholder til sidefod 4">
             <a:extLst>
               <a:ext uri="{FF2B5EF4-FFF2-40B4-BE49-F238E27FC236}">
-                <a16:creationId xmlns:a16="http://schemas.microsoft.com/office/drawing/2014/main" xmlns="" id="{6C1F3EE7-5FB0-4025-A528-D7434E59F65E}"/>
+                <a16:creationId xmlns="" xmlns:a16="http://schemas.microsoft.com/office/drawing/2014/main" id="{6C1F3EE7-5FB0-4025-A528-D7434E59F65E}"/>
               </a:ext>
             </a:extLst>
           </p:cNvPr>
@@ -2996,7 +2996,7 @@
           <p:cNvPr id="6" name="Pladsholder til slidenummer 5">
             <a:extLst>
               <a:ext uri="{FF2B5EF4-FFF2-40B4-BE49-F238E27FC236}">
-                <a16:creationId xmlns:a16="http://schemas.microsoft.com/office/drawing/2014/main" xmlns="" id="{8F938C54-19BB-4DCC-A029-4695BBD15E4E}"/>
+                <a16:creationId xmlns="" xmlns:a16="http://schemas.microsoft.com/office/drawing/2014/main" id="{8F938C54-19BB-4DCC-A029-4695BBD15E4E}"/>
               </a:ext>
             </a:extLst>
           </p:cNvPr>
@@ -3372,7 +3372,7 @@
           <p:cNvPr id="10" name="Rectangle 9">
             <a:extLst>
               <a:ext uri="{FF2B5EF4-FFF2-40B4-BE49-F238E27FC236}">
-                <a16:creationId xmlns:a16="http://schemas.microsoft.com/office/drawing/2014/main" xmlns="" id="{6753252F-4873-4F63-801D-CC719279A7D5}"/>
+                <a16:creationId xmlns="" xmlns:a16="http://schemas.microsoft.com/office/drawing/2014/main" id="{6753252F-4873-4F63-801D-CC719279A7D5}"/>
               </a:ext>
             </a:extLst>
           </p:cNvPr>
@@ -3382,7 +3382,7 @@
           <p:nvPr>
             <p:extLst>
               <p:ext uri="{386F3935-93C4-4BCD-93E2-E3B085C9AB24}">
-                <p16:designElem xmlns:p16="http://schemas.microsoft.com/office/powerpoint/2015/main" xmlns="" val="1"/>
+                <p16:designElem xmlns="" xmlns:p16="http://schemas.microsoft.com/office/powerpoint/2015/main" val="1"/>
               </p:ext>
             </p:extLst>
           </p:nvPr>
@@ -3432,7 +3432,7 @@
           <p:cNvPr id="12" name="Rectangle 11">
             <a:extLst>
               <a:ext uri="{FF2B5EF4-FFF2-40B4-BE49-F238E27FC236}">
-                <a16:creationId xmlns:a16="http://schemas.microsoft.com/office/drawing/2014/main" xmlns="" id="{047C8CCB-F95D-4249-92DD-651249D3535A}"/>
+                <a16:creationId xmlns="" xmlns:a16="http://schemas.microsoft.com/office/drawing/2014/main" id="{047C8CCB-F95D-4249-92DD-651249D3535A}"/>
               </a:ext>
             </a:extLst>
           </p:cNvPr>
@@ -3442,7 +3442,7 @@
           <p:nvPr>
             <p:extLst>
               <p:ext uri="{386F3935-93C4-4BCD-93E2-E3B085C9AB24}">
-                <p16:designElem xmlns:p16="http://schemas.microsoft.com/office/powerpoint/2015/main" xmlns="" val="1"/>
+                <p16:designElem xmlns="" xmlns:p16="http://schemas.microsoft.com/office/powerpoint/2015/main" val="1"/>
               </p:ext>
             </p:extLst>
           </p:nvPr>
@@ -3492,7 +3492,7 @@
           <p:cNvPr id="5" name="Billede 4">
             <a:extLst>
               <a:ext uri="{FF2B5EF4-FFF2-40B4-BE49-F238E27FC236}">
-                <a16:creationId xmlns:a16="http://schemas.microsoft.com/office/drawing/2014/main" xmlns="" id="{E17B0ADA-7545-4640-BDBD-913B05D2092C}"/>
+                <a16:creationId xmlns="" xmlns:a16="http://schemas.microsoft.com/office/drawing/2014/main" id="{E17B0ADA-7545-4640-BDBD-913B05D2092C}"/>
               </a:ext>
             </a:extLst>
           </p:cNvPr>
@@ -3528,7 +3528,7 @@
           <p:cNvPr id="2" name="Titel 1">
             <a:extLst>
               <a:ext uri="{FF2B5EF4-FFF2-40B4-BE49-F238E27FC236}">
-                <a16:creationId xmlns:a16="http://schemas.microsoft.com/office/drawing/2014/main" xmlns="" id="{D0FE11DB-6070-4804-BE97-6EC5D33B84F9}"/>
+                <a16:creationId xmlns="" xmlns:a16="http://schemas.microsoft.com/office/drawing/2014/main" id="{D0FE11DB-6070-4804-BE97-6EC5D33B84F9}"/>
               </a:ext>
             </a:extLst>
           </p:cNvPr>
@@ -3639,7 +3639,7 @@
           <p:cNvPr id="13" name="Rectangle 12">
             <a:extLst>
               <a:ext uri="{FF2B5EF4-FFF2-40B4-BE49-F238E27FC236}">
-                <a16:creationId xmlns:a16="http://schemas.microsoft.com/office/drawing/2014/main" xmlns="" id="{867D4867-5BA7-4462-B2F6-A23F4A622AA7}"/>
+                <a16:creationId xmlns="" xmlns:a16="http://schemas.microsoft.com/office/drawing/2014/main" id="{867D4867-5BA7-4462-B2F6-A23F4A622AA7}"/>
               </a:ext>
             </a:extLst>
           </p:cNvPr>
@@ -3649,7 +3649,7 @@
           <p:nvPr>
             <p:extLst>
               <p:ext uri="{386F3935-93C4-4BCD-93E2-E3B085C9AB24}">
-                <p16:designElem xmlns:p16="http://schemas.microsoft.com/office/powerpoint/2015/main" xmlns="" val="1"/>
+                <p16:designElem xmlns="" xmlns:p16="http://schemas.microsoft.com/office/powerpoint/2015/main" val="1"/>
               </p:ext>
             </p:extLst>
           </p:nvPr>
@@ -3700,7 +3700,7 @@
           <p:cNvPr id="12" name="Pladsholder til indhold 4">
             <a:extLst>
               <a:ext uri="{FF2B5EF4-FFF2-40B4-BE49-F238E27FC236}">
-                <a16:creationId xmlns:a16="http://schemas.microsoft.com/office/drawing/2014/main" xmlns="" id="{22500B17-2276-435F-82C8-3471B0D75421}"/>
+                <a16:creationId xmlns="" xmlns:a16="http://schemas.microsoft.com/office/drawing/2014/main" id="{22500B17-2276-435F-82C8-3471B0D75421}"/>
               </a:ext>
             </a:extLst>
           </p:cNvPr>
@@ -3736,7 +3736,7 @@
           <p:cNvPr id="2" name="Titel 1">
             <a:extLst>
               <a:ext uri="{FF2B5EF4-FFF2-40B4-BE49-F238E27FC236}">
-                <a16:creationId xmlns:a16="http://schemas.microsoft.com/office/drawing/2014/main" xmlns="" id="{3E1A747B-9675-4981-ACB2-9927B952BFB3}"/>
+                <a16:creationId xmlns="" xmlns:a16="http://schemas.microsoft.com/office/drawing/2014/main" id="{3E1A747B-9675-4981-ACB2-9927B952BFB3}"/>
               </a:ext>
             </a:extLst>
           </p:cNvPr>
@@ -3787,7 +3787,7 @@
           <p:cNvPr id="14" name="Content Placeholder 9">
             <a:extLst>
               <a:ext uri="{FF2B5EF4-FFF2-40B4-BE49-F238E27FC236}">
-                <a16:creationId xmlns:a16="http://schemas.microsoft.com/office/drawing/2014/main" xmlns="" id="{F6FD5C6F-1FDA-48CD-BEC0-12B68866E584}"/>
+                <a16:creationId xmlns="" xmlns:a16="http://schemas.microsoft.com/office/drawing/2014/main" id="{F6FD5C6F-1FDA-48CD-BEC0-12B68866E584}"/>
               </a:ext>
             </a:extLst>
           </p:cNvPr>
@@ -3816,10 +3816,16 @@
                   <a:schemeClr val="bg1"/>
                 </a:solidFill>
               </a:rPr>
-              <a:t>Get runners pules</a:t>
-            </a:r>
-          </a:p>
-          <a:p>
+              <a:t>Get </a:t>
+            </a:r>
+            <a:r>
+              <a:rPr lang="en-US" sz="2000" dirty="0" smtClean="0">
+                <a:solidFill>
+                  <a:schemeClr val="bg1"/>
+                </a:solidFill>
+              </a:rPr>
+              <a:t>runner’s pulse</a:t>
+            </a:r>
             <a:endParaRPr lang="en-US" sz="2000" dirty="0">
               <a:solidFill>
                 <a:schemeClr val="bg1"/>
@@ -3827,16 +3833,6 @@
             </a:endParaRPr>
           </a:p>
           <a:p>
-            <a:r>
-              <a:rPr lang="en-US" sz="2000" dirty="0">
-                <a:solidFill>
-                  <a:schemeClr val="bg1"/>
-                </a:solidFill>
-              </a:rPr>
-              <a:t>Talk directly when possible</a:t>
-            </a:r>
-          </a:p>
-          <a:p>
             <a:endParaRPr lang="en-US" sz="2000" dirty="0">
               <a:solidFill>
                 <a:schemeClr val="bg1"/>
@@ -3850,8 +3846,38 @@
                   <a:schemeClr val="bg1"/>
                 </a:solidFill>
               </a:rPr>
-              <a:t>Use relays to extent track</a:t>
-            </a:r>
+              <a:t>Talk directly when possible</a:t>
+            </a:r>
+          </a:p>
+          <a:p>
+            <a:endParaRPr lang="en-US" sz="2000" dirty="0">
+              <a:solidFill>
+                <a:schemeClr val="bg1"/>
+              </a:solidFill>
+            </a:endParaRPr>
+          </a:p>
+          <a:p>
+            <a:r>
+              <a:rPr lang="en-US" sz="2000" dirty="0">
+                <a:solidFill>
+                  <a:schemeClr val="bg1"/>
+                </a:solidFill>
+              </a:rPr>
+              <a:t>Use relays to extent </a:t>
+            </a:r>
+            <a:r>
+              <a:rPr lang="en-US" sz="2000" dirty="0" smtClean="0">
+                <a:solidFill>
+                  <a:schemeClr val="bg1"/>
+                </a:solidFill>
+              </a:rPr>
+              <a:t>track coverage</a:t>
+            </a:r>
+            <a:endParaRPr lang="en-US" sz="2000" dirty="0">
+              <a:solidFill>
+                <a:schemeClr val="bg1"/>
+              </a:solidFill>
+            </a:endParaRPr>
           </a:p>
           <a:p>
             <a:pPr lvl="1"/>
@@ -3920,7 +3946,7 @@
           <p:cNvPr id="6" name="Picture 5">
             <a:extLst>
               <a:ext uri="{FF2B5EF4-FFF2-40B4-BE49-F238E27FC236}">
-                <a16:creationId xmlns:a16="http://schemas.microsoft.com/office/drawing/2014/main" xmlns="" id="{B73A3533-9974-4865-B57E-EF2F540AF4AA}"/>
+                <a16:creationId xmlns="" xmlns:a16="http://schemas.microsoft.com/office/drawing/2014/main" id="{B73A3533-9974-4865-B57E-EF2F540AF4AA}"/>
               </a:ext>
             </a:extLst>
           </p:cNvPr>
@@ -3935,7 +3961,7 @@
         </p:blipFill>
         <p:spPr>
           <a:xfrm>
-            <a:off x="4819314" y="888280"/>
+            <a:off x="4722006" y="813747"/>
             <a:ext cx="3937280" cy="3457575"/>
           </a:xfrm>
           <a:prstGeom prst="rect">
@@ -3948,7 +3974,7 @@
           <p:cNvPr id="7" name="Content Placeholder 3">
             <a:extLst>
               <a:ext uri="{FF2B5EF4-FFF2-40B4-BE49-F238E27FC236}">
-                <a16:creationId xmlns:a16="http://schemas.microsoft.com/office/drawing/2014/main" xmlns="" id="{3644AC71-A229-4066-8000-22652A69991D}"/>
+                <a16:creationId xmlns="" xmlns:a16="http://schemas.microsoft.com/office/drawing/2014/main" id="{3644AC71-A229-4066-8000-22652A69991D}"/>
               </a:ext>
             </a:extLst>
           </p:cNvPr>
@@ -3965,7 +3991,7 @@
         </p:blipFill>
         <p:spPr>
           <a:xfrm>
-            <a:off x="8752896" y="244177"/>
+            <a:off x="8726996" y="244177"/>
             <a:ext cx="3439104" cy="4027145"/>
           </a:xfrm>
           <a:prstGeom prst="rect">
@@ -3978,7 +4004,7 @@
           <p:cNvPr id="13" name="Rectangle 12">
             <a:extLst>
               <a:ext uri="{FF2B5EF4-FFF2-40B4-BE49-F238E27FC236}">
-                <a16:creationId xmlns:a16="http://schemas.microsoft.com/office/drawing/2014/main" xmlns="" id="{867D4867-5BA7-4462-B2F6-A23F4A622AA7}"/>
+                <a16:creationId xmlns="" xmlns:a16="http://schemas.microsoft.com/office/drawing/2014/main" id="{867D4867-5BA7-4462-B2F6-A23F4A622AA7}"/>
               </a:ext>
             </a:extLst>
           </p:cNvPr>
@@ -3988,7 +4014,7 @@
           <p:nvPr>
             <p:extLst>
               <p:ext uri="{386F3935-93C4-4BCD-93E2-E3B085C9AB24}">
-                <p16:designElem xmlns:p16="http://schemas.microsoft.com/office/powerpoint/2015/main" xmlns="" val="1"/>
+                <p16:designElem xmlns="" xmlns:p16="http://schemas.microsoft.com/office/powerpoint/2015/main" val="1"/>
               </p:ext>
             </p:extLst>
           </p:nvPr>
@@ -4039,7 +4065,7 @@
           <p:cNvPr id="2" name="Titel 1">
             <a:extLst>
               <a:ext uri="{FF2B5EF4-FFF2-40B4-BE49-F238E27FC236}">
-                <a16:creationId xmlns:a16="http://schemas.microsoft.com/office/drawing/2014/main" xmlns="" id="{3E1A747B-9675-4981-ACB2-9927B952BFB3}"/>
+                <a16:creationId xmlns="" xmlns:a16="http://schemas.microsoft.com/office/drawing/2014/main" id="{3E1A747B-9675-4981-ACB2-9927B952BFB3}"/>
               </a:ext>
             </a:extLst>
           </p:cNvPr>
@@ -4113,7 +4139,7 @@
           <p:cNvPr id="14" name="Content Placeholder 9">
             <a:extLst>
               <a:ext uri="{FF2B5EF4-FFF2-40B4-BE49-F238E27FC236}">
-                <a16:creationId xmlns:a16="http://schemas.microsoft.com/office/drawing/2014/main" xmlns="" id="{F6FD5C6F-1FDA-48CD-BEC0-12B68866E584}"/>
+                <a16:creationId xmlns="" xmlns:a16="http://schemas.microsoft.com/office/drawing/2014/main" id="{F6FD5C6F-1FDA-48CD-BEC0-12B68866E584}"/>
               </a:ext>
             </a:extLst>
           </p:cNvPr>
@@ -4261,7 +4287,7 @@
           <p:cNvPr id="8" name="Picture 7">
             <a:extLst>
               <a:ext uri="{FF2B5EF4-FFF2-40B4-BE49-F238E27FC236}">
-                <a16:creationId xmlns:a16="http://schemas.microsoft.com/office/drawing/2014/main" xmlns="" id="{E7BD49E1-7905-4BCB-B9CF-B6B8080DF5E0}"/>
+                <a16:creationId xmlns="" xmlns:a16="http://schemas.microsoft.com/office/drawing/2014/main" id="{E7BD49E1-7905-4BCB-B9CF-B6B8080DF5E0}"/>
               </a:ext>
             </a:extLst>
           </p:cNvPr>
@@ -4327,7 +4353,7 @@
           <p:cNvPr id="13" name="Rectangle 12">
             <a:extLst>
               <a:ext uri="{FF2B5EF4-FFF2-40B4-BE49-F238E27FC236}">
-                <a16:creationId xmlns:a16="http://schemas.microsoft.com/office/drawing/2014/main" xmlns="" id="{867D4867-5BA7-4462-B2F6-A23F4A622AA7}"/>
+                <a16:creationId xmlns="" xmlns:a16="http://schemas.microsoft.com/office/drawing/2014/main" id="{867D4867-5BA7-4462-B2F6-A23F4A622AA7}"/>
               </a:ext>
             </a:extLst>
           </p:cNvPr>
@@ -4337,7 +4363,7 @@
           <p:nvPr>
             <p:extLst>
               <p:ext uri="{386F3935-93C4-4BCD-93E2-E3B085C9AB24}">
-                <p16:designElem xmlns:p16="http://schemas.microsoft.com/office/powerpoint/2015/main" xmlns="" val="1"/>
+                <p16:designElem xmlns="" xmlns:p16="http://schemas.microsoft.com/office/powerpoint/2015/main" val="1"/>
               </p:ext>
             </p:extLst>
           </p:nvPr>
@@ -4388,7 +4414,7 @@
           <p:cNvPr id="2" name="Titel 1">
             <a:extLst>
               <a:ext uri="{FF2B5EF4-FFF2-40B4-BE49-F238E27FC236}">
-                <a16:creationId xmlns:a16="http://schemas.microsoft.com/office/drawing/2014/main" xmlns="" id="{3E1A747B-9675-4981-ACB2-9927B952BFB3}"/>
+                <a16:creationId xmlns="" xmlns:a16="http://schemas.microsoft.com/office/drawing/2014/main" id="{3E1A747B-9675-4981-ACB2-9927B952BFB3}"/>
               </a:ext>
             </a:extLst>
           </p:cNvPr>
@@ -4469,7 +4495,7 @@
           <p:cNvPr id="14" name="Content Placeholder 9">
             <a:extLst>
               <a:ext uri="{FF2B5EF4-FFF2-40B4-BE49-F238E27FC236}">
-                <a16:creationId xmlns:a16="http://schemas.microsoft.com/office/drawing/2014/main" xmlns="" id="{F6FD5C6F-1FDA-48CD-BEC0-12B68866E584}"/>
+                <a16:creationId xmlns="" xmlns:a16="http://schemas.microsoft.com/office/drawing/2014/main" id="{F6FD5C6F-1FDA-48CD-BEC0-12B68866E584}"/>
               </a:ext>
             </a:extLst>
           </p:cNvPr>
@@ -4635,7 +4661,7 @@
           <p:cNvPr id="3" name="Picture 2">
             <a:extLst>
               <a:ext uri="{FF2B5EF4-FFF2-40B4-BE49-F238E27FC236}">
-                <a16:creationId xmlns:a16="http://schemas.microsoft.com/office/drawing/2014/main" xmlns="" id="{4166C394-F86C-4469-A462-184937F08C3F}"/>
+                <a16:creationId xmlns="" xmlns:a16="http://schemas.microsoft.com/office/drawing/2014/main" id="{4166C394-F86C-4469-A462-184937F08C3F}"/>
               </a:ext>
             </a:extLst>
           </p:cNvPr>
@@ -4665,7 +4691,7 @@
           <p:cNvPr id="4" name="Picture 3">
             <a:extLst>
               <a:ext uri="{FF2B5EF4-FFF2-40B4-BE49-F238E27FC236}">
-                <a16:creationId xmlns:a16="http://schemas.microsoft.com/office/drawing/2014/main" xmlns="" id="{5F7F593E-72F2-4703-B531-94BFF21491F1}"/>
+                <a16:creationId xmlns="" xmlns:a16="http://schemas.microsoft.com/office/drawing/2014/main" id="{5F7F593E-72F2-4703-B531-94BFF21491F1}"/>
               </a:ext>
             </a:extLst>
           </p:cNvPr>
@@ -4695,7 +4721,7 @@
           <p:cNvPr id="5" name="Picture 4">
             <a:extLst>
               <a:ext uri="{FF2B5EF4-FFF2-40B4-BE49-F238E27FC236}">
-                <a16:creationId xmlns:a16="http://schemas.microsoft.com/office/drawing/2014/main" xmlns="" id="{CCFD3D16-F503-4DEC-81E8-1A314B976AEE}"/>
+                <a16:creationId xmlns="" xmlns:a16="http://schemas.microsoft.com/office/drawing/2014/main" id="{CCFD3D16-F503-4DEC-81E8-1A314B976AEE}"/>
               </a:ext>
             </a:extLst>
           </p:cNvPr>
@@ -4725,7 +4751,7 @@
           <p:cNvPr id="9" name="Picture 8">
             <a:extLst>
               <a:ext uri="{FF2B5EF4-FFF2-40B4-BE49-F238E27FC236}">
-                <a16:creationId xmlns:a16="http://schemas.microsoft.com/office/drawing/2014/main" xmlns="" id="{B61CAADB-5ADC-4D07-8820-D3D5A6394A63}"/>
+                <a16:creationId xmlns="" xmlns:a16="http://schemas.microsoft.com/office/drawing/2014/main" id="{B61CAADB-5ADC-4D07-8820-D3D5A6394A63}"/>
               </a:ext>
             </a:extLst>
           </p:cNvPr>
@@ -4755,7 +4781,7 @@
           <p:cNvPr id="10" name="Picture 9">
             <a:extLst>
               <a:ext uri="{FF2B5EF4-FFF2-40B4-BE49-F238E27FC236}">
-                <a16:creationId xmlns:a16="http://schemas.microsoft.com/office/drawing/2014/main" xmlns="" id="{9C0F3696-66CE-4F00-A220-EDAD8F90B64F}"/>
+                <a16:creationId xmlns="" xmlns:a16="http://schemas.microsoft.com/office/drawing/2014/main" id="{9C0F3696-66CE-4F00-A220-EDAD8F90B64F}"/>
               </a:ext>
             </a:extLst>
           </p:cNvPr>
@@ -4785,7 +4811,7 @@
           <p:cNvPr id="11" name="Picture 10">
             <a:extLst>
               <a:ext uri="{FF2B5EF4-FFF2-40B4-BE49-F238E27FC236}">
-                <a16:creationId xmlns:a16="http://schemas.microsoft.com/office/drawing/2014/main" xmlns="" id="{2D9D0505-6926-4D4C-9E83-73F19605E402}"/>
+                <a16:creationId xmlns="" xmlns:a16="http://schemas.microsoft.com/office/drawing/2014/main" id="{2D9D0505-6926-4D4C-9E83-73F19605E402}"/>
               </a:ext>
             </a:extLst>
           </p:cNvPr>
@@ -4853,7 +4879,7 @@
           <p:cNvPr id="13" name="Rectangle 12">
             <a:extLst>
               <a:ext uri="{FF2B5EF4-FFF2-40B4-BE49-F238E27FC236}">
-                <a16:creationId xmlns:a16="http://schemas.microsoft.com/office/drawing/2014/main" xmlns="" id="{867D4867-5BA7-4462-B2F6-A23F4A622AA7}"/>
+                <a16:creationId xmlns="" xmlns:a16="http://schemas.microsoft.com/office/drawing/2014/main" id="{867D4867-5BA7-4462-B2F6-A23F4A622AA7}"/>
               </a:ext>
             </a:extLst>
           </p:cNvPr>
@@ -4863,7 +4889,7 @@
           <p:nvPr>
             <p:extLst>
               <p:ext uri="{386F3935-93C4-4BCD-93E2-E3B085C9AB24}">
-                <p16:designElem xmlns:p16="http://schemas.microsoft.com/office/powerpoint/2015/main" xmlns="" val="1"/>
+                <p16:designElem xmlns="" xmlns:p16="http://schemas.microsoft.com/office/powerpoint/2015/main" val="1"/>
               </p:ext>
             </p:extLst>
           </p:nvPr>
@@ -4914,7 +4940,7 @@
           <p:cNvPr id="2" name="Titel 1">
             <a:extLst>
               <a:ext uri="{FF2B5EF4-FFF2-40B4-BE49-F238E27FC236}">
-                <a16:creationId xmlns:a16="http://schemas.microsoft.com/office/drawing/2014/main" xmlns="" id="{3E1A747B-9675-4981-ACB2-9927B952BFB3}"/>
+                <a16:creationId xmlns="" xmlns:a16="http://schemas.microsoft.com/office/drawing/2014/main" id="{3E1A747B-9675-4981-ACB2-9927B952BFB3}"/>
               </a:ext>
             </a:extLst>
           </p:cNvPr>
@@ -4965,7 +4991,7 @@
           <p:cNvPr id="14" name="Content Placeholder 9">
             <a:extLst>
               <a:ext uri="{FF2B5EF4-FFF2-40B4-BE49-F238E27FC236}">
-                <a16:creationId xmlns:a16="http://schemas.microsoft.com/office/drawing/2014/main" xmlns="" id="{F6FD5C6F-1FDA-48CD-BEC0-12B68866E584}"/>
+                <a16:creationId xmlns="" xmlns:a16="http://schemas.microsoft.com/office/drawing/2014/main" id="{F6FD5C6F-1FDA-48CD-BEC0-12B68866E584}"/>
               </a:ext>
             </a:extLst>
           </p:cNvPr>
@@ -5261,7 +5287,7 @@
           <p:cNvPr id="3" name="Picture 2">
             <a:extLst>
               <a:ext uri="{FF2B5EF4-FFF2-40B4-BE49-F238E27FC236}">
-                <a16:creationId xmlns:a16="http://schemas.microsoft.com/office/drawing/2014/main" xmlns="" id="{D220B874-3DFD-4B20-8990-AC529311DBBD}"/>
+                <a16:creationId xmlns="" xmlns:a16="http://schemas.microsoft.com/office/drawing/2014/main" id="{D220B874-3DFD-4B20-8990-AC529311DBBD}"/>
               </a:ext>
             </a:extLst>
           </p:cNvPr>
@@ -5291,7 +5317,7 @@
           <p:cNvPr id="4" name="Picture 3">
             <a:extLst>
               <a:ext uri="{FF2B5EF4-FFF2-40B4-BE49-F238E27FC236}">
-                <a16:creationId xmlns:a16="http://schemas.microsoft.com/office/drawing/2014/main" xmlns="" id="{86817D02-719F-4E10-8F3A-C0743EFD9A52}"/>
+                <a16:creationId xmlns="" xmlns:a16="http://schemas.microsoft.com/office/drawing/2014/main" id="{86817D02-719F-4E10-8F3A-C0743EFD9A52}"/>
               </a:ext>
             </a:extLst>
           </p:cNvPr>
@@ -5359,7 +5385,7 @@
           <p:cNvPr id="13" name="Rectangle 12">
             <a:extLst>
               <a:ext uri="{FF2B5EF4-FFF2-40B4-BE49-F238E27FC236}">
-                <a16:creationId xmlns:a16="http://schemas.microsoft.com/office/drawing/2014/main" xmlns="" id="{867D4867-5BA7-4462-B2F6-A23F4A622AA7}"/>
+                <a16:creationId xmlns="" xmlns:a16="http://schemas.microsoft.com/office/drawing/2014/main" id="{867D4867-5BA7-4462-B2F6-A23F4A622AA7}"/>
               </a:ext>
             </a:extLst>
           </p:cNvPr>
@@ -5369,7 +5395,7 @@
           <p:nvPr>
             <p:extLst>
               <p:ext uri="{386F3935-93C4-4BCD-93E2-E3B085C9AB24}">
-                <p16:designElem xmlns:p16="http://schemas.microsoft.com/office/powerpoint/2015/main" xmlns="" val="1"/>
+                <p16:designElem xmlns="" xmlns:p16="http://schemas.microsoft.com/office/powerpoint/2015/main" val="1"/>
               </p:ext>
             </p:extLst>
           </p:nvPr>
@@ -5420,7 +5446,7 @@
           <p:cNvPr id="2" name="Titel 1">
             <a:extLst>
               <a:ext uri="{FF2B5EF4-FFF2-40B4-BE49-F238E27FC236}">
-                <a16:creationId xmlns:a16="http://schemas.microsoft.com/office/drawing/2014/main" xmlns="" id="{3E1A747B-9675-4981-ACB2-9927B952BFB3}"/>
+                <a16:creationId xmlns="" xmlns:a16="http://schemas.microsoft.com/office/drawing/2014/main" id="{3E1A747B-9675-4981-ACB2-9927B952BFB3}"/>
               </a:ext>
             </a:extLst>
           </p:cNvPr>
@@ -5471,7 +5497,7 @@
           <p:cNvPr id="14" name="Content Placeholder 9">
             <a:extLst>
               <a:ext uri="{FF2B5EF4-FFF2-40B4-BE49-F238E27FC236}">
-                <a16:creationId xmlns:a16="http://schemas.microsoft.com/office/drawing/2014/main" xmlns="" id="{F6FD5C6F-1FDA-48CD-BEC0-12B68866E584}"/>
+                <a16:creationId xmlns="" xmlns:a16="http://schemas.microsoft.com/office/drawing/2014/main" id="{F6FD5C6F-1FDA-48CD-BEC0-12B68866E584}"/>
               </a:ext>
             </a:extLst>
           </p:cNvPr>
@@ -5595,7 +5621,7 @@
           <p:cNvPr id="7" name="Picture 6">
             <a:extLst>
               <a:ext uri="{FF2B5EF4-FFF2-40B4-BE49-F238E27FC236}">
-                <a16:creationId xmlns:a16="http://schemas.microsoft.com/office/drawing/2014/main" xmlns="" id="{E7807DF7-F24A-40B9-8828-E41C422461EB}"/>
+                <a16:creationId xmlns="" xmlns:a16="http://schemas.microsoft.com/office/drawing/2014/main" id="{E7807DF7-F24A-40B9-8828-E41C422461EB}"/>
               </a:ext>
             </a:extLst>
           </p:cNvPr>
@@ -5623,7 +5649,7 @@
           <p:cNvPr id="8" name="Picture 7">
             <a:extLst>
               <a:ext uri="{FF2B5EF4-FFF2-40B4-BE49-F238E27FC236}">
-                <a16:creationId xmlns:a16="http://schemas.microsoft.com/office/drawing/2014/main" xmlns="" id="{8A53F9F8-B224-4ADD-9954-5898B41D8C71}"/>
+                <a16:creationId xmlns="" xmlns:a16="http://schemas.microsoft.com/office/drawing/2014/main" id="{8A53F9F8-B224-4ADD-9954-5898B41D8C71}"/>
               </a:ext>
             </a:extLst>
           </p:cNvPr>
@@ -5692,7 +5718,7 @@
           <p:cNvPr id="28" name="Freeform: Shape 27">
             <a:extLst>
               <a:ext uri="{FF2B5EF4-FFF2-40B4-BE49-F238E27FC236}">
-                <a16:creationId xmlns:a16="http://schemas.microsoft.com/office/drawing/2014/main" xmlns="" id="{E862BE82-D00D-42C1-BF16-93AA37870C32}"/>
+                <a16:creationId xmlns="" xmlns:a16="http://schemas.microsoft.com/office/drawing/2014/main" id="{E862BE82-D00D-42C1-BF16-93AA37870C32}"/>
               </a:ext>
             </a:extLst>
           </p:cNvPr>
@@ -5702,7 +5728,7 @@
           <p:nvPr>
             <p:extLst>
               <p:ext uri="{386F3935-93C4-4BCD-93E2-E3B085C9AB24}">
-                <p16:designElem xmlns:p16="http://schemas.microsoft.com/office/powerpoint/2015/main" xmlns="" val="1"/>
+                <p16:designElem xmlns="" xmlns:p16="http://schemas.microsoft.com/office/powerpoint/2015/main" val="1"/>
               </p:ext>
             </p:extLst>
           </p:nvPr>
@@ -5856,7 +5882,7 @@
           <p:cNvPr id="30" name="Freeform: Shape 29">
             <a:extLst>
               <a:ext uri="{FF2B5EF4-FFF2-40B4-BE49-F238E27FC236}">
-                <a16:creationId xmlns:a16="http://schemas.microsoft.com/office/drawing/2014/main" xmlns="" id="{F6D92C2D-1D3D-4974-918C-06579FB354A9}"/>
+                <a16:creationId xmlns="" xmlns:a16="http://schemas.microsoft.com/office/drawing/2014/main" id="{F6D92C2D-1D3D-4974-918C-06579FB354A9}"/>
               </a:ext>
             </a:extLst>
           </p:cNvPr>
@@ -5866,7 +5892,7 @@
           <p:nvPr>
             <p:extLst>
               <p:ext uri="{386F3935-93C4-4BCD-93E2-E3B085C9AB24}">
-                <p16:designElem xmlns:p16="http://schemas.microsoft.com/office/powerpoint/2015/main" xmlns="" val="1"/>
+                <p16:designElem xmlns="" xmlns:p16="http://schemas.microsoft.com/office/powerpoint/2015/main" val="1"/>
               </p:ext>
             </p:extLst>
           </p:nvPr>
@@ -6022,7 +6048,7 @@
           <p:cNvPr id="9" name="Picture 8">
             <a:extLst>
               <a:ext uri="{FF2B5EF4-FFF2-40B4-BE49-F238E27FC236}">
-                <a16:creationId xmlns:a16="http://schemas.microsoft.com/office/drawing/2014/main" xmlns="" id="{B29B5DD1-0262-4872-844E-5166BEC99EC6}"/>
+                <a16:creationId xmlns="" xmlns:a16="http://schemas.microsoft.com/office/drawing/2014/main" id="{B29B5DD1-0262-4872-844E-5166BEC99EC6}"/>
               </a:ext>
             </a:extLst>
           </p:cNvPr>
@@ -6050,7 +6076,7 @@
           <p:cNvPr id="2" name="Titel 1">
             <a:extLst>
               <a:ext uri="{FF2B5EF4-FFF2-40B4-BE49-F238E27FC236}">
-                <a16:creationId xmlns:a16="http://schemas.microsoft.com/office/drawing/2014/main" xmlns="" id="{3E1A747B-9675-4981-ACB2-9927B952BFB3}"/>
+                <a16:creationId xmlns="" xmlns:a16="http://schemas.microsoft.com/office/drawing/2014/main" id="{3E1A747B-9675-4981-ACB2-9927B952BFB3}"/>
               </a:ext>
             </a:extLst>
           </p:cNvPr>
@@ -6086,7 +6112,7 @@
           <p:cNvPr id="14" name="Content Placeholder 9">
             <a:extLst>
               <a:ext uri="{FF2B5EF4-FFF2-40B4-BE49-F238E27FC236}">
-                <a16:creationId xmlns:a16="http://schemas.microsoft.com/office/drawing/2014/main" xmlns="" id="{F6FD5C6F-1FDA-48CD-BEC0-12B68866E584}"/>
+                <a16:creationId xmlns="" xmlns:a16="http://schemas.microsoft.com/office/drawing/2014/main" id="{F6FD5C6F-1FDA-48CD-BEC0-12B68866E584}"/>
               </a:ext>
             </a:extLst>
           </p:cNvPr>
@@ -6218,7 +6244,7 @@
           <p:cNvPr id="17" name="Rectangle 16">
             <a:extLst>
               <a:ext uri="{FF2B5EF4-FFF2-40B4-BE49-F238E27FC236}">
-                <a16:creationId xmlns:a16="http://schemas.microsoft.com/office/drawing/2014/main" xmlns="" id="{867D4867-5BA7-4462-B2F6-A23F4A622AA7}"/>
+                <a16:creationId xmlns="" xmlns:a16="http://schemas.microsoft.com/office/drawing/2014/main" id="{867D4867-5BA7-4462-B2F6-A23F4A622AA7}"/>
               </a:ext>
             </a:extLst>
           </p:cNvPr>
@@ -6228,7 +6254,7 @@
           <p:nvPr>
             <p:extLst>
               <p:ext uri="{386F3935-93C4-4BCD-93E2-E3B085C9AB24}">
-                <p16:designElem xmlns:p16="http://schemas.microsoft.com/office/powerpoint/2015/main" xmlns="" val="1"/>
+                <p16:designElem xmlns="" xmlns:p16="http://schemas.microsoft.com/office/powerpoint/2015/main" val="1"/>
               </p:ext>
             </p:extLst>
           </p:nvPr>
@@ -6279,7 +6305,7 @@
           <p:cNvPr id="4" name="Billede 3">
             <a:extLst>
               <a:ext uri="{FF2B5EF4-FFF2-40B4-BE49-F238E27FC236}">
-                <a16:creationId xmlns:a16="http://schemas.microsoft.com/office/drawing/2014/main" xmlns="" id="{587E7BFF-CF4C-46EF-8704-7F9784994B09}"/>
+                <a16:creationId xmlns="" xmlns:a16="http://schemas.microsoft.com/office/drawing/2014/main" id="{587E7BFF-CF4C-46EF-8704-7F9784994B09}"/>
               </a:ext>
             </a:extLst>
           </p:cNvPr>
@@ -6309,7 +6335,7 @@
           <p:cNvPr id="2" name="Titel 1">
             <a:extLst>
               <a:ext uri="{FF2B5EF4-FFF2-40B4-BE49-F238E27FC236}">
-                <a16:creationId xmlns:a16="http://schemas.microsoft.com/office/drawing/2014/main" xmlns="" id="{9FB4A506-2702-4600-A2CA-F98C4422D0FA}"/>
+                <a16:creationId xmlns="" xmlns:a16="http://schemas.microsoft.com/office/drawing/2014/main" id="{9FB4A506-2702-4600-A2CA-F98C4422D0FA}"/>
               </a:ext>
             </a:extLst>
           </p:cNvPr>
@@ -6360,7 +6386,7 @@
           <p:cNvPr id="9" name="Content Placeholder 8">
             <a:extLst>
               <a:ext uri="{FF2B5EF4-FFF2-40B4-BE49-F238E27FC236}">
-                <a16:creationId xmlns:a16="http://schemas.microsoft.com/office/drawing/2014/main" xmlns="" id="{CA83A435-01F2-4983-A087-5E0473CD6185}"/>
+                <a16:creationId xmlns="" xmlns:a16="http://schemas.microsoft.com/office/drawing/2014/main" id="{CA83A435-01F2-4983-A087-5E0473CD6185}"/>
               </a:ext>
             </a:extLst>
           </p:cNvPr>
@@ -6457,7 +6483,7 @@
           <p:cNvPr id="28" name="Freeform: Shape 27">
             <a:extLst>
               <a:ext uri="{FF2B5EF4-FFF2-40B4-BE49-F238E27FC236}">
-                <a16:creationId xmlns:a16="http://schemas.microsoft.com/office/drawing/2014/main" xmlns="" id="{E862BE82-D00D-42C1-BF16-93AA37870C32}"/>
+                <a16:creationId xmlns="" xmlns:a16="http://schemas.microsoft.com/office/drawing/2014/main" id="{E862BE82-D00D-42C1-BF16-93AA37870C32}"/>
               </a:ext>
             </a:extLst>
           </p:cNvPr>
@@ -6467,7 +6493,7 @@
           <p:nvPr>
             <p:extLst>
               <p:ext uri="{386F3935-93C4-4BCD-93E2-E3B085C9AB24}">
-                <p16:designElem xmlns:p16="http://schemas.microsoft.com/office/powerpoint/2015/main" xmlns="" val="1"/>
+                <p16:designElem xmlns="" xmlns:p16="http://schemas.microsoft.com/office/powerpoint/2015/main" val="1"/>
               </p:ext>
             </p:extLst>
           </p:nvPr>
@@ -6621,7 +6647,7 @@
           <p:cNvPr id="30" name="Freeform: Shape 29">
             <a:extLst>
               <a:ext uri="{FF2B5EF4-FFF2-40B4-BE49-F238E27FC236}">
-                <a16:creationId xmlns:a16="http://schemas.microsoft.com/office/drawing/2014/main" xmlns="" id="{F6D92C2D-1D3D-4974-918C-06579FB354A9}"/>
+                <a16:creationId xmlns="" xmlns:a16="http://schemas.microsoft.com/office/drawing/2014/main" id="{F6D92C2D-1D3D-4974-918C-06579FB354A9}"/>
               </a:ext>
             </a:extLst>
           </p:cNvPr>
@@ -6631,7 +6657,7 @@
           <p:nvPr>
             <p:extLst>
               <p:ext uri="{386F3935-93C4-4BCD-93E2-E3B085C9AB24}">
-                <p16:designElem xmlns:p16="http://schemas.microsoft.com/office/powerpoint/2015/main" xmlns="" val="1"/>
+                <p16:designElem xmlns="" xmlns:p16="http://schemas.microsoft.com/office/powerpoint/2015/main" val="1"/>
               </p:ext>
             </p:extLst>
           </p:nvPr>
@@ -6787,7 +6813,7 @@
           <p:cNvPr id="2" name="Titel 1">
             <a:extLst>
               <a:ext uri="{FF2B5EF4-FFF2-40B4-BE49-F238E27FC236}">
-                <a16:creationId xmlns:a16="http://schemas.microsoft.com/office/drawing/2014/main" xmlns="" id="{3E1A747B-9675-4981-ACB2-9927B952BFB3}"/>
+                <a16:creationId xmlns="" xmlns:a16="http://schemas.microsoft.com/office/drawing/2014/main" id="{3E1A747B-9675-4981-ACB2-9927B952BFB3}"/>
               </a:ext>
             </a:extLst>
           </p:cNvPr>
@@ -6823,7 +6849,7 @@
           <p:cNvPr id="14" name="Content Placeholder 9">
             <a:extLst>
               <a:ext uri="{FF2B5EF4-FFF2-40B4-BE49-F238E27FC236}">
-                <a16:creationId xmlns:a16="http://schemas.microsoft.com/office/drawing/2014/main" xmlns="" id="{F6FD5C6F-1FDA-48CD-BEC0-12B68866E584}"/>
+                <a16:creationId xmlns="" xmlns:a16="http://schemas.microsoft.com/office/drawing/2014/main" id="{F6FD5C6F-1FDA-48CD-BEC0-12B68866E584}"/>
               </a:ext>
             </a:extLst>
           </p:cNvPr>
@@ -6934,7 +6960,7 @@
           <p:cNvPr id="3" name="Picture 2">
             <a:extLst>
               <a:ext uri="{FF2B5EF4-FFF2-40B4-BE49-F238E27FC236}">
-                <a16:creationId xmlns:a16="http://schemas.microsoft.com/office/drawing/2014/main" xmlns="" id="{B3C7E81B-AE90-449D-B294-5553F1260EFD}"/>
+                <a16:creationId xmlns="" xmlns:a16="http://schemas.microsoft.com/office/drawing/2014/main" id="{B3C7E81B-AE90-449D-B294-5553F1260EFD}"/>
               </a:ext>
             </a:extLst>
           </p:cNvPr>
@@ -6964,7 +6990,7 @@
           <p:cNvPr id="5" name="Picture 4">
             <a:extLst>
               <a:ext uri="{FF2B5EF4-FFF2-40B4-BE49-F238E27FC236}">
-                <a16:creationId xmlns:a16="http://schemas.microsoft.com/office/drawing/2014/main" xmlns="" id="{8536489A-1B2F-482D-8054-3E536A7285E8}"/>
+                <a16:creationId xmlns="" xmlns:a16="http://schemas.microsoft.com/office/drawing/2014/main" id="{8536489A-1B2F-482D-8054-3E536A7285E8}"/>
               </a:ext>
             </a:extLst>
           </p:cNvPr>

</xml_diff>

<commit_message>
All da Power in PowerPoint ;)
</commit_message>
<xml_diff>
--- a/Hop or not to hop.pptx
+++ b/Hop or not to hop.pptx
@@ -330,7 +330,7 @@
           <a:p>
             <a:fld id="{2817A623-7236-4665-A594-D019834C30E7}" type="slidenum">
               <a:rPr lang="aa-ET" smtClean="0"/>
-              <a:t>‹nr.›</a:t>
+              <a:t>‹#›</a:t>
             </a:fld>
             <a:endParaRPr lang="aa-ET"/>
           </a:p>
@@ -530,7 +530,7 @@
           <a:p>
             <a:fld id="{2817A623-7236-4665-A594-D019834C30E7}" type="slidenum">
               <a:rPr lang="aa-ET" smtClean="0"/>
-              <a:t>‹nr.›</a:t>
+              <a:t>‹#›</a:t>
             </a:fld>
             <a:endParaRPr lang="aa-ET"/>
           </a:p>
@@ -740,7 +740,7 @@
           <a:p>
             <a:fld id="{2817A623-7236-4665-A594-D019834C30E7}" type="slidenum">
               <a:rPr lang="aa-ET" smtClean="0"/>
-              <a:t>‹nr.›</a:t>
+              <a:t>‹#›</a:t>
             </a:fld>
             <a:endParaRPr lang="aa-ET"/>
           </a:p>
@@ -940,7 +940,7 @@
           <a:p>
             <a:fld id="{2817A623-7236-4665-A594-D019834C30E7}" type="slidenum">
               <a:rPr lang="aa-ET" smtClean="0"/>
-              <a:t>‹nr.›</a:t>
+              <a:t>‹#›</a:t>
             </a:fld>
             <a:endParaRPr lang="aa-ET"/>
           </a:p>
@@ -1216,7 +1216,7 @@
           <a:p>
             <a:fld id="{2817A623-7236-4665-A594-D019834C30E7}" type="slidenum">
               <a:rPr lang="aa-ET" smtClean="0"/>
-              <a:t>‹nr.›</a:t>
+              <a:t>‹#›</a:t>
             </a:fld>
             <a:endParaRPr lang="aa-ET"/>
           </a:p>
@@ -1484,7 +1484,7 @@
           <a:p>
             <a:fld id="{2817A623-7236-4665-A594-D019834C30E7}" type="slidenum">
               <a:rPr lang="aa-ET" smtClean="0"/>
-              <a:t>‹nr.›</a:t>
+              <a:t>‹#›</a:t>
             </a:fld>
             <a:endParaRPr lang="aa-ET"/>
           </a:p>
@@ -1899,7 +1899,7 @@
           <a:p>
             <a:fld id="{2817A623-7236-4665-A594-D019834C30E7}" type="slidenum">
               <a:rPr lang="aa-ET" smtClean="0"/>
-              <a:t>‹nr.›</a:t>
+              <a:t>‹#›</a:t>
             </a:fld>
             <a:endParaRPr lang="aa-ET"/>
           </a:p>
@@ -2041,7 +2041,7 @@
           <a:p>
             <a:fld id="{2817A623-7236-4665-A594-D019834C30E7}" type="slidenum">
               <a:rPr lang="aa-ET" smtClean="0"/>
-              <a:t>‹nr.›</a:t>
+              <a:t>‹#›</a:t>
             </a:fld>
             <a:endParaRPr lang="aa-ET"/>
           </a:p>
@@ -2154,7 +2154,7 @@
           <a:p>
             <a:fld id="{2817A623-7236-4665-A594-D019834C30E7}" type="slidenum">
               <a:rPr lang="aa-ET" smtClean="0"/>
-              <a:t>‹nr.›</a:t>
+              <a:t>‹#›</a:t>
             </a:fld>
             <a:endParaRPr lang="aa-ET"/>
           </a:p>
@@ -2467,7 +2467,7 @@
           <a:p>
             <a:fld id="{2817A623-7236-4665-A594-D019834C30E7}" type="slidenum">
               <a:rPr lang="aa-ET" smtClean="0"/>
-              <a:t>‹nr.›</a:t>
+              <a:t>‹#›</a:t>
             </a:fld>
             <a:endParaRPr lang="aa-ET"/>
           </a:p>
@@ -2756,7 +2756,7 @@
           <a:p>
             <a:fld id="{2817A623-7236-4665-A594-D019834C30E7}" type="slidenum">
               <a:rPr lang="aa-ET" smtClean="0"/>
-              <a:t>‹nr.›</a:t>
+              <a:t>‹#›</a:t>
             </a:fld>
             <a:endParaRPr lang="aa-ET"/>
           </a:p>
@@ -3035,7 +3035,7 @@
           <a:p>
             <a:fld id="{2817A623-7236-4665-A594-D019834C30E7}" type="slidenum">
               <a:rPr lang="aa-ET" smtClean="0"/>
-              <a:t>‹nr.›</a:t>
+              <a:t>‹#›</a:t>
             </a:fld>
             <a:endParaRPr lang="aa-ET"/>
           </a:p>
@@ -6834,12 +6834,1007 @@
           </a:p>
         </p:txBody>
       </p:sp>
+      <p:graphicFrame>
+        <p:nvGraphicFramePr>
+          <p:cNvPr id="4" name="Table 3">
+            <a:extLst>
+              <a:ext uri="{FF2B5EF4-FFF2-40B4-BE49-F238E27FC236}">
+                <a16:creationId xmlns:a16="http://schemas.microsoft.com/office/drawing/2014/main" id="{959E7F3A-E83D-4CBB-9F28-82915AB6878A}"/>
+              </a:ext>
+            </a:extLst>
+          </p:cNvPr>
+          <p:cNvGraphicFramePr>
+            <a:graphicFrameLocks noGrp="1"/>
+          </p:cNvGraphicFramePr>
+          <p:nvPr>
+            <p:extLst>
+              <p:ext uri="{D42A27DB-BD31-4B8C-83A1-F6EECF244321}">
+                <p14:modId xmlns:p14="http://schemas.microsoft.com/office/powerpoint/2010/main" val="2101187961"/>
+              </p:ext>
+            </p:extLst>
+          </p:nvPr>
+        </p:nvGraphicFramePr>
+        <p:xfrm>
+          <a:off x="5805960" y="1432378"/>
+          <a:ext cx="6184900" cy="2181225"/>
+        </p:xfrm>
+        <a:graphic>
+          <a:graphicData uri="http://schemas.openxmlformats.org/drawingml/2006/table">
+            <a:tbl>
+              <a:tblPr>
+                <a:tableStyleId>{5C22544A-7EE6-4342-B048-85BDC9FD1C3A}</a:tableStyleId>
+              </a:tblPr>
+              <a:tblGrid>
+                <a:gridCol w="762000">
+                  <a:extLst>
+                    <a:ext uri="{9D8B030D-6E8A-4147-A177-3AD203B41FA5}">
+                      <a16:colId xmlns:a16="http://schemas.microsoft.com/office/drawing/2014/main" val="877155824"/>
+                    </a:ext>
+                  </a:extLst>
+                </a:gridCol>
+                <a:gridCol w="1130300">
+                  <a:extLst>
+                    <a:ext uri="{9D8B030D-6E8A-4147-A177-3AD203B41FA5}">
+                      <a16:colId xmlns:a16="http://schemas.microsoft.com/office/drawing/2014/main" val="2150856818"/>
+                    </a:ext>
+                  </a:extLst>
+                </a:gridCol>
+                <a:gridCol w="609600">
+                  <a:extLst>
+                    <a:ext uri="{9D8B030D-6E8A-4147-A177-3AD203B41FA5}">
+                      <a16:colId xmlns:a16="http://schemas.microsoft.com/office/drawing/2014/main" val="1694212619"/>
+                    </a:ext>
+                  </a:extLst>
+                </a:gridCol>
+                <a:gridCol w="1282700">
+                  <a:extLst>
+                    <a:ext uri="{9D8B030D-6E8A-4147-A177-3AD203B41FA5}">
+                      <a16:colId xmlns:a16="http://schemas.microsoft.com/office/drawing/2014/main" val="3811761826"/>
+                    </a:ext>
+                  </a:extLst>
+                </a:gridCol>
+                <a:gridCol w="2400300">
+                  <a:extLst>
+                    <a:ext uri="{9D8B030D-6E8A-4147-A177-3AD203B41FA5}">
+                      <a16:colId xmlns:a16="http://schemas.microsoft.com/office/drawing/2014/main" val="2662422115"/>
+                    </a:ext>
+                  </a:extLst>
+                </a:gridCol>
+              </a:tblGrid>
+              <a:tr h="504825">
+                <a:tc gridSpan="5">
+                  <a:txBody>
+                    <a:bodyPr/>
+                    <a:lstStyle/>
+                    <a:p>
+                      <a:pPr algn="ctr" fontAlgn="b"/>
+                      <a:r>
+                        <a:rPr lang="da-DK" sz="3000" u="none" strike="noStrike" dirty="0">
+                          <a:effectLst/>
+                        </a:rPr>
+                        <a:t>POWER TABLE</a:t>
+                      </a:r>
+                      <a:endParaRPr lang="da-DK" sz="3000" b="0" i="0" u="none" strike="noStrike" dirty="0">
+                        <a:solidFill>
+                          <a:srgbClr val="000000"/>
+                        </a:solidFill>
+                        <a:effectLst/>
+                        <a:latin typeface="Calibri" panose="020F0502020204030204" pitchFamily="34" charset="0"/>
+                      </a:endParaRPr>
+                    </a:p>
+                  </a:txBody>
+                  <a:tcPr marL="9525" marR="9525" marT="9525" marB="0" anchor="b"/>
+                </a:tc>
+                <a:tc hMerge="1">
+                  <a:txBody>
+                    <a:bodyPr/>
+                    <a:lstStyle/>
+                    <a:p>
+                      <a:endParaRPr lang="da-DK"/>
+                    </a:p>
+                  </a:txBody>
+                  <a:tcPr/>
+                </a:tc>
+                <a:tc hMerge="1">
+                  <a:txBody>
+                    <a:bodyPr/>
+                    <a:lstStyle/>
+                    <a:p>
+                      <a:endParaRPr lang="da-DK"/>
+                    </a:p>
+                  </a:txBody>
+                  <a:tcPr/>
+                </a:tc>
+                <a:tc hMerge="1">
+                  <a:txBody>
+                    <a:bodyPr/>
+                    <a:lstStyle/>
+                    <a:p>
+                      <a:endParaRPr lang="da-DK"/>
+                    </a:p>
+                  </a:txBody>
+                  <a:tcPr/>
+                </a:tc>
+                <a:tc hMerge="1">
+                  <a:txBody>
+                    <a:bodyPr/>
+                    <a:lstStyle/>
+                    <a:p>
+                      <a:endParaRPr lang="da-DK"/>
+                    </a:p>
+                  </a:txBody>
+                  <a:tcPr/>
+                </a:tc>
+                <a:extLst>
+                  <a:ext uri="{0D108BD9-81ED-4DB2-BD59-A6C34878D82A}">
+                    <a16:rowId xmlns:a16="http://schemas.microsoft.com/office/drawing/2014/main" val="2384365693"/>
+                  </a:ext>
+                </a:extLst>
+              </a:tr>
+              <a:tr h="523875">
+                <a:tc>
+                  <a:txBody>
+                    <a:bodyPr/>
+                    <a:lstStyle/>
+                    <a:p>
+                      <a:pPr algn="l" fontAlgn="b"/>
+                      <a:r>
+                        <a:rPr lang="da-DK" sz="1500" u="none" strike="noStrike">
+                          <a:effectLst/>
+                        </a:rPr>
+                        <a:t>Scenario</a:t>
+                      </a:r>
+                      <a:endParaRPr lang="da-DK" sz="1500" b="0" i="0" u="none" strike="noStrike">
+                        <a:solidFill>
+                          <a:srgbClr val="000000"/>
+                        </a:solidFill>
+                        <a:effectLst/>
+                        <a:latin typeface="Calibri" panose="020F0502020204030204" pitchFamily="34" charset="0"/>
+                      </a:endParaRPr>
+                    </a:p>
+                  </a:txBody>
+                  <a:tcPr marL="9525" marR="9525" marT="9525" marB="0" anchor="b"/>
+                </a:tc>
+                <a:tc>
+                  <a:txBody>
+                    <a:bodyPr/>
+                    <a:lstStyle/>
+                    <a:p>
+                      <a:pPr algn="l" fontAlgn="b"/>
+                      <a:r>
+                        <a:rPr lang="da-DK" sz="1500" u="none" strike="noStrike">
+                          <a:effectLst/>
+                        </a:rPr>
+                        <a:t>Transmission Power</a:t>
+                      </a:r>
+                      <a:endParaRPr lang="da-DK" sz="1500" b="0" i="0" u="none" strike="noStrike">
+                        <a:solidFill>
+                          <a:srgbClr val="000000"/>
+                        </a:solidFill>
+                        <a:effectLst/>
+                        <a:latin typeface="Calibri" panose="020F0502020204030204" pitchFamily="34" charset="0"/>
+                      </a:endParaRPr>
+                    </a:p>
+                  </a:txBody>
+                  <a:tcPr marL="9525" marR="9525" marT="9525" marB="0" anchor="b"/>
+                </a:tc>
+                <a:tc>
+                  <a:txBody>
+                    <a:bodyPr/>
+                    <a:lstStyle/>
+                    <a:p>
+                      <a:pPr algn="l" fontAlgn="b"/>
+                      <a:r>
+                        <a:rPr lang="da-DK" sz="1500" u="none" strike="noStrike">
+                          <a:effectLst/>
+                        </a:rPr>
+                        <a:t>Sleep</a:t>
+                      </a:r>
+                      <a:endParaRPr lang="da-DK" sz="1500" b="0" i="0" u="none" strike="noStrike">
+                        <a:solidFill>
+                          <a:srgbClr val="000000"/>
+                        </a:solidFill>
+                        <a:effectLst/>
+                        <a:latin typeface="Calibri" panose="020F0502020204030204" pitchFamily="34" charset="0"/>
+                      </a:endParaRPr>
+                    </a:p>
+                  </a:txBody>
+                  <a:tcPr marL="9525" marR="9525" marT="9525" marB="0" anchor="b"/>
+                </a:tc>
+                <a:tc>
+                  <a:txBody>
+                    <a:bodyPr/>
+                    <a:lstStyle/>
+                    <a:p>
+                      <a:pPr algn="l" fontAlgn="b"/>
+                      <a:r>
+                        <a:rPr lang="da-DK" sz="1500" u="none" strike="noStrike">
+                          <a:effectLst/>
+                        </a:rPr>
+                        <a:t>Overshoot after wake-up</a:t>
+                      </a:r>
+                      <a:endParaRPr lang="da-DK" sz="1500" b="0" i="0" u="none" strike="noStrike">
+                        <a:solidFill>
+                          <a:srgbClr val="000000"/>
+                        </a:solidFill>
+                        <a:effectLst/>
+                        <a:latin typeface="Calibri" panose="020F0502020204030204" pitchFamily="34" charset="0"/>
+                      </a:endParaRPr>
+                    </a:p>
+                  </a:txBody>
+                  <a:tcPr marL="9525" marR="9525" marT="9525" marB="0" anchor="b"/>
+                </a:tc>
+                <a:tc>
+                  <a:txBody>
+                    <a:bodyPr/>
+                    <a:lstStyle/>
+                    <a:p>
+                      <a:pPr algn="l" fontAlgn="b"/>
+                      <a:r>
+                        <a:rPr lang="en-US" sz="1500" u="none" strike="noStrike">
+                          <a:effectLst/>
+                        </a:rPr>
+                        <a:t>Base Station Lifetime before half battery capacity (Hours)</a:t>
+                      </a:r>
+                      <a:endParaRPr lang="en-US" sz="1500" b="0" i="0" u="none" strike="noStrike">
+                        <a:solidFill>
+                          <a:srgbClr val="000000"/>
+                        </a:solidFill>
+                        <a:effectLst/>
+                        <a:latin typeface="Calibri" panose="020F0502020204030204" pitchFamily="34" charset="0"/>
+                      </a:endParaRPr>
+                    </a:p>
+                  </a:txBody>
+                  <a:tcPr marL="9525" marR="9525" marT="9525" marB="0" anchor="b"/>
+                </a:tc>
+                <a:extLst>
+                  <a:ext uri="{0D108BD9-81ED-4DB2-BD59-A6C34878D82A}">
+                    <a16:rowId xmlns:a16="http://schemas.microsoft.com/office/drawing/2014/main" val="1375811977"/>
+                  </a:ext>
+                </a:extLst>
+              </a:tr>
+              <a:tr h="190500">
+                <a:tc>
+                  <a:txBody>
+                    <a:bodyPr/>
+                    <a:lstStyle/>
+                    <a:p>
+                      <a:pPr algn="r" fontAlgn="b"/>
+                      <a:r>
+                        <a:rPr lang="da-DK" sz="1100" u="none" strike="noStrike">
+                          <a:effectLst/>
+                        </a:rPr>
+                        <a:t>1</a:t>
+                      </a:r>
+                      <a:endParaRPr lang="da-DK" sz="1100" b="0" i="0" u="none" strike="noStrike">
+                        <a:solidFill>
+                          <a:srgbClr val="000000"/>
+                        </a:solidFill>
+                        <a:effectLst/>
+                        <a:latin typeface="Calibri" panose="020F0502020204030204" pitchFamily="34" charset="0"/>
+                      </a:endParaRPr>
+                    </a:p>
+                  </a:txBody>
+                  <a:tcPr marL="9525" marR="9525" marT="9525" marB="0" anchor="b"/>
+                </a:tc>
+                <a:tc>
+                  <a:txBody>
+                    <a:bodyPr/>
+                    <a:lstStyle/>
+                    <a:p>
+                      <a:pPr algn="l" fontAlgn="b"/>
+                      <a:r>
+                        <a:rPr lang="da-DK" sz="1100" u="none" strike="noStrike">
+                          <a:effectLst/>
+                        </a:rPr>
+                        <a:t>Max (0dBm)</a:t>
+                      </a:r>
+                      <a:endParaRPr lang="da-DK" sz="1100" b="0" i="0" u="none" strike="noStrike">
+                        <a:solidFill>
+                          <a:srgbClr val="000000"/>
+                        </a:solidFill>
+                        <a:effectLst/>
+                        <a:latin typeface="Calibri" panose="020F0502020204030204" pitchFamily="34" charset="0"/>
+                      </a:endParaRPr>
+                    </a:p>
+                  </a:txBody>
+                  <a:tcPr marL="9525" marR="9525" marT="9525" marB="0" anchor="b"/>
+                </a:tc>
+                <a:tc>
+                  <a:txBody>
+                    <a:bodyPr/>
+                    <a:lstStyle/>
+                    <a:p>
+                      <a:pPr algn="l" fontAlgn="b"/>
+                      <a:r>
+                        <a:rPr lang="da-DK" sz="1100" u="none" strike="noStrike">
+                          <a:effectLst/>
+                        </a:rPr>
+                        <a:t>No</a:t>
+                      </a:r>
+                      <a:endParaRPr lang="da-DK" sz="1100" b="0" i="0" u="none" strike="noStrike">
+                        <a:solidFill>
+                          <a:srgbClr val="000000"/>
+                        </a:solidFill>
+                        <a:effectLst/>
+                        <a:latin typeface="Calibri" panose="020F0502020204030204" pitchFamily="34" charset="0"/>
+                      </a:endParaRPr>
+                    </a:p>
+                  </a:txBody>
+                  <a:tcPr marL="9525" marR="9525" marT="9525" marB="0" anchor="b"/>
+                </a:tc>
+                <a:tc>
+                  <a:txBody>
+                    <a:bodyPr/>
+                    <a:lstStyle/>
+                    <a:p>
+                      <a:pPr algn="l" fontAlgn="b"/>
+                      <a:r>
+                        <a:rPr lang="da-DK" sz="1100" u="none" strike="noStrike">
+                          <a:effectLst/>
+                        </a:rPr>
+                        <a:t>No</a:t>
+                      </a:r>
+                      <a:endParaRPr lang="da-DK" sz="1100" b="0" i="0" u="none" strike="noStrike">
+                        <a:solidFill>
+                          <a:srgbClr val="000000"/>
+                        </a:solidFill>
+                        <a:effectLst/>
+                        <a:latin typeface="Calibri" panose="020F0502020204030204" pitchFamily="34" charset="0"/>
+                      </a:endParaRPr>
+                    </a:p>
+                  </a:txBody>
+                  <a:tcPr marL="9525" marR="9525" marT="9525" marB="0" anchor="b"/>
+                </a:tc>
+                <a:tc>
+                  <a:txBody>
+                    <a:bodyPr/>
+                    <a:lstStyle/>
+                    <a:p>
+                      <a:pPr algn="r" fontAlgn="b"/>
+                      <a:r>
+                        <a:rPr lang="da-DK" sz="1100" u="none" strike="noStrike">
+                          <a:effectLst/>
+                        </a:rPr>
+                        <a:t>176,48</a:t>
+                      </a:r>
+                      <a:endParaRPr lang="da-DK" sz="1100" b="0" i="0" u="none" strike="noStrike">
+                        <a:solidFill>
+                          <a:srgbClr val="000000"/>
+                        </a:solidFill>
+                        <a:effectLst/>
+                        <a:latin typeface="Calibri" panose="020F0502020204030204" pitchFamily="34" charset="0"/>
+                      </a:endParaRPr>
+                    </a:p>
+                  </a:txBody>
+                  <a:tcPr marL="9525" marR="9525" marT="9525" marB="0" anchor="b"/>
+                </a:tc>
+                <a:extLst>
+                  <a:ext uri="{0D108BD9-81ED-4DB2-BD59-A6C34878D82A}">
+                    <a16:rowId xmlns:a16="http://schemas.microsoft.com/office/drawing/2014/main" val="1873742886"/>
+                  </a:ext>
+                </a:extLst>
+              </a:tr>
+              <a:tr h="190500">
+                <a:tc>
+                  <a:txBody>
+                    <a:bodyPr/>
+                    <a:lstStyle/>
+                    <a:p>
+                      <a:pPr algn="r" fontAlgn="b"/>
+                      <a:r>
+                        <a:rPr lang="da-DK" sz="1100" u="none" strike="noStrike">
+                          <a:effectLst/>
+                        </a:rPr>
+                        <a:t>2</a:t>
+                      </a:r>
+                      <a:endParaRPr lang="da-DK" sz="1100" b="0" i="0" u="none" strike="noStrike">
+                        <a:solidFill>
+                          <a:srgbClr val="000000"/>
+                        </a:solidFill>
+                        <a:effectLst/>
+                        <a:latin typeface="Calibri" panose="020F0502020204030204" pitchFamily="34" charset="0"/>
+                      </a:endParaRPr>
+                    </a:p>
+                  </a:txBody>
+                  <a:tcPr marL="9525" marR="9525" marT="9525" marB="0" anchor="b"/>
+                </a:tc>
+                <a:tc>
+                  <a:txBody>
+                    <a:bodyPr/>
+                    <a:lstStyle/>
+                    <a:p>
+                      <a:pPr algn="l" fontAlgn="b"/>
+                      <a:r>
+                        <a:rPr lang="da-DK" sz="1100" u="none" strike="noStrike">
+                          <a:effectLst/>
+                        </a:rPr>
+                        <a:t>Min (-24dBm)</a:t>
+                      </a:r>
+                      <a:endParaRPr lang="da-DK" sz="1100" b="0" i="0" u="none" strike="noStrike">
+                        <a:solidFill>
+                          <a:srgbClr val="000000"/>
+                        </a:solidFill>
+                        <a:effectLst/>
+                        <a:latin typeface="Calibri" panose="020F0502020204030204" pitchFamily="34" charset="0"/>
+                      </a:endParaRPr>
+                    </a:p>
+                  </a:txBody>
+                  <a:tcPr marL="9525" marR="9525" marT="9525" marB="0" anchor="b"/>
+                </a:tc>
+                <a:tc>
+                  <a:txBody>
+                    <a:bodyPr/>
+                    <a:lstStyle/>
+                    <a:p>
+                      <a:pPr algn="l" fontAlgn="b"/>
+                      <a:r>
+                        <a:rPr lang="da-DK" sz="1100" u="none" strike="noStrike" dirty="0">
+                          <a:effectLst/>
+                        </a:rPr>
+                        <a:t>No</a:t>
+                      </a:r>
+                      <a:endParaRPr lang="da-DK" sz="1100" b="0" i="0" u="none" strike="noStrike" dirty="0">
+                        <a:solidFill>
+                          <a:srgbClr val="000000"/>
+                        </a:solidFill>
+                        <a:effectLst/>
+                        <a:latin typeface="Calibri" panose="020F0502020204030204" pitchFamily="34" charset="0"/>
+                      </a:endParaRPr>
+                    </a:p>
+                  </a:txBody>
+                  <a:tcPr marL="9525" marR="9525" marT="9525" marB="0" anchor="b"/>
+                </a:tc>
+                <a:tc>
+                  <a:txBody>
+                    <a:bodyPr/>
+                    <a:lstStyle/>
+                    <a:p>
+                      <a:pPr algn="l" fontAlgn="b"/>
+                      <a:r>
+                        <a:rPr lang="da-DK" sz="1100" u="none" strike="noStrike">
+                          <a:effectLst/>
+                        </a:rPr>
+                        <a:t>No</a:t>
+                      </a:r>
+                      <a:endParaRPr lang="da-DK" sz="1100" b="0" i="0" u="none" strike="noStrike">
+                        <a:solidFill>
+                          <a:srgbClr val="000000"/>
+                        </a:solidFill>
+                        <a:effectLst/>
+                        <a:latin typeface="Calibri" panose="020F0502020204030204" pitchFamily="34" charset="0"/>
+                      </a:endParaRPr>
+                    </a:p>
+                  </a:txBody>
+                  <a:tcPr marL="9525" marR="9525" marT="9525" marB="0" anchor="b"/>
+                </a:tc>
+                <a:tc>
+                  <a:txBody>
+                    <a:bodyPr/>
+                    <a:lstStyle/>
+                    <a:p>
+                      <a:pPr algn="r" fontAlgn="b"/>
+                      <a:r>
+                        <a:rPr lang="da-DK" sz="1100" u="none" strike="noStrike">
+                          <a:effectLst/>
+                        </a:rPr>
+                        <a:t>176,52</a:t>
+                      </a:r>
+                      <a:endParaRPr lang="da-DK" sz="1100" b="0" i="0" u="none" strike="noStrike">
+                        <a:solidFill>
+                          <a:srgbClr val="000000"/>
+                        </a:solidFill>
+                        <a:effectLst/>
+                        <a:latin typeface="Calibri" panose="020F0502020204030204" pitchFamily="34" charset="0"/>
+                      </a:endParaRPr>
+                    </a:p>
+                  </a:txBody>
+                  <a:tcPr marL="9525" marR="9525" marT="9525" marB="0" anchor="b"/>
+                </a:tc>
+                <a:extLst>
+                  <a:ext uri="{0D108BD9-81ED-4DB2-BD59-A6C34878D82A}">
+                    <a16:rowId xmlns:a16="http://schemas.microsoft.com/office/drawing/2014/main" val="2010052062"/>
+                  </a:ext>
+                </a:extLst>
+              </a:tr>
+              <a:tr h="190500">
+                <a:tc>
+                  <a:txBody>
+                    <a:bodyPr/>
+                    <a:lstStyle/>
+                    <a:p>
+                      <a:pPr algn="r" fontAlgn="b"/>
+                      <a:r>
+                        <a:rPr lang="da-DK" sz="1100" u="none" strike="noStrike">
+                          <a:effectLst/>
+                        </a:rPr>
+                        <a:t>3</a:t>
+                      </a:r>
+                      <a:endParaRPr lang="da-DK" sz="1100" b="0" i="0" u="none" strike="noStrike">
+                        <a:solidFill>
+                          <a:srgbClr val="000000"/>
+                        </a:solidFill>
+                        <a:effectLst/>
+                        <a:latin typeface="Calibri" panose="020F0502020204030204" pitchFamily="34" charset="0"/>
+                      </a:endParaRPr>
+                    </a:p>
+                  </a:txBody>
+                  <a:tcPr marL="9525" marR="9525" marT="9525" marB="0" anchor="b"/>
+                </a:tc>
+                <a:tc>
+                  <a:txBody>
+                    <a:bodyPr/>
+                    <a:lstStyle/>
+                    <a:p>
+                      <a:pPr algn="l" fontAlgn="b"/>
+                      <a:r>
+                        <a:rPr lang="da-DK" sz="1100" u="none" strike="noStrike">
+                          <a:effectLst/>
+                        </a:rPr>
+                        <a:t>Max (0dBm)</a:t>
+                      </a:r>
+                      <a:endParaRPr lang="da-DK" sz="1100" b="0" i="0" u="none" strike="noStrike">
+                        <a:solidFill>
+                          <a:srgbClr val="000000"/>
+                        </a:solidFill>
+                        <a:effectLst/>
+                        <a:latin typeface="Calibri" panose="020F0502020204030204" pitchFamily="34" charset="0"/>
+                      </a:endParaRPr>
+                    </a:p>
+                  </a:txBody>
+                  <a:tcPr marL="9525" marR="9525" marT="9525" marB="0" anchor="b"/>
+                </a:tc>
+                <a:tc>
+                  <a:txBody>
+                    <a:bodyPr/>
+                    <a:lstStyle/>
+                    <a:p>
+                      <a:pPr algn="l" fontAlgn="b"/>
+                      <a:r>
+                        <a:rPr lang="da-DK" sz="1100" u="none" strike="noStrike">
+                          <a:effectLst/>
+                        </a:rPr>
+                        <a:t>Yes</a:t>
+                      </a:r>
+                      <a:endParaRPr lang="da-DK" sz="1100" b="0" i="0" u="none" strike="noStrike">
+                        <a:solidFill>
+                          <a:srgbClr val="000000"/>
+                        </a:solidFill>
+                        <a:effectLst/>
+                        <a:latin typeface="Calibri" panose="020F0502020204030204" pitchFamily="34" charset="0"/>
+                      </a:endParaRPr>
+                    </a:p>
+                  </a:txBody>
+                  <a:tcPr marL="9525" marR="9525" marT="9525" marB="0" anchor="b"/>
+                </a:tc>
+                <a:tc>
+                  <a:txBody>
+                    <a:bodyPr/>
+                    <a:lstStyle/>
+                    <a:p>
+                      <a:pPr algn="l" fontAlgn="b"/>
+                      <a:r>
+                        <a:rPr lang="da-DK" sz="1100" u="none" strike="noStrike">
+                          <a:effectLst/>
+                        </a:rPr>
+                        <a:t>No</a:t>
+                      </a:r>
+                      <a:endParaRPr lang="da-DK" sz="1100" b="0" i="0" u="none" strike="noStrike">
+                        <a:solidFill>
+                          <a:srgbClr val="000000"/>
+                        </a:solidFill>
+                        <a:effectLst/>
+                        <a:latin typeface="Calibri" panose="020F0502020204030204" pitchFamily="34" charset="0"/>
+                      </a:endParaRPr>
+                    </a:p>
+                  </a:txBody>
+                  <a:tcPr marL="9525" marR="9525" marT="9525" marB="0" anchor="b"/>
+                </a:tc>
+                <a:tc>
+                  <a:txBody>
+                    <a:bodyPr/>
+                    <a:lstStyle/>
+                    <a:p>
+                      <a:pPr algn="r" fontAlgn="b"/>
+                      <a:r>
+                        <a:rPr lang="da-DK" sz="1100" u="none" strike="noStrike">
+                          <a:effectLst/>
+                        </a:rPr>
+                        <a:t>13101,00</a:t>
+                      </a:r>
+                      <a:endParaRPr lang="da-DK" sz="1100" b="0" i="0" u="none" strike="noStrike">
+                        <a:solidFill>
+                          <a:srgbClr val="000000"/>
+                        </a:solidFill>
+                        <a:effectLst/>
+                        <a:latin typeface="Calibri" panose="020F0502020204030204" pitchFamily="34" charset="0"/>
+                      </a:endParaRPr>
+                    </a:p>
+                  </a:txBody>
+                  <a:tcPr marL="9525" marR="9525" marT="9525" marB="0" anchor="b"/>
+                </a:tc>
+                <a:extLst>
+                  <a:ext uri="{0D108BD9-81ED-4DB2-BD59-A6C34878D82A}">
+                    <a16:rowId xmlns:a16="http://schemas.microsoft.com/office/drawing/2014/main" val="4250045817"/>
+                  </a:ext>
+                </a:extLst>
+              </a:tr>
+              <a:tr h="190500">
+                <a:tc>
+                  <a:txBody>
+                    <a:bodyPr/>
+                    <a:lstStyle/>
+                    <a:p>
+                      <a:pPr algn="r" fontAlgn="b"/>
+                      <a:r>
+                        <a:rPr lang="da-DK" sz="1100" u="none" strike="noStrike">
+                          <a:effectLst/>
+                        </a:rPr>
+                        <a:t>4</a:t>
+                      </a:r>
+                      <a:endParaRPr lang="da-DK" sz="1100" b="0" i="0" u="none" strike="noStrike">
+                        <a:solidFill>
+                          <a:srgbClr val="000000"/>
+                        </a:solidFill>
+                        <a:effectLst/>
+                        <a:latin typeface="Calibri" panose="020F0502020204030204" pitchFamily="34" charset="0"/>
+                      </a:endParaRPr>
+                    </a:p>
+                  </a:txBody>
+                  <a:tcPr marL="9525" marR="9525" marT="9525" marB="0" anchor="b"/>
+                </a:tc>
+                <a:tc>
+                  <a:txBody>
+                    <a:bodyPr/>
+                    <a:lstStyle/>
+                    <a:p>
+                      <a:pPr algn="l" fontAlgn="b"/>
+                      <a:r>
+                        <a:rPr lang="da-DK" sz="1100" u="none" strike="noStrike">
+                          <a:effectLst/>
+                        </a:rPr>
+                        <a:t>Min (-24dBm)</a:t>
+                      </a:r>
+                      <a:endParaRPr lang="da-DK" sz="1100" b="0" i="0" u="none" strike="noStrike">
+                        <a:solidFill>
+                          <a:srgbClr val="000000"/>
+                        </a:solidFill>
+                        <a:effectLst/>
+                        <a:latin typeface="Calibri" panose="020F0502020204030204" pitchFamily="34" charset="0"/>
+                      </a:endParaRPr>
+                    </a:p>
+                  </a:txBody>
+                  <a:tcPr marL="9525" marR="9525" marT="9525" marB="0" anchor="b"/>
+                </a:tc>
+                <a:tc>
+                  <a:txBody>
+                    <a:bodyPr/>
+                    <a:lstStyle/>
+                    <a:p>
+                      <a:pPr algn="l" fontAlgn="b"/>
+                      <a:r>
+                        <a:rPr lang="da-DK" sz="1100" u="none" strike="noStrike">
+                          <a:effectLst/>
+                        </a:rPr>
+                        <a:t>Yes</a:t>
+                      </a:r>
+                      <a:endParaRPr lang="da-DK" sz="1100" b="0" i="0" u="none" strike="noStrike">
+                        <a:solidFill>
+                          <a:srgbClr val="000000"/>
+                        </a:solidFill>
+                        <a:effectLst/>
+                        <a:latin typeface="Calibri" panose="020F0502020204030204" pitchFamily="34" charset="0"/>
+                      </a:endParaRPr>
+                    </a:p>
+                  </a:txBody>
+                  <a:tcPr marL="9525" marR="9525" marT="9525" marB="0" anchor="b"/>
+                </a:tc>
+                <a:tc>
+                  <a:txBody>
+                    <a:bodyPr/>
+                    <a:lstStyle/>
+                    <a:p>
+                      <a:pPr algn="l" fontAlgn="b"/>
+                      <a:r>
+                        <a:rPr lang="da-DK" sz="1100" u="none" strike="noStrike">
+                          <a:effectLst/>
+                        </a:rPr>
+                        <a:t>No</a:t>
+                      </a:r>
+                      <a:endParaRPr lang="da-DK" sz="1100" b="0" i="0" u="none" strike="noStrike">
+                        <a:solidFill>
+                          <a:srgbClr val="000000"/>
+                        </a:solidFill>
+                        <a:effectLst/>
+                        <a:latin typeface="Calibri" panose="020F0502020204030204" pitchFamily="34" charset="0"/>
+                      </a:endParaRPr>
+                    </a:p>
+                  </a:txBody>
+                  <a:tcPr marL="9525" marR="9525" marT="9525" marB="0" anchor="b"/>
+                </a:tc>
+                <a:tc>
+                  <a:txBody>
+                    <a:bodyPr/>
+                    <a:lstStyle/>
+                    <a:p>
+                      <a:pPr algn="r" fontAlgn="b"/>
+                      <a:r>
+                        <a:rPr lang="da-DK" sz="1100" u="none" strike="noStrike">
+                          <a:effectLst/>
+                        </a:rPr>
+                        <a:t>13319,00</a:t>
+                      </a:r>
+                      <a:endParaRPr lang="da-DK" sz="1100" b="0" i="0" u="none" strike="noStrike">
+                        <a:solidFill>
+                          <a:srgbClr val="000000"/>
+                        </a:solidFill>
+                        <a:effectLst/>
+                        <a:latin typeface="Calibri" panose="020F0502020204030204" pitchFamily="34" charset="0"/>
+                      </a:endParaRPr>
+                    </a:p>
+                  </a:txBody>
+                  <a:tcPr marL="9525" marR="9525" marT="9525" marB="0" anchor="b"/>
+                </a:tc>
+                <a:extLst>
+                  <a:ext uri="{0D108BD9-81ED-4DB2-BD59-A6C34878D82A}">
+                    <a16:rowId xmlns:a16="http://schemas.microsoft.com/office/drawing/2014/main" val="2076959296"/>
+                  </a:ext>
+                </a:extLst>
+              </a:tr>
+              <a:tr h="190500">
+                <a:tc>
+                  <a:txBody>
+                    <a:bodyPr/>
+                    <a:lstStyle/>
+                    <a:p>
+                      <a:pPr algn="r" fontAlgn="b"/>
+                      <a:r>
+                        <a:rPr lang="da-DK" sz="1100" u="none" strike="noStrike">
+                          <a:effectLst/>
+                        </a:rPr>
+                        <a:t>5</a:t>
+                      </a:r>
+                      <a:endParaRPr lang="da-DK" sz="1100" b="0" i="0" u="none" strike="noStrike">
+                        <a:solidFill>
+                          <a:srgbClr val="000000"/>
+                        </a:solidFill>
+                        <a:effectLst/>
+                        <a:latin typeface="Calibri" panose="020F0502020204030204" pitchFamily="34" charset="0"/>
+                      </a:endParaRPr>
+                    </a:p>
+                  </a:txBody>
+                  <a:tcPr marL="9525" marR="9525" marT="9525" marB="0" anchor="b"/>
+                </a:tc>
+                <a:tc>
+                  <a:txBody>
+                    <a:bodyPr/>
+                    <a:lstStyle/>
+                    <a:p>
+                      <a:pPr algn="l" fontAlgn="b"/>
+                      <a:r>
+                        <a:rPr lang="da-DK" sz="1100" u="none" strike="noStrike">
+                          <a:effectLst/>
+                        </a:rPr>
+                        <a:t>Max (0dBm)</a:t>
+                      </a:r>
+                      <a:endParaRPr lang="da-DK" sz="1100" b="0" i="0" u="none" strike="noStrike">
+                        <a:solidFill>
+                          <a:srgbClr val="000000"/>
+                        </a:solidFill>
+                        <a:effectLst/>
+                        <a:latin typeface="Calibri" panose="020F0502020204030204" pitchFamily="34" charset="0"/>
+                      </a:endParaRPr>
+                    </a:p>
+                  </a:txBody>
+                  <a:tcPr marL="9525" marR="9525" marT="9525" marB="0" anchor="b"/>
+                </a:tc>
+                <a:tc>
+                  <a:txBody>
+                    <a:bodyPr/>
+                    <a:lstStyle/>
+                    <a:p>
+                      <a:pPr algn="l" fontAlgn="b"/>
+                      <a:r>
+                        <a:rPr lang="da-DK" sz="1100" u="none" strike="noStrike">
+                          <a:effectLst/>
+                        </a:rPr>
+                        <a:t>Yes</a:t>
+                      </a:r>
+                      <a:endParaRPr lang="da-DK" sz="1100" b="0" i="0" u="none" strike="noStrike">
+                        <a:solidFill>
+                          <a:srgbClr val="000000"/>
+                        </a:solidFill>
+                        <a:effectLst/>
+                        <a:latin typeface="Calibri" panose="020F0502020204030204" pitchFamily="34" charset="0"/>
+                      </a:endParaRPr>
+                    </a:p>
+                  </a:txBody>
+                  <a:tcPr marL="9525" marR="9525" marT="9525" marB="0" anchor="b"/>
+                </a:tc>
+                <a:tc>
+                  <a:txBody>
+                    <a:bodyPr/>
+                    <a:lstStyle/>
+                    <a:p>
+                      <a:pPr algn="l" fontAlgn="b"/>
+                      <a:r>
+                        <a:rPr lang="da-DK" sz="1100" u="none" strike="noStrike">
+                          <a:effectLst/>
+                        </a:rPr>
+                        <a:t>Yes</a:t>
+                      </a:r>
+                      <a:endParaRPr lang="da-DK" sz="1100" b="0" i="0" u="none" strike="noStrike">
+                        <a:solidFill>
+                          <a:srgbClr val="000000"/>
+                        </a:solidFill>
+                        <a:effectLst/>
+                        <a:latin typeface="Calibri" panose="020F0502020204030204" pitchFamily="34" charset="0"/>
+                      </a:endParaRPr>
+                    </a:p>
+                  </a:txBody>
+                  <a:tcPr marL="9525" marR="9525" marT="9525" marB="0" anchor="b"/>
+                </a:tc>
+                <a:tc>
+                  <a:txBody>
+                    <a:bodyPr/>
+                    <a:lstStyle/>
+                    <a:p>
+                      <a:pPr algn="r" fontAlgn="b"/>
+                      <a:r>
+                        <a:rPr lang="da-DK" sz="1100" u="none" strike="noStrike">
+                          <a:effectLst/>
+                        </a:rPr>
+                        <a:t>796,32</a:t>
+                      </a:r>
+                      <a:endParaRPr lang="da-DK" sz="1100" b="0" i="0" u="none" strike="noStrike">
+                        <a:solidFill>
+                          <a:srgbClr val="000000"/>
+                        </a:solidFill>
+                        <a:effectLst/>
+                        <a:latin typeface="Calibri" panose="020F0502020204030204" pitchFamily="34" charset="0"/>
+                      </a:endParaRPr>
+                    </a:p>
+                  </a:txBody>
+                  <a:tcPr marL="9525" marR="9525" marT="9525" marB="0" anchor="b"/>
+                </a:tc>
+                <a:extLst>
+                  <a:ext uri="{0D108BD9-81ED-4DB2-BD59-A6C34878D82A}">
+                    <a16:rowId xmlns:a16="http://schemas.microsoft.com/office/drawing/2014/main" val="1684318783"/>
+                  </a:ext>
+                </a:extLst>
+              </a:tr>
+              <a:tr h="200025">
+                <a:tc>
+                  <a:txBody>
+                    <a:bodyPr/>
+                    <a:lstStyle/>
+                    <a:p>
+                      <a:pPr algn="r" fontAlgn="b"/>
+                      <a:r>
+                        <a:rPr lang="da-DK" sz="1100" u="none" strike="noStrike">
+                          <a:effectLst/>
+                        </a:rPr>
+                        <a:t>6</a:t>
+                      </a:r>
+                      <a:endParaRPr lang="da-DK" sz="1100" b="0" i="0" u="none" strike="noStrike">
+                        <a:solidFill>
+                          <a:srgbClr val="000000"/>
+                        </a:solidFill>
+                        <a:effectLst/>
+                        <a:latin typeface="Calibri" panose="020F0502020204030204" pitchFamily="34" charset="0"/>
+                      </a:endParaRPr>
+                    </a:p>
+                  </a:txBody>
+                  <a:tcPr marL="9525" marR="9525" marT="9525" marB="0" anchor="b"/>
+                </a:tc>
+                <a:tc>
+                  <a:txBody>
+                    <a:bodyPr/>
+                    <a:lstStyle/>
+                    <a:p>
+                      <a:pPr algn="l" fontAlgn="b"/>
+                      <a:r>
+                        <a:rPr lang="da-DK" sz="1100" u="none" strike="noStrike">
+                          <a:effectLst/>
+                        </a:rPr>
+                        <a:t>Min (-24dBm)</a:t>
+                      </a:r>
+                      <a:endParaRPr lang="da-DK" sz="1100" b="0" i="0" u="none" strike="noStrike">
+                        <a:solidFill>
+                          <a:srgbClr val="000000"/>
+                        </a:solidFill>
+                        <a:effectLst/>
+                        <a:latin typeface="Calibri" panose="020F0502020204030204" pitchFamily="34" charset="0"/>
+                      </a:endParaRPr>
+                    </a:p>
+                  </a:txBody>
+                  <a:tcPr marL="9525" marR="9525" marT="9525" marB="0" anchor="b"/>
+                </a:tc>
+                <a:tc>
+                  <a:txBody>
+                    <a:bodyPr/>
+                    <a:lstStyle/>
+                    <a:p>
+                      <a:pPr algn="l" fontAlgn="b"/>
+                      <a:r>
+                        <a:rPr lang="da-DK" sz="1100" u="none" strike="noStrike">
+                          <a:effectLst/>
+                        </a:rPr>
+                        <a:t>Yes</a:t>
+                      </a:r>
+                      <a:endParaRPr lang="da-DK" sz="1100" b="0" i="0" u="none" strike="noStrike">
+                        <a:solidFill>
+                          <a:srgbClr val="000000"/>
+                        </a:solidFill>
+                        <a:effectLst/>
+                        <a:latin typeface="Calibri" panose="020F0502020204030204" pitchFamily="34" charset="0"/>
+                      </a:endParaRPr>
+                    </a:p>
+                  </a:txBody>
+                  <a:tcPr marL="9525" marR="9525" marT="9525" marB="0" anchor="b"/>
+                </a:tc>
+                <a:tc>
+                  <a:txBody>
+                    <a:bodyPr/>
+                    <a:lstStyle/>
+                    <a:p>
+                      <a:pPr algn="l" fontAlgn="b"/>
+                      <a:r>
+                        <a:rPr lang="da-DK" sz="1100" u="none" strike="noStrike">
+                          <a:effectLst/>
+                        </a:rPr>
+                        <a:t>Yes</a:t>
+                      </a:r>
+                      <a:endParaRPr lang="da-DK" sz="1100" b="0" i="0" u="none" strike="noStrike">
+                        <a:solidFill>
+                          <a:srgbClr val="000000"/>
+                        </a:solidFill>
+                        <a:effectLst/>
+                        <a:latin typeface="Calibri" panose="020F0502020204030204" pitchFamily="34" charset="0"/>
+                      </a:endParaRPr>
+                    </a:p>
+                  </a:txBody>
+                  <a:tcPr marL="9525" marR="9525" marT="9525" marB="0" anchor="b"/>
+                </a:tc>
+                <a:tc>
+                  <a:txBody>
+                    <a:bodyPr/>
+                    <a:lstStyle/>
+                    <a:p>
+                      <a:pPr algn="r" fontAlgn="b"/>
+                      <a:r>
+                        <a:rPr lang="da-DK" sz="1100" u="none" strike="noStrike" dirty="0">
+                          <a:effectLst/>
+                        </a:rPr>
+                        <a:t>797,11</a:t>
+                      </a:r>
+                      <a:endParaRPr lang="da-DK" sz="1100" b="0" i="0" u="none" strike="noStrike" dirty="0">
+                        <a:solidFill>
+                          <a:srgbClr val="000000"/>
+                        </a:solidFill>
+                        <a:effectLst/>
+                        <a:latin typeface="Calibri" panose="020F0502020204030204" pitchFamily="34" charset="0"/>
+                      </a:endParaRPr>
+                    </a:p>
+                  </a:txBody>
+                  <a:tcPr marL="9525" marR="9525" marT="9525" marB="0" anchor="b"/>
+                </a:tc>
+                <a:extLst>
+                  <a:ext uri="{0D108BD9-81ED-4DB2-BD59-A6C34878D82A}">
+                    <a16:rowId xmlns:a16="http://schemas.microsoft.com/office/drawing/2014/main" val="605236144"/>
+                  </a:ext>
+                </a:extLst>
+              </a:tr>
+            </a:tbl>
+          </a:graphicData>
+        </a:graphic>
+      </p:graphicFrame>
       <p:pic>
         <p:nvPicPr>
-          <p:cNvPr id="3" name="Picture 2">
-            <a:extLst>
-              <a:ext uri="{FF2B5EF4-FFF2-40B4-BE49-F238E27FC236}">
-                <a16:creationId xmlns:a16="http://schemas.microsoft.com/office/drawing/2014/main" id="{B3C7E81B-AE90-449D-B294-5553F1260EFD}"/>
+          <p:cNvPr id="6" name="Picture 5">
+            <a:extLst>
+              <a:ext uri="{FF2B5EF4-FFF2-40B4-BE49-F238E27FC236}">
+                <a16:creationId xmlns:a16="http://schemas.microsoft.com/office/drawing/2014/main" id="{C74AD04A-027D-4AF3-B0A0-726F309BD204}"/>
               </a:ext>
             </a:extLst>
           </p:cNvPr>
@@ -6848,16 +7843,15 @@
           </p:cNvPicPr>
           <p:nvPr/>
         </p:nvPicPr>
-        <p:blipFill>
+        <p:blipFill rotWithShape="1">
           <a:blip r:embed="rId2"/>
-          <a:stretch>
-            <a:fillRect/>
-          </a:stretch>
+          <a:srcRect l="4754" t="17407" r="6589" b="584"/>
+          <a:stretch/>
         </p:blipFill>
         <p:spPr>
           <a:xfrm>
-            <a:off x="5715561" y="724501"/>
-            <a:ext cx="6229350" cy="2228850"/>
+            <a:off x="5791062" y="3743475"/>
+            <a:ext cx="6184900" cy="3018052"/>
           </a:xfrm>
           <a:prstGeom prst="rect">
             <a:avLst/>
@@ -6866,10 +7860,10 @@
       </p:pic>
       <p:pic>
         <p:nvPicPr>
-          <p:cNvPr id="5" name="Picture 4">
-            <a:extLst>
-              <a:ext uri="{FF2B5EF4-FFF2-40B4-BE49-F238E27FC236}">
-                <a16:creationId xmlns:a16="http://schemas.microsoft.com/office/drawing/2014/main" id="{8536489A-1B2F-482D-8054-3E536A7285E8}"/>
+          <p:cNvPr id="8" name="Picture 7">
+            <a:extLst>
+              <a:ext uri="{FF2B5EF4-FFF2-40B4-BE49-F238E27FC236}">
+                <a16:creationId xmlns:a16="http://schemas.microsoft.com/office/drawing/2014/main" id="{91BB3BE5-EEFC-4FC5-B2F5-9DFA4C6EA18F}"/>
               </a:ext>
             </a:extLst>
           </p:cNvPr>
@@ -6878,22 +7872,154 @@
           </p:cNvPicPr>
           <p:nvPr/>
         </p:nvPicPr>
-        <p:blipFill>
-          <a:blip r:embed="rId3"/>
-          <a:stretch>
-            <a:fillRect/>
-          </a:stretch>
+        <p:blipFill rotWithShape="1">
+          <a:blip r:embed="rId3">
+            <a:extLst>
+              <a:ext uri="{28A0092B-C50C-407E-A947-70E740481C1C}">
+                <a14:useLocalDpi xmlns:a14="http://schemas.microsoft.com/office/drawing/2010/main" val="0"/>
+              </a:ext>
+            </a:extLst>
+          </a:blip>
+          <a:srcRect t="44402" r="10413" b="26263"/>
+          <a:stretch/>
         </p:blipFill>
         <p:spPr>
           <a:xfrm>
-            <a:off x="5715561" y="3051754"/>
-            <a:ext cx="6229350" cy="3361567"/>
+            <a:off x="5805960" y="308924"/>
+            <a:ext cx="6184900" cy="993582"/>
           </a:xfrm>
           <a:prstGeom prst="rect">
             <a:avLst/>
           </a:prstGeom>
         </p:spPr>
       </p:pic>
+      <p:sp>
+        <p:nvSpPr>
+          <p:cNvPr id="9" name="TextBox 8">
+            <a:extLst>
+              <a:ext uri="{FF2B5EF4-FFF2-40B4-BE49-F238E27FC236}">
+                <a16:creationId xmlns:a16="http://schemas.microsoft.com/office/drawing/2014/main" id="{A3B57D34-1F20-45F8-A497-3DD06CDD445F}"/>
+              </a:ext>
+            </a:extLst>
+          </p:cNvPr>
+          <p:cNvSpPr txBox="1"/>
+          <p:nvPr/>
+        </p:nvSpPr>
+        <p:spPr>
+          <a:xfrm>
+            <a:off x="6937696" y="687937"/>
+            <a:ext cx="1060868" cy="369332"/>
+          </a:xfrm>
+          <a:prstGeom prst="rect">
+            <a:avLst/>
+          </a:prstGeom>
+          <a:noFill/>
+        </p:spPr>
+        <p:txBody>
+          <a:bodyPr wrap="none" rtlCol="0">
+            <a:spAutoFit/>
+          </a:bodyPr>
+          <a:lstStyle/>
+          <a:p>
+            <a:r>
+              <a:rPr lang="da-DK" dirty="0">
+                <a:solidFill>
+                  <a:schemeClr val="bg1"/>
+                </a:solidFill>
+              </a:rPr>
+              <a:t>Radio </a:t>
+            </a:r>
+            <a:r>
+              <a:rPr lang="da-DK" dirty="0" err="1">
+                <a:solidFill>
+                  <a:schemeClr val="bg1"/>
+                </a:solidFill>
+              </a:rPr>
+              <a:t>Off</a:t>
+            </a:r>
+            <a:endParaRPr lang="da-DK" dirty="0">
+              <a:solidFill>
+                <a:schemeClr val="bg1"/>
+              </a:solidFill>
+            </a:endParaRPr>
+          </a:p>
+        </p:txBody>
+      </p:sp>
+      <p:sp>
+        <p:nvSpPr>
+          <p:cNvPr id="13" name="TextBox 12">
+            <a:extLst>
+              <a:ext uri="{FF2B5EF4-FFF2-40B4-BE49-F238E27FC236}">
+                <a16:creationId xmlns:a16="http://schemas.microsoft.com/office/drawing/2014/main" id="{EC1DAF15-A3F3-4B86-864C-F084FFF9511A}"/>
+              </a:ext>
+            </a:extLst>
+          </p:cNvPr>
+          <p:cNvSpPr txBox="1"/>
+          <p:nvPr/>
+        </p:nvSpPr>
+        <p:spPr>
+          <a:xfrm>
+            <a:off x="9975908" y="687937"/>
+            <a:ext cx="1043876" cy="369332"/>
+          </a:xfrm>
+          <a:prstGeom prst="rect">
+            <a:avLst/>
+          </a:prstGeom>
+          <a:noFill/>
+        </p:spPr>
+        <p:txBody>
+          <a:bodyPr wrap="none" rtlCol="0">
+            <a:spAutoFit/>
+          </a:bodyPr>
+          <a:lstStyle/>
+          <a:p>
+            <a:r>
+              <a:rPr lang="da-DK" dirty="0">
+                <a:solidFill>
+                  <a:schemeClr val="bg1"/>
+                </a:solidFill>
+              </a:rPr>
+              <a:t>Radio On</a:t>
+            </a:r>
+          </a:p>
+        </p:txBody>
+      </p:sp>
+      <p:sp>
+        <p:nvSpPr>
+          <p:cNvPr id="15" name="TextBox 14">
+            <a:extLst>
+              <a:ext uri="{FF2B5EF4-FFF2-40B4-BE49-F238E27FC236}">
+                <a16:creationId xmlns:a16="http://schemas.microsoft.com/office/drawing/2014/main" id="{554553E5-A934-4CB6-96E7-84AB36168D71}"/>
+              </a:ext>
+            </a:extLst>
+          </p:cNvPr>
+          <p:cNvSpPr txBox="1"/>
+          <p:nvPr/>
+        </p:nvSpPr>
+        <p:spPr>
+          <a:xfrm>
+            <a:off x="8432335" y="2061"/>
+            <a:ext cx="1162691" cy="369332"/>
+          </a:xfrm>
+          <a:prstGeom prst="rect">
+            <a:avLst/>
+          </a:prstGeom>
+          <a:noFill/>
+        </p:spPr>
+        <p:txBody>
+          <a:bodyPr wrap="none" rtlCol="0">
+            <a:spAutoFit/>
+          </a:bodyPr>
+          <a:lstStyle/>
+          <a:p>
+            <a:r>
+              <a:rPr lang="da-DK" dirty="0" err="1"/>
+              <a:t>Overshoot</a:t>
+            </a:r>
+            <a:endParaRPr lang="da-DK" dirty="0"/>
+          </a:p>
+        </p:txBody>
+      </p:sp>
     </p:spTree>
     <p:extLst>
       <p:ext uri="{BB962C8B-B14F-4D97-AF65-F5344CB8AC3E}">
@@ -6993,36 +8119,6 @@
           </a:p>
         </p:txBody>
       </p:sp>
-      <p:pic>
-        <p:nvPicPr>
-          <p:cNvPr id="4" name="Billede 3">
-            <a:extLst>
-              <a:ext uri="{FF2B5EF4-FFF2-40B4-BE49-F238E27FC236}">
-                <a16:creationId xmlns:a16="http://schemas.microsoft.com/office/drawing/2014/main" id="{587E7BFF-CF4C-46EF-8704-7F9784994B09}"/>
-              </a:ext>
-            </a:extLst>
-          </p:cNvPr>
-          <p:cNvPicPr>
-            <a:picLocks noChangeAspect="1"/>
-          </p:cNvPicPr>
-          <p:nvPr/>
-        </p:nvPicPr>
-        <p:blipFill>
-          <a:blip r:embed="rId2"/>
-          <a:stretch>
-            <a:fillRect/>
-          </a:stretch>
-        </p:blipFill>
-        <p:spPr>
-          <a:xfrm>
-            <a:off x="6076474" y="643467"/>
-            <a:ext cx="4693347" cy="5410199"/>
-          </a:xfrm>
-          <a:prstGeom prst="rect">
-            <a:avLst/>
-          </a:prstGeom>
-        </p:spPr>
-      </p:pic>
       <p:sp>
         <p:nvSpPr>
           <p:cNvPr id="2" name="Titel 1">
@@ -7064,7 +8160,7 @@
                   <a:schemeClr val="bg1"/>
                 </a:solidFill>
               </a:rPr>
-              <a:t>Power</a:t>
+              <a:t>Receive/Transmit Power</a:t>
             </a:r>
             <a:endParaRPr lang="aa-ET" sz="2800" dirty="0">
               <a:solidFill>
@@ -7108,24 +8204,396 @@
                   <a:schemeClr val="bg1"/>
                 </a:solidFill>
               </a:rPr>
-              <a:t>Sending with -25DB</a:t>
-            </a:r>
-          </a:p>
-          <a:p>
+              <a:t>“Idle” Receiving</a:t>
+            </a:r>
+          </a:p>
+          <a:p>
+            <a:pPr lvl="1"/>
+            <a:r>
+              <a:rPr lang="en-US" sz="1600" dirty="0">
+                <a:solidFill>
+                  <a:schemeClr val="bg1"/>
+                </a:solidFill>
+              </a:rPr>
+              <a:t>18,0 mA</a:t>
+            </a:r>
+          </a:p>
+          <a:p>
+            <a:r>
+              <a:rPr lang="en-US" sz="2000" dirty="0">
+                <a:solidFill>
+                  <a:schemeClr val="bg1"/>
+                </a:solidFill>
+              </a:rPr>
+              <a:t>Transmit with 0,0 dB</a:t>
+            </a:r>
+          </a:p>
+          <a:p>
+            <a:pPr lvl="1"/>
+            <a:r>
+              <a:rPr lang="en-US" sz="1600" dirty="0">
+                <a:solidFill>
+                  <a:schemeClr val="bg1"/>
+                </a:solidFill>
+              </a:rPr>
+              <a:t>8,0 mA</a:t>
+            </a:r>
+          </a:p>
+          <a:p>
+            <a:r>
+              <a:rPr lang="en-US" sz="2000" dirty="0">
+                <a:solidFill>
+                  <a:schemeClr val="bg1"/>
+                </a:solidFill>
+              </a:rPr>
+              <a:t>Transmit with -12,5 dB</a:t>
+            </a:r>
+          </a:p>
+          <a:p>
+            <a:pPr lvl="1"/>
+            <a:r>
+              <a:rPr lang="en-US" sz="1600" dirty="0">
+                <a:solidFill>
+                  <a:schemeClr val="bg1"/>
+                </a:solidFill>
+              </a:rPr>
+              <a:t> 13,0 mA</a:t>
+            </a:r>
+          </a:p>
+          <a:p>
+            <a:r>
+              <a:rPr lang="en-US" sz="2000" dirty="0">
+                <a:solidFill>
+                  <a:schemeClr val="bg1"/>
+                </a:solidFill>
+              </a:rPr>
+              <a:t>Transmit with -25,0 dB</a:t>
+            </a:r>
+          </a:p>
+          <a:p>
+            <a:pPr lvl="1"/>
+            <a:r>
+              <a:rPr lang="en-US" sz="1600" dirty="0">
+                <a:solidFill>
+                  <a:schemeClr val="bg1"/>
+                </a:solidFill>
+              </a:rPr>
+              <a:t>17,5 mA</a:t>
+            </a:r>
+          </a:p>
+          <a:p>
+            <a:pPr marL="0" indent="0">
+              <a:buNone/>
+            </a:pPr>
             <a:endParaRPr lang="en-US" sz="2000" dirty="0">
               <a:solidFill>
                 <a:schemeClr val="bg1"/>
               </a:solidFill>
             </a:endParaRPr>
           </a:p>
-          <a:p>
-            <a:r>
-              <a:rPr lang="en-US" sz="2000" dirty="0">
-                <a:solidFill>
-                  <a:schemeClr val="bg1"/>
-                </a:solidFill>
-              </a:rPr>
-              <a:t>Receiving </a:t>
+        </p:txBody>
+      </p:sp>
+      <p:pic>
+        <p:nvPicPr>
+          <p:cNvPr id="5" name="Picture 4">
+            <a:extLst>
+              <a:ext uri="{FF2B5EF4-FFF2-40B4-BE49-F238E27FC236}">
+                <a16:creationId xmlns:a16="http://schemas.microsoft.com/office/drawing/2014/main" id="{011262E8-AAA1-4E75-AEBA-E31B0E177ABA}"/>
+              </a:ext>
+            </a:extLst>
+          </p:cNvPr>
+          <p:cNvPicPr>
+            <a:picLocks noChangeAspect="1"/>
+          </p:cNvPicPr>
+          <p:nvPr/>
+        </p:nvPicPr>
+        <p:blipFill rotWithShape="1">
+          <a:blip r:embed="rId2">
+            <a:extLst>
+              <a:ext uri="{28A0092B-C50C-407E-A947-70E740481C1C}">
+                <a14:useLocalDpi xmlns:a14="http://schemas.microsoft.com/office/drawing/2010/main" val="0"/>
+              </a:ext>
+            </a:extLst>
+          </a:blip>
+          <a:srcRect l="22220" t="1926" r="23949"/>
+          <a:stretch/>
+        </p:blipFill>
+        <p:spPr>
+          <a:xfrm>
+            <a:off x="5102921" y="3833083"/>
+            <a:ext cx="3156593" cy="2928444"/>
+          </a:xfrm>
+          <a:prstGeom prst="rect">
+            <a:avLst/>
+          </a:prstGeom>
+        </p:spPr>
+      </p:pic>
+      <p:pic>
+        <p:nvPicPr>
+          <p:cNvPr id="7" name="Picture 6">
+            <a:extLst>
+              <a:ext uri="{FF2B5EF4-FFF2-40B4-BE49-F238E27FC236}">
+                <a16:creationId xmlns:a16="http://schemas.microsoft.com/office/drawing/2014/main" id="{DEA0A99F-CFC7-48AD-ADA6-8BBCBC4E6ED1}"/>
+              </a:ext>
+            </a:extLst>
+          </p:cNvPr>
+          <p:cNvPicPr>
+            <a:picLocks noChangeAspect="1"/>
+          </p:cNvPicPr>
+          <p:nvPr/>
+        </p:nvPicPr>
+        <p:blipFill rotWithShape="1">
+          <a:blip r:embed="rId3">
+            <a:extLst>
+              <a:ext uri="{28A0092B-C50C-407E-A947-70E740481C1C}">
+                <a14:useLocalDpi xmlns:a14="http://schemas.microsoft.com/office/drawing/2010/main" val="0"/>
+              </a:ext>
+            </a:extLst>
+          </a:blip>
+          <a:srcRect t="7796" r="52103" b="60"/>
+          <a:stretch/>
+        </p:blipFill>
+        <p:spPr>
+          <a:xfrm>
+            <a:off x="5102921" y="492003"/>
+            <a:ext cx="3156593" cy="2928444"/>
+          </a:xfrm>
+          <a:prstGeom prst="rect">
+            <a:avLst/>
+          </a:prstGeom>
+        </p:spPr>
+      </p:pic>
+      <p:pic>
+        <p:nvPicPr>
+          <p:cNvPr id="10" name="Picture 9">
+            <a:extLst>
+              <a:ext uri="{FF2B5EF4-FFF2-40B4-BE49-F238E27FC236}">
+                <a16:creationId xmlns:a16="http://schemas.microsoft.com/office/drawing/2014/main" id="{7F3A80E0-B048-415F-AB4C-A153E92C21CE}"/>
+              </a:ext>
+            </a:extLst>
+          </p:cNvPr>
+          <p:cNvPicPr>
+            <a:picLocks noChangeAspect="1"/>
+          </p:cNvPicPr>
+          <p:nvPr/>
+        </p:nvPicPr>
+        <p:blipFill rotWithShape="1">
+          <a:blip r:embed="rId4">
+            <a:extLst>
+              <a:ext uri="{28A0092B-C50C-407E-A947-70E740481C1C}">
+                <a14:useLocalDpi xmlns:a14="http://schemas.microsoft.com/office/drawing/2010/main" val="0"/>
+              </a:ext>
+            </a:extLst>
+          </a:blip>
+          <a:srcRect l="20574" t="1827" r="26858"/>
+          <a:stretch/>
+        </p:blipFill>
+        <p:spPr>
+          <a:xfrm>
+            <a:off x="8609790" y="492002"/>
+            <a:ext cx="3079445" cy="2928444"/>
+          </a:xfrm>
+          <a:prstGeom prst="rect">
+            <a:avLst/>
+          </a:prstGeom>
+        </p:spPr>
+      </p:pic>
+      <p:pic>
+        <p:nvPicPr>
+          <p:cNvPr id="12" name="Picture 11">
+            <a:extLst>
+              <a:ext uri="{FF2B5EF4-FFF2-40B4-BE49-F238E27FC236}">
+                <a16:creationId xmlns:a16="http://schemas.microsoft.com/office/drawing/2014/main" id="{ED22EA4C-5BCC-427A-AD1F-F631B61D1CE2}"/>
+              </a:ext>
+            </a:extLst>
+          </p:cNvPr>
+          <p:cNvPicPr>
+            <a:picLocks noChangeAspect="1"/>
+          </p:cNvPicPr>
+          <p:nvPr/>
+        </p:nvPicPr>
+        <p:blipFill rotWithShape="1">
+          <a:blip r:embed="rId5">
+            <a:extLst>
+              <a:ext uri="{28A0092B-C50C-407E-A947-70E740481C1C}">
+                <a14:useLocalDpi xmlns:a14="http://schemas.microsoft.com/office/drawing/2010/main" val="0"/>
+              </a:ext>
+            </a:extLst>
+          </a:blip>
+          <a:srcRect l="19885" t="7894" r="34015" b="243"/>
+          <a:stretch/>
+        </p:blipFill>
+        <p:spPr>
+          <a:xfrm>
+            <a:off x="8609790" y="3833083"/>
+            <a:ext cx="3079445" cy="2928444"/>
+          </a:xfrm>
+          <a:prstGeom prst="rect">
+            <a:avLst/>
+          </a:prstGeom>
+        </p:spPr>
+      </p:pic>
+      <p:sp>
+        <p:nvSpPr>
+          <p:cNvPr id="13" name="TextBox 12">
+            <a:extLst>
+              <a:ext uri="{FF2B5EF4-FFF2-40B4-BE49-F238E27FC236}">
+                <a16:creationId xmlns:a16="http://schemas.microsoft.com/office/drawing/2014/main" id="{E5E247B4-ECEA-497B-9DEB-0E12D6535242}"/>
+              </a:ext>
+            </a:extLst>
+          </p:cNvPr>
+          <p:cNvSpPr txBox="1"/>
+          <p:nvPr/>
+        </p:nvSpPr>
+        <p:spPr>
+          <a:xfrm>
+            <a:off x="5847110" y="122670"/>
+            <a:ext cx="1668214" cy="369332"/>
+          </a:xfrm>
+          <a:prstGeom prst="rect">
+            <a:avLst/>
+          </a:prstGeom>
+          <a:noFill/>
+        </p:spPr>
+        <p:txBody>
+          <a:bodyPr wrap="none" rtlCol="0">
+            <a:spAutoFit/>
+          </a:bodyPr>
+          <a:lstStyle/>
+          <a:p>
+            <a:r>
+              <a:rPr lang="da-DK" dirty="0"/>
+              <a:t>”</a:t>
+            </a:r>
+            <a:r>
+              <a:rPr lang="da-DK" dirty="0" err="1"/>
+              <a:t>Idle</a:t>
+            </a:r>
+            <a:r>
+              <a:rPr lang="da-DK" dirty="0"/>
+              <a:t>” </a:t>
+            </a:r>
+            <a:r>
+              <a:rPr lang="da-DK" dirty="0" err="1"/>
+              <a:t>Receiving</a:t>
+            </a:r>
+            <a:endParaRPr lang="da-DK" dirty="0"/>
+          </a:p>
+        </p:txBody>
+      </p:sp>
+      <p:sp>
+        <p:nvSpPr>
+          <p:cNvPr id="15" name="TextBox 14">
+            <a:extLst>
+              <a:ext uri="{FF2B5EF4-FFF2-40B4-BE49-F238E27FC236}">
+                <a16:creationId xmlns:a16="http://schemas.microsoft.com/office/drawing/2014/main" id="{AFB2501D-A3D8-45EE-A7A7-14ADB798AC36}"/>
+              </a:ext>
+            </a:extLst>
+          </p:cNvPr>
+          <p:cNvSpPr txBox="1"/>
+          <p:nvPr/>
+        </p:nvSpPr>
+        <p:spPr>
+          <a:xfrm>
+            <a:off x="9095281" y="122670"/>
+            <a:ext cx="2108462" cy="369332"/>
+          </a:xfrm>
+          <a:prstGeom prst="rect">
+            <a:avLst/>
+          </a:prstGeom>
+          <a:noFill/>
+        </p:spPr>
+        <p:txBody>
+          <a:bodyPr wrap="none" rtlCol="0">
+            <a:spAutoFit/>
+          </a:bodyPr>
+          <a:lstStyle/>
+          <a:p>
+            <a:r>
+              <a:rPr lang="da-DK" dirty="0" err="1"/>
+              <a:t>Transmit</a:t>
+            </a:r>
+            <a:r>
+              <a:rPr lang="da-DK" dirty="0"/>
+              <a:t> with 0,0 dB</a:t>
+            </a:r>
+          </a:p>
+        </p:txBody>
+      </p:sp>
+      <p:sp>
+        <p:nvSpPr>
+          <p:cNvPr id="16" name="TextBox 15">
+            <a:extLst>
+              <a:ext uri="{FF2B5EF4-FFF2-40B4-BE49-F238E27FC236}">
+                <a16:creationId xmlns:a16="http://schemas.microsoft.com/office/drawing/2014/main" id="{93002084-F56D-4370-8577-B7B1C8402038}"/>
+              </a:ext>
+            </a:extLst>
+          </p:cNvPr>
+          <p:cNvSpPr txBox="1"/>
+          <p:nvPr/>
+        </p:nvSpPr>
+        <p:spPr>
+          <a:xfrm>
+            <a:off x="9001505" y="3463751"/>
+            <a:ext cx="2296013" cy="369332"/>
+          </a:xfrm>
+          <a:prstGeom prst="rect">
+            <a:avLst/>
+          </a:prstGeom>
+          <a:noFill/>
+        </p:spPr>
+        <p:txBody>
+          <a:bodyPr wrap="none" rtlCol="0">
+            <a:spAutoFit/>
+          </a:bodyPr>
+          <a:lstStyle/>
+          <a:p>
+            <a:r>
+              <a:rPr lang="da-DK" dirty="0" err="1"/>
+              <a:t>Transmit</a:t>
+            </a:r>
+            <a:r>
+              <a:rPr lang="da-DK" dirty="0"/>
+              <a:t> with -25,0 dB</a:t>
+            </a:r>
+          </a:p>
+        </p:txBody>
+      </p:sp>
+      <p:sp>
+        <p:nvSpPr>
+          <p:cNvPr id="18" name="TextBox 17">
+            <a:extLst>
+              <a:ext uri="{FF2B5EF4-FFF2-40B4-BE49-F238E27FC236}">
+                <a16:creationId xmlns:a16="http://schemas.microsoft.com/office/drawing/2014/main" id="{852B37DD-6C80-4362-8214-A2C744B97236}"/>
+              </a:ext>
+            </a:extLst>
+          </p:cNvPr>
+          <p:cNvSpPr txBox="1"/>
+          <p:nvPr/>
+        </p:nvSpPr>
+        <p:spPr>
+          <a:xfrm>
+            <a:off x="5533210" y="3463751"/>
+            <a:ext cx="2296013" cy="369332"/>
+          </a:xfrm>
+          <a:prstGeom prst="rect">
+            <a:avLst/>
+          </a:prstGeom>
+          <a:noFill/>
+        </p:spPr>
+        <p:txBody>
+          <a:bodyPr wrap="none" rtlCol="0">
+            <a:spAutoFit/>
+          </a:bodyPr>
+          <a:lstStyle/>
+          <a:p>
+            <a:r>
+              <a:rPr lang="da-DK" dirty="0" err="1"/>
+              <a:t>Transmit</a:t>
+            </a:r>
+            <a:r>
+              <a:rPr lang="da-DK" dirty="0"/>
+              <a:t> with -12,5 dB</a:t>
             </a:r>
           </a:p>
         </p:txBody>

</xml_diff>

<commit_message>
Added arq and rssi slides
</commit_message>
<xml_diff>
--- a/Hop or not to hop.pptx
+++ b/Hop or not to hop.pptx
@@ -13,8 +13,10 @@
     <p:sldId id="265" r:id="rId7"/>
     <p:sldId id="267" r:id="rId8"/>
     <p:sldId id="260" r:id="rId9"/>
-    <p:sldId id="270" r:id="rId10"/>
-    <p:sldId id="266" r:id="rId11"/>
+    <p:sldId id="272" r:id="rId10"/>
+    <p:sldId id="271" r:id="rId11"/>
+    <p:sldId id="270" r:id="rId12"/>
+    <p:sldId id="266" r:id="rId13"/>
   </p:sldIdLst>
   <p:sldSz cx="12192000" cy="6858000"/>
   <p:notesSz cx="6858000" cy="9144000"/>
@@ -143,7 +145,7 @@
           <p:cNvPr id="2" name="Titel 1">
             <a:extLst>
               <a:ext uri="{FF2B5EF4-FFF2-40B4-BE49-F238E27FC236}">
-                <a16:creationId xmlns:a16="http://schemas.microsoft.com/office/drawing/2014/main" id="{83DA5716-1613-4DF1-82FE-924825EE9F5C}"/>
+                <a16:creationId xmlns:a16="http://schemas.microsoft.com/office/drawing/2014/main" xmlns="" id="{83DA5716-1613-4DF1-82FE-924825EE9F5C}"/>
               </a:ext>
             </a:extLst>
           </p:cNvPr>
@@ -181,7 +183,7 @@
           <p:cNvPr id="3" name="Undertitel 2">
             <a:extLst>
               <a:ext uri="{FF2B5EF4-FFF2-40B4-BE49-F238E27FC236}">
-                <a16:creationId xmlns:a16="http://schemas.microsoft.com/office/drawing/2014/main" id="{C0F2D14D-259A-4BF5-8C03-6EFE30E153BB}"/>
+                <a16:creationId xmlns:a16="http://schemas.microsoft.com/office/drawing/2014/main" xmlns="" id="{C0F2D14D-259A-4BF5-8C03-6EFE30E153BB}"/>
               </a:ext>
             </a:extLst>
           </p:cNvPr>
@@ -252,7 +254,7 @@
           <p:cNvPr id="4" name="Pladsholder til dato 3">
             <a:extLst>
               <a:ext uri="{FF2B5EF4-FFF2-40B4-BE49-F238E27FC236}">
-                <a16:creationId xmlns:a16="http://schemas.microsoft.com/office/drawing/2014/main" id="{ECB50680-33AB-444A-A427-8E011FC22546}"/>
+                <a16:creationId xmlns:a16="http://schemas.microsoft.com/office/drawing/2014/main" xmlns="" id="{ECB50680-33AB-444A-A427-8E011FC22546}"/>
               </a:ext>
             </a:extLst>
           </p:cNvPr>
@@ -270,7 +272,7 @@
           <a:p>
             <a:fld id="{C78CF14D-041E-46DD-BB74-A67E5581063B}" type="datetimeFigureOut">
               <a:rPr lang="aa-ET" smtClean="0"/>
-              <a:t>05/02/2018</a:t>
+              <a:t>02/05/2018</a:t>
             </a:fld>
             <a:endParaRPr lang="aa-ET"/>
           </a:p>
@@ -281,7 +283,7 @@
           <p:cNvPr id="5" name="Pladsholder til sidefod 4">
             <a:extLst>
               <a:ext uri="{FF2B5EF4-FFF2-40B4-BE49-F238E27FC236}">
-                <a16:creationId xmlns:a16="http://schemas.microsoft.com/office/drawing/2014/main" id="{C749EA99-CCAD-44D0-A050-E752A0E95EEA}"/>
+                <a16:creationId xmlns:a16="http://schemas.microsoft.com/office/drawing/2014/main" xmlns="" id="{C749EA99-CCAD-44D0-A050-E752A0E95EEA}"/>
               </a:ext>
             </a:extLst>
           </p:cNvPr>
@@ -306,7 +308,7 @@
           <p:cNvPr id="6" name="Pladsholder til slidenummer 5">
             <a:extLst>
               <a:ext uri="{FF2B5EF4-FFF2-40B4-BE49-F238E27FC236}">
-                <a16:creationId xmlns:a16="http://schemas.microsoft.com/office/drawing/2014/main" id="{267AC150-18CF-4939-8C57-6A16A707C52B}"/>
+                <a16:creationId xmlns:a16="http://schemas.microsoft.com/office/drawing/2014/main" xmlns="" id="{267AC150-18CF-4939-8C57-6A16A707C52B}"/>
               </a:ext>
             </a:extLst>
           </p:cNvPr>
@@ -324,7 +326,7 @@
           <a:p>
             <a:fld id="{2817A623-7236-4665-A594-D019834C30E7}" type="slidenum">
               <a:rPr lang="aa-ET" smtClean="0"/>
-              <a:t>‹nr.›</a:t>
+              <a:t>‹#›</a:t>
             </a:fld>
             <a:endParaRPr lang="aa-ET"/>
           </a:p>
@@ -365,7 +367,7 @@
           <p:cNvPr id="2" name="Titel 1">
             <a:extLst>
               <a:ext uri="{FF2B5EF4-FFF2-40B4-BE49-F238E27FC236}">
-                <a16:creationId xmlns:a16="http://schemas.microsoft.com/office/drawing/2014/main" id="{683DDF73-6641-4548-BFD6-FDC3DE6EA2BE}"/>
+                <a16:creationId xmlns:a16="http://schemas.microsoft.com/office/drawing/2014/main" xmlns="" id="{683DDF73-6641-4548-BFD6-FDC3DE6EA2BE}"/>
               </a:ext>
             </a:extLst>
           </p:cNvPr>
@@ -394,7 +396,7 @@
           <p:cNvPr id="3" name="Pladsholder til lodret titel 2">
             <a:extLst>
               <a:ext uri="{FF2B5EF4-FFF2-40B4-BE49-F238E27FC236}">
-                <a16:creationId xmlns:a16="http://schemas.microsoft.com/office/drawing/2014/main" id="{0F4F6C09-B0F4-4A0C-8C9E-6A7FA77A9455}"/>
+                <a16:creationId xmlns:a16="http://schemas.microsoft.com/office/drawing/2014/main" xmlns="" id="{0F4F6C09-B0F4-4A0C-8C9E-6A7FA77A9455}"/>
               </a:ext>
             </a:extLst>
           </p:cNvPr>
@@ -452,7 +454,7 @@
           <p:cNvPr id="4" name="Pladsholder til dato 3">
             <a:extLst>
               <a:ext uri="{FF2B5EF4-FFF2-40B4-BE49-F238E27FC236}">
-                <a16:creationId xmlns:a16="http://schemas.microsoft.com/office/drawing/2014/main" id="{0F6F7E18-171F-4A14-B01A-2035D36DFC90}"/>
+                <a16:creationId xmlns:a16="http://schemas.microsoft.com/office/drawing/2014/main" xmlns="" id="{0F6F7E18-171F-4A14-B01A-2035D36DFC90}"/>
               </a:ext>
             </a:extLst>
           </p:cNvPr>
@@ -470,7 +472,7 @@
           <a:p>
             <a:fld id="{C78CF14D-041E-46DD-BB74-A67E5581063B}" type="datetimeFigureOut">
               <a:rPr lang="aa-ET" smtClean="0"/>
-              <a:t>05/02/2018</a:t>
+              <a:t>02/05/2018</a:t>
             </a:fld>
             <a:endParaRPr lang="aa-ET"/>
           </a:p>
@@ -481,7 +483,7 @@
           <p:cNvPr id="5" name="Pladsholder til sidefod 4">
             <a:extLst>
               <a:ext uri="{FF2B5EF4-FFF2-40B4-BE49-F238E27FC236}">
-                <a16:creationId xmlns:a16="http://schemas.microsoft.com/office/drawing/2014/main" id="{EF0CA616-4E61-4237-AD45-A41F966DDA9F}"/>
+                <a16:creationId xmlns:a16="http://schemas.microsoft.com/office/drawing/2014/main" xmlns="" id="{EF0CA616-4E61-4237-AD45-A41F966DDA9F}"/>
               </a:ext>
             </a:extLst>
           </p:cNvPr>
@@ -506,7 +508,7 @@
           <p:cNvPr id="6" name="Pladsholder til slidenummer 5">
             <a:extLst>
               <a:ext uri="{FF2B5EF4-FFF2-40B4-BE49-F238E27FC236}">
-                <a16:creationId xmlns:a16="http://schemas.microsoft.com/office/drawing/2014/main" id="{A247F0AA-5781-437A-B68E-AC739C4326FC}"/>
+                <a16:creationId xmlns:a16="http://schemas.microsoft.com/office/drawing/2014/main" xmlns="" id="{A247F0AA-5781-437A-B68E-AC739C4326FC}"/>
               </a:ext>
             </a:extLst>
           </p:cNvPr>
@@ -524,7 +526,7 @@
           <a:p>
             <a:fld id="{2817A623-7236-4665-A594-D019834C30E7}" type="slidenum">
               <a:rPr lang="aa-ET" smtClean="0"/>
-              <a:t>‹nr.›</a:t>
+              <a:t>‹#›</a:t>
             </a:fld>
             <a:endParaRPr lang="aa-ET"/>
           </a:p>
@@ -565,7 +567,7 @@
           <p:cNvPr id="2" name="Lodret titel 1">
             <a:extLst>
               <a:ext uri="{FF2B5EF4-FFF2-40B4-BE49-F238E27FC236}">
-                <a16:creationId xmlns:a16="http://schemas.microsoft.com/office/drawing/2014/main" id="{7F060D18-337C-429E-99A0-11555232CC3C}"/>
+                <a16:creationId xmlns:a16="http://schemas.microsoft.com/office/drawing/2014/main" xmlns="" id="{7F060D18-337C-429E-99A0-11555232CC3C}"/>
               </a:ext>
             </a:extLst>
           </p:cNvPr>
@@ -599,7 +601,7 @@
           <p:cNvPr id="3" name="Pladsholder til lodret titel 2">
             <a:extLst>
               <a:ext uri="{FF2B5EF4-FFF2-40B4-BE49-F238E27FC236}">
-                <a16:creationId xmlns:a16="http://schemas.microsoft.com/office/drawing/2014/main" id="{9585EFE8-B7B3-4DFC-A7F5-E83F1A0856F3}"/>
+                <a16:creationId xmlns:a16="http://schemas.microsoft.com/office/drawing/2014/main" xmlns="" id="{9585EFE8-B7B3-4DFC-A7F5-E83F1A0856F3}"/>
               </a:ext>
             </a:extLst>
           </p:cNvPr>
@@ -662,7 +664,7 @@
           <p:cNvPr id="4" name="Pladsholder til dato 3">
             <a:extLst>
               <a:ext uri="{FF2B5EF4-FFF2-40B4-BE49-F238E27FC236}">
-                <a16:creationId xmlns:a16="http://schemas.microsoft.com/office/drawing/2014/main" id="{E5079CE4-0246-4267-8F82-C16FE83BDBE0}"/>
+                <a16:creationId xmlns:a16="http://schemas.microsoft.com/office/drawing/2014/main" xmlns="" id="{E5079CE4-0246-4267-8F82-C16FE83BDBE0}"/>
               </a:ext>
             </a:extLst>
           </p:cNvPr>
@@ -680,7 +682,7 @@
           <a:p>
             <a:fld id="{C78CF14D-041E-46DD-BB74-A67E5581063B}" type="datetimeFigureOut">
               <a:rPr lang="aa-ET" smtClean="0"/>
-              <a:t>05/02/2018</a:t>
+              <a:t>02/05/2018</a:t>
             </a:fld>
             <a:endParaRPr lang="aa-ET"/>
           </a:p>
@@ -691,7 +693,7 @@
           <p:cNvPr id="5" name="Pladsholder til sidefod 4">
             <a:extLst>
               <a:ext uri="{FF2B5EF4-FFF2-40B4-BE49-F238E27FC236}">
-                <a16:creationId xmlns:a16="http://schemas.microsoft.com/office/drawing/2014/main" id="{92074728-C091-4E1F-977E-A3AE3FDB2794}"/>
+                <a16:creationId xmlns:a16="http://schemas.microsoft.com/office/drawing/2014/main" xmlns="" id="{92074728-C091-4E1F-977E-A3AE3FDB2794}"/>
               </a:ext>
             </a:extLst>
           </p:cNvPr>
@@ -716,7 +718,7 @@
           <p:cNvPr id="6" name="Pladsholder til slidenummer 5">
             <a:extLst>
               <a:ext uri="{FF2B5EF4-FFF2-40B4-BE49-F238E27FC236}">
-                <a16:creationId xmlns:a16="http://schemas.microsoft.com/office/drawing/2014/main" id="{D388D3D5-5E40-4CBD-9E6C-65D36E5A178E}"/>
+                <a16:creationId xmlns:a16="http://schemas.microsoft.com/office/drawing/2014/main" xmlns="" id="{D388D3D5-5E40-4CBD-9E6C-65D36E5A178E}"/>
               </a:ext>
             </a:extLst>
           </p:cNvPr>
@@ -734,7 +736,7 @@
           <a:p>
             <a:fld id="{2817A623-7236-4665-A594-D019834C30E7}" type="slidenum">
               <a:rPr lang="aa-ET" smtClean="0"/>
-              <a:t>‹nr.›</a:t>
+              <a:t>‹#›</a:t>
             </a:fld>
             <a:endParaRPr lang="aa-ET"/>
           </a:p>
@@ -775,7 +777,7 @@
           <p:cNvPr id="2" name="Titel 1">
             <a:extLst>
               <a:ext uri="{FF2B5EF4-FFF2-40B4-BE49-F238E27FC236}">
-                <a16:creationId xmlns:a16="http://schemas.microsoft.com/office/drawing/2014/main" id="{76A9E908-CED0-4A5D-89A3-FC77EC5BB57D}"/>
+                <a16:creationId xmlns:a16="http://schemas.microsoft.com/office/drawing/2014/main" xmlns="" id="{76A9E908-CED0-4A5D-89A3-FC77EC5BB57D}"/>
               </a:ext>
             </a:extLst>
           </p:cNvPr>
@@ -804,7 +806,7 @@
           <p:cNvPr id="3" name="Pladsholder til indhold 2">
             <a:extLst>
               <a:ext uri="{FF2B5EF4-FFF2-40B4-BE49-F238E27FC236}">
-                <a16:creationId xmlns:a16="http://schemas.microsoft.com/office/drawing/2014/main" id="{E522CCA4-9C43-4B2E-8E86-DDA49D1C25CA}"/>
+                <a16:creationId xmlns:a16="http://schemas.microsoft.com/office/drawing/2014/main" xmlns="" id="{E522CCA4-9C43-4B2E-8E86-DDA49D1C25CA}"/>
               </a:ext>
             </a:extLst>
           </p:cNvPr>
@@ -862,7 +864,7 @@
           <p:cNvPr id="4" name="Pladsholder til dato 3">
             <a:extLst>
               <a:ext uri="{FF2B5EF4-FFF2-40B4-BE49-F238E27FC236}">
-                <a16:creationId xmlns:a16="http://schemas.microsoft.com/office/drawing/2014/main" id="{9C1BB299-D627-429D-AEFA-34FB7F874153}"/>
+                <a16:creationId xmlns:a16="http://schemas.microsoft.com/office/drawing/2014/main" xmlns="" id="{9C1BB299-D627-429D-AEFA-34FB7F874153}"/>
               </a:ext>
             </a:extLst>
           </p:cNvPr>
@@ -880,7 +882,7 @@
           <a:p>
             <a:fld id="{C78CF14D-041E-46DD-BB74-A67E5581063B}" type="datetimeFigureOut">
               <a:rPr lang="aa-ET" smtClean="0"/>
-              <a:t>05/02/2018</a:t>
+              <a:t>02/05/2018</a:t>
             </a:fld>
             <a:endParaRPr lang="aa-ET"/>
           </a:p>
@@ -891,7 +893,7 @@
           <p:cNvPr id="5" name="Pladsholder til sidefod 4">
             <a:extLst>
               <a:ext uri="{FF2B5EF4-FFF2-40B4-BE49-F238E27FC236}">
-                <a16:creationId xmlns:a16="http://schemas.microsoft.com/office/drawing/2014/main" id="{E5CDB3C2-6831-496C-93CE-182DB2C3E4C4}"/>
+                <a16:creationId xmlns:a16="http://schemas.microsoft.com/office/drawing/2014/main" xmlns="" id="{E5CDB3C2-6831-496C-93CE-182DB2C3E4C4}"/>
               </a:ext>
             </a:extLst>
           </p:cNvPr>
@@ -916,7 +918,7 @@
           <p:cNvPr id="6" name="Pladsholder til slidenummer 5">
             <a:extLst>
               <a:ext uri="{FF2B5EF4-FFF2-40B4-BE49-F238E27FC236}">
-                <a16:creationId xmlns:a16="http://schemas.microsoft.com/office/drawing/2014/main" id="{8D5F99A7-775A-4709-9880-DF457C43F059}"/>
+                <a16:creationId xmlns:a16="http://schemas.microsoft.com/office/drawing/2014/main" xmlns="" id="{8D5F99A7-775A-4709-9880-DF457C43F059}"/>
               </a:ext>
             </a:extLst>
           </p:cNvPr>
@@ -934,7 +936,7 @@
           <a:p>
             <a:fld id="{2817A623-7236-4665-A594-D019834C30E7}" type="slidenum">
               <a:rPr lang="aa-ET" smtClean="0"/>
-              <a:t>‹nr.›</a:t>
+              <a:t>‹#›</a:t>
             </a:fld>
             <a:endParaRPr lang="aa-ET"/>
           </a:p>
@@ -975,7 +977,7 @@
           <p:cNvPr id="2" name="Titel 1">
             <a:extLst>
               <a:ext uri="{FF2B5EF4-FFF2-40B4-BE49-F238E27FC236}">
-                <a16:creationId xmlns:a16="http://schemas.microsoft.com/office/drawing/2014/main" id="{893B5DD0-0AB6-44D1-83EA-94421DA8D720}"/>
+                <a16:creationId xmlns:a16="http://schemas.microsoft.com/office/drawing/2014/main" xmlns="" id="{893B5DD0-0AB6-44D1-83EA-94421DA8D720}"/>
               </a:ext>
             </a:extLst>
           </p:cNvPr>
@@ -1013,7 +1015,7 @@
           <p:cNvPr id="3" name="Pladsholder til tekst 2">
             <a:extLst>
               <a:ext uri="{FF2B5EF4-FFF2-40B4-BE49-F238E27FC236}">
-                <a16:creationId xmlns:a16="http://schemas.microsoft.com/office/drawing/2014/main" id="{08218ED0-7648-4B69-96EF-93ADF6D777D9}"/>
+                <a16:creationId xmlns:a16="http://schemas.microsoft.com/office/drawing/2014/main" xmlns="" id="{08218ED0-7648-4B69-96EF-93ADF6D777D9}"/>
               </a:ext>
             </a:extLst>
           </p:cNvPr>
@@ -1138,7 +1140,7 @@
           <p:cNvPr id="4" name="Pladsholder til dato 3">
             <a:extLst>
               <a:ext uri="{FF2B5EF4-FFF2-40B4-BE49-F238E27FC236}">
-                <a16:creationId xmlns:a16="http://schemas.microsoft.com/office/drawing/2014/main" id="{94A0ED5B-5158-4BF8-BB94-89EA87A634B9}"/>
+                <a16:creationId xmlns:a16="http://schemas.microsoft.com/office/drawing/2014/main" xmlns="" id="{94A0ED5B-5158-4BF8-BB94-89EA87A634B9}"/>
               </a:ext>
             </a:extLst>
           </p:cNvPr>
@@ -1156,7 +1158,7 @@
           <a:p>
             <a:fld id="{C78CF14D-041E-46DD-BB74-A67E5581063B}" type="datetimeFigureOut">
               <a:rPr lang="aa-ET" smtClean="0"/>
-              <a:t>05/02/2018</a:t>
+              <a:t>02/05/2018</a:t>
             </a:fld>
             <a:endParaRPr lang="aa-ET"/>
           </a:p>
@@ -1167,7 +1169,7 @@
           <p:cNvPr id="5" name="Pladsholder til sidefod 4">
             <a:extLst>
               <a:ext uri="{FF2B5EF4-FFF2-40B4-BE49-F238E27FC236}">
-                <a16:creationId xmlns:a16="http://schemas.microsoft.com/office/drawing/2014/main" id="{7C1F80DE-CB85-469F-95E7-1E6A7634F6BA}"/>
+                <a16:creationId xmlns:a16="http://schemas.microsoft.com/office/drawing/2014/main" xmlns="" id="{7C1F80DE-CB85-469F-95E7-1E6A7634F6BA}"/>
               </a:ext>
             </a:extLst>
           </p:cNvPr>
@@ -1192,7 +1194,7 @@
           <p:cNvPr id="6" name="Pladsholder til slidenummer 5">
             <a:extLst>
               <a:ext uri="{FF2B5EF4-FFF2-40B4-BE49-F238E27FC236}">
-                <a16:creationId xmlns:a16="http://schemas.microsoft.com/office/drawing/2014/main" id="{5A441220-9A4C-4B30-B4E0-9D93022F9BF7}"/>
+                <a16:creationId xmlns:a16="http://schemas.microsoft.com/office/drawing/2014/main" xmlns="" id="{5A441220-9A4C-4B30-B4E0-9D93022F9BF7}"/>
               </a:ext>
             </a:extLst>
           </p:cNvPr>
@@ -1210,7 +1212,7 @@
           <a:p>
             <a:fld id="{2817A623-7236-4665-A594-D019834C30E7}" type="slidenum">
               <a:rPr lang="aa-ET" smtClean="0"/>
-              <a:t>‹nr.›</a:t>
+              <a:t>‹#›</a:t>
             </a:fld>
             <a:endParaRPr lang="aa-ET"/>
           </a:p>
@@ -1251,7 +1253,7 @@
           <p:cNvPr id="2" name="Titel 1">
             <a:extLst>
               <a:ext uri="{FF2B5EF4-FFF2-40B4-BE49-F238E27FC236}">
-                <a16:creationId xmlns:a16="http://schemas.microsoft.com/office/drawing/2014/main" id="{BBD551F1-B499-4CAD-A58A-74E5F04AA319}"/>
+                <a16:creationId xmlns:a16="http://schemas.microsoft.com/office/drawing/2014/main" xmlns="" id="{BBD551F1-B499-4CAD-A58A-74E5F04AA319}"/>
               </a:ext>
             </a:extLst>
           </p:cNvPr>
@@ -1280,7 +1282,7 @@
           <p:cNvPr id="3" name="Pladsholder til indhold 2">
             <a:extLst>
               <a:ext uri="{FF2B5EF4-FFF2-40B4-BE49-F238E27FC236}">
-                <a16:creationId xmlns:a16="http://schemas.microsoft.com/office/drawing/2014/main" id="{D1AF6B27-9A6E-4F44-A9F9-01270AA0B379}"/>
+                <a16:creationId xmlns:a16="http://schemas.microsoft.com/office/drawing/2014/main" xmlns="" id="{D1AF6B27-9A6E-4F44-A9F9-01270AA0B379}"/>
               </a:ext>
             </a:extLst>
           </p:cNvPr>
@@ -1343,7 +1345,7 @@
           <p:cNvPr id="4" name="Pladsholder til indhold 3">
             <a:extLst>
               <a:ext uri="{FF2B5EF4-FFF2-40B4-BE49-F238E27FC236}">
-                <a16:creationId xmlns:a16="http://schemas.microsoft.com/office/drawing/2014/main" id="{386BCFCD-1EDF-4C6C-9E59-D0AE2B372168}"/>
+                <a16:creationId xmlns:a16="http://schemas.microsoft.com/office/drawing/2014/main" xmlns="" id="{386BCFCD-1EDF-4C6C-9E59-D0AE2B372168}"/>
               </a:ext>
             </a:extLst>
           </p:cNvPr>
@@ -1406,7 +1408,7 @@
           <p:cNvPr id="5" name="Pladsholder til dato 4">
             <a:extLst>
               <a:ext uri="{FF2B5EF4-FFF2-40B4-BE49-F238E27FC236}">
-                <a16:creationId xmlns:a16="http://schemas.microsoft.com/office/drawing/2014/main" id="{6FEB7C04-DFF4-4755-87F0-3A5F281C79AA}"/>
+                <a16:creationId xmlns:a16="http://schemas.microsoft.com/office/drawing/2014/main" xmlns="" id="{6FEB7C04-DFF4-4755-87F0-3A5F281C79AA}"/>
               </a:ext>
             </a:extLst>
           </p:cNvPr>
@@ -1424,7 +1426,7 @@
           <a:p>
             <a:fld id="{C78CF14D-041E-46DD-BB74-A67E5581063B}" type="datetimeFigureOut">
               <a:rPr lang="aa-ET" smtClean="0"/>
-              <a:t>05/02/2018</a:t>
+              <a:t>02/05/2018</a:t>
             </a:fld>
             <a:endParaRPr lang="aa-ET"/>
           </a:p>
@@ -1435,7 +1437,7 @@
           <p:cNvPr id="6" name="Pladsholder til sidefod 5">
             <a:extLst>
               <a:ext uri="{FF2B5EF4-FFF2-40B4-BE49-F238E27FC236}">
-                <a16:creationId xmlns:a16="http://schemas.microsoft.com/office/drawing/2014/main" id="{F13B01AF-4211-49EC-90E1-DB41BABBAB4C}"/>
+                <a16:creationId xmlns:a16="http://schemas.microsoft.com/office/drawing/2014/main" xmlns="" id="{F13B01AF-4211-49EC-90E1-DB41BABBAB4C}"/>
               </a:ext>
             </a:extLst>
           </p:cNvPr>
@@ -1460,7 +1462,7 @@
           <p:cNvPr id="7" name="Pladsholder til slidenummer 6">
             <a:extLst>
               <a:ext uri="{FF2B5EF4-FFF2-40B4-BE49-F238E27FC236}">
-                <a16:creationId xmlns:a16="http://schemas.microsoft.com/office/drawing/2014/main" id="{D234B871-E779-4815-ACD9-43E19D4E8A82}"/>
+                <a16:creationId xmlns:a16="http://schemas.microsoft.com/office/drawing/2014/main" xmlns="" id="{D234B871-E779-4815-ACD9-43E19D4E8A82}"/>
               </a:ext>
             </a:extLst>
           </p:cNvPr>
@@ -1478,7 +1480,7 @@
           <a:p>
             <a:fld id="{2817A623-7236-4665-A594-D019834C30E7}" type="slidenum">
               <a:rPr lang="aa-ET" smtClean="0"/>
-              <a:t>‹nr.›</a:t>
+              <a:t>‹#›</a:t>
             </a:fld>
             <a:endParaRPr lang="aa-ET"/>
           </a:p>
@@ -1519,7 +1521,7 @@
           <p:cNvPr id="2" name="Titel 1">
             <a:extLst>
               <a:ext uri="{FF2B5EF4-FFF2-40B4-BE49-F238E27FC236}">
-                <a16:creationId xmlns:a16="http://schemas.microsoft.com/office/drawing/2014/main" id="{3987BDDA-200F-4C30-B468-D02C418224EE}"/>
+                <a16:creationId xmlns:a16="http://schemas.microsoft.com/office/drawing/2014/main" xmlns="" id="{3987BDDA-200F-4C30-B468-D02C418224EE}"/>
               </a:ext>
             </a:extLst>
           </p:cNvPr>
@@ -1553,7 +1555,7 @@
           <p:cNvPr id="3" name="Pladsholder til tekst 2">
             <a:extLst>
               <a:ext uri="{FF2B5EF4-FFF2-40B4-BE49-F238E27FC236}">
-                <a16:creationId xmlns:a16="http://schemas.microsoft.com/office/drawing/2014/main" id="{5EBCB7DA-FC76-488C-981F-70E3E7CD83F0}"/>
+                <a16:creationId xmlns:a16="http://schemas.microsoft.com/office/drawing/2014/main" xmlns="" id="{5EBCB7DA-FC76-488C-981F-70E3E7CD83F0}"/>
               </a:ext>
             </a:extLst>
           </p:cNvPr>
@@ -1624,7 +1626,7 @@
           <p:cNvPr id="4" name="Pladsholder til indhold 3">
             <a:extLst>
               <a:ext uri="{FF2B5EF4-FFF2-40B4-BE49-F238E27FC236}">
-                <a16:creationId xmlns:a16="http://schemas.microsoft.com/office/drawing/2014/main" id="{0CACCCD5-BE4C-4B63-88FF-4FB395629831}"/>
+                <a16:creationId xmlns:a16="http://schemas.microsoft.com/office/drawing/2014/main" xmlns="" id="{0CACCCD5-BE4C-4B63-88FF-4FB395629831}"/>
               </a:ext>
             </a:extLst>
           </p:cNvPr>
@@ -1687,7 +1689,7 @@
           <p:cNvPr id="5" name="Pladsholder til tekst 4">
             <a:extLst>
               <a:ext uri="{FF2B5EF4-FFF2-40B4-BE49-F238E27FC236}">
-                <a16:creationId xmlns:a16="http://schemas.microsoft.com/office/drawing/2014/main" id="{E85C42D7-E544-436E-87C6-82FF67E17DD3}"/>
+                <a16:creationId xmlns:a16="http://schemas.microsoft.com/office/drawing/2014/main" xmlns="" id="{E85C42D7-E544-436E-87C6-82FF67E17DD3}"/>
               </a:ext>
             </a:extLst>
           </p:cNvPr>
@@ -1758,7 +1760,7 @@
           <p:cNvPr id="6" name="Pladsholder til indhold 5">
             <a:extLst>
               <a:ext uri="{FF2B5EF4-FFF2-40B4-BE49-F238E27FC236}">
-                <a16:creationId xmlns:a16="http://schemas.microsoft.com/office/drawing/2014/main" id="{C19A2211-DB2C-4553-9ABD-2779DBC61C0A}"/>
+                <a16:creationId xmlns:a16="http://schemas.microsoft.com/office/drawing/2014/main" xmlns="" id="{C19A2211-DB2C-4553-9ABD-2779DBC61C0A}"/>
               </a:ext>
             </a:extLst>
           </p:cNvPr>
@@ -1821,7 +1823,7 @@
           <p:cNvPr id="7" name="Pladsholder til dato 6">
             <a:extLst>
               <a:ext uri="{FF2B5EF4-FFF2-40B4-BE49-F238E27FC236}">
-                <a16:creationId xmlns:a16="http://schemas.microsoft.com/office/drawing/2014/main" id="{30149C57-74E2-4C10-8B71-4C7363E9CBB3}"/>
+                <a16:creationId xmlns:a16="http://schemas.microsoft.com/office/drawing/2014/main" xmlns="" id="{30149C57-74E2-4C10-8B71-4C7363E9CBB3}"/>
               </a:ext>
             </a:extLst>
           </p:cNvPr>
@@ -1839,7 +1841,7 @@
           <a:p>
             <a:fld id="{C78CF14D-041E-46DD-BB74-A67E5581063B}" type="datetimeFigureOut">
               <a:rPr lang="aa-ET" smtClean="0"/>
-              <a:t>05/02/2018</a:t>
+              <a:t>02/05/2018</a:t>
             </a:fld>
             <a:endParaRPr lang="aa-ET"/>
           </a:p>
@@ -1850,7 +1852,7 @@
           <p:cNvPr id="8" name="Pladsholder til sidefod 7">
             <a:extLst>
               <a:ext uri="{FF2B5EF4-FFF2-40B4-BE49-F238E27FC236}">
-                <a16:creationId xmlns:a16="http://schemas.microsoft.com/office/drawing/2014/main" id="{7F8BFB27-415E-48B4-A379-D3C496291EA4}"/>
+                <a16:creationId xmlns:a16="http://schemas.microsoft.com/office/drawing/2014/main" xmlns="" id="{7F8BFB27-415E-48B4-A379-D3C496291EA4}"/>
               </a:ext>
             </a:extLst>
           </p:cNvPr>
@@ -1875,7 +1877,7 @@
           <p:cNvPr id="9" name="Pladsholder til slidenummer 8">
             <a:extLst>
               <a:ext uri="{FF2B5EF4-FFF2-40B4-BE49-F238E27FC236}">
-                <a16:creationId xmlns:a16="http://schemas.microsoft.com/office/drawing/2014/main" id="{DA603132-ABCA-4F42-9C74-1FE11051A05B}"/>
+                <a16:creationId xmlns:a16="http://schemas.microsoft.com/office/drawing/2014/main" xmlns="" id="{DA603132-ABCA-4F42-9C74-1FE11051A05B}"/>
               </a:ext>
             </a:extLst>
           </p:cNvPr>
@@ -1893,7 +1895,7 @@
           <a:p>
             <a:fld id="{2817A623-7236-4665-A594-D019834C30E7}" type="slidenum">
               <a:rPr lang="aa-ET" smtClean="0"/>
-              <a:t>‹nr.›</a:t>
+              <a:t>‹#›</a:t>
             </a:fld>
             <a:endParaRPr lang="aa-ET"/>
           </a:p>
@@ -1934,7 +1936,7 @@
           <p:cNvPr id="2" name="Titel 1">
             <a:extLst>
               <a:ext uri="{FF2B5EF4-FFF2-40B4-BE49-F238E27FC236}">
-                <a16:creationId xmlns:a16="http://schemas.microsoft.com/office/drawing/2014/main" id="{F761509D-1E9F-4C3F-BB18-5A373F4CFD71}"/>
+                <a16:creationId xmlns:a16="http://schemas.microsoft.com/office/drawing/2014/main" xmlns="" id="{F761509D-1E9F-4C3F-BB18-5A373F4CFD71}"/>
               </a:ext>
             </a:extLst>
           </p:cNvPr>
@@ -1963,7 +1965,7 @@
           <p:cNvPr id="3" name="Pladsholder til dato 2">
             <a:extLst>
               <a:ext uri="{FF2B5EF4-FFF2-40B4-BE49-F238E27FC236}">
-                <a16:creationId xmlns:a16="http://schemas.microsoft.com/office/drawing/2014/main" id="{15EC24EA-4545-4D60-ACB8-A228500C4BBB}"/>
+                <a16:creationId xmlns:a16="http://schemas.microsoft.com/office/drawing/2014/main" xmlns="" id="{15EC24EA-4545-4D60-ACB8-A228500C4BBB}"/>
               </a:ext>
             </a:extLst>
           </p:cNvPr>
@@ -1981,7 +1983,7 @@
           <a:p>
             <a:fld id="{C78CF14D-041E-46DD-BB74-A67E5581063B}" type="datetimeFigureOut">
               <a:rPr lang="aa-ET" smtClean="0"/>
-              <a:t>05/02/2018</a:t>
+              <a:t>02/05/2018</a:t>
             </a:fld>
             <a:endParaRPr lang="aa-ET"/>
           </a:p>
@@ -1992,7 +1994,7 @@
           <p:cNvPr id="4" name="Pladsholder til sidefod 3">
             <a:extLst>
               <a:ext uri="{FF2B5EF4-FFF2-40B4-BE49-F238E27FC236}">
-                <a16:creationId xmlns:a16="http://schemas.microsoft.com/office/drawing/2014/main" id="{88C3BB90-B008-4C14-B7CA-3D85C8AD5865}"/>
+                <a16:creationId xmlns:a16="http://schemas.microsoft.com/office/drawing/2014/main" xmlns="" id="{88C3BB90-B008-4C14-B7CA-3D85C8AD5865}"/>
               </a:ext>
             </a:extLst>
           </p:cNvPr>
@@ -2017,7 +2019,7 @@
           <p:cNvPr id="5" name="Pladsholder til slidenummer 4">
             <a:extLst>
               <a:ext uri="{FF2B5EF4-FFF2-40B4-BE49-F238E27FC236}">
-                <a16:creationId xmlns:a16="http://schemas.microsoft.com/office/drawing/2014/main" id="{42677285-BDB0-40D2-B7AB-D3A84B7B9D4E}"/>
+                <a16:creationId xmlns:a16="http://schemas.microsoft.com/office/drawing/2014/main" xmlns="" id="{42677285-BDB0-40D2-B7AB-D3A84B7B9D4E}"/>
               </a:ext>
             </a:extLst>
           </p:cNvPr>
@@ -2035,7 +2037,7 @@
           <a:p>
             <a:fld id="{2817A623-7236-4665-A594-D019834C30E7}" type="slidenum">
               <a:rPr lang="aa-ET" smtClean="0"/>
-              <a:t>‹nr.›</a:t>
+              <a:t>‹#›</a:t>
             </a:fld>
             <a:endParaRPr lang="aa-ET"/>
           </a:p>
@@ -2076,7 +2078,7 @@
           <p:cNvPr id="2" name="Pladsholder til dato 1">
             <a:extLst>
               <a:ext uri="{FF2B5EF4-FFF2-40B4-BE49-F238E27FC236}">
-                <a16:creationId xmlns:a16="http://schemas.microsoft.com/office/drawing/2014/main" id="{ED250B3F-8C08-4754-9C58-567607464B25}"/>
+                <a16:creationId xmlns:a16="http://schemas.microsoft.com/office/drawing/2014/main" xmlns="" id="{ED250B3F-8C08-4754-9C58-567607464B25}"/>
               </a:ext>
             </a:extLst>
           </p:cNvPr>
@@ -2094,7 +2096,7 @@
           <a:p>
             <a:fld id="{C78CF14D-041E-46DD-BB74-A67E5581063B}" type="datetimeFigureOut">
               <a:rPr lang="aa-ET" smtClean="0"/>
-              <a:t>05/02/2018</a:t>
+              <a:t>02/05/2018</a:t>
             </a:fld>
             <a:endParaRPr lang="aa-ET"/>
           </a:p>
@@ -2105,7 +2107,7 @@
           <p:cNvPr id="3" name="Pladsholder til sidefod 2">
             <a:extLst>
               <a:ext uri="{FF2B5EF4-FFF2-40B4-BE49-F238E27FC236}">
-                <a16:creationId xmlns:a16="http://schemas.microsoft.com/office/drawing/2014/main" id="{50C50087-08C4-416C-8DF8-573E3D5D4C78}"/>
+                <a16:creationId xmlns:a16="http://schemas.microsoft.com/office/drawing/2014/main" xmlns="" id="{50C50087-08C4-416C-8DF8-573E3D5D4C78}"/>
               </a:ext>
             </a:extLst>
           </p:cNvPr>
@@ -2130,7 +2132,7 @@
           <p:cNvPr id="4" name="Pladsholder til slidenummer 3">
             <a:extLst>
               <a:ext uri="{FF2B5EF4-FFF2-40B4-BE49-F238E27FC236}">
-                <a16:creationId xmlns:a16="http://schemas.microsoft.com/office/drawing/2014/main" id="{3C47C40E-E236-4E81-955C-643804E28ED9}"/>
+                <a16:creationId xmlns:a16="http://schemas.microsoft.com/office/drawing/2014/main" xmlns="" id="{3C47C40E-E236-4E81-955C-643804E28ED9}"/>
               </a:ext>
             </a:extLst>
           </p:cNvPr>
@@ -2148,7 +2150,7 @@
           <a:p>
             <a:fld id="{2817A623-7236-4665-A594-D019834C30E7}" type="slidenum">
               <a:rPr lang="aa-ET" smtClean="0"/>
-              <a:t>‹nr.›</a:t>
+              <a:t>‹#›</a:t>
             </a:fld>
             <a:endParaRPr lang="aa-ET"/>
           </a:p>
@@ -2189,7 +2191,7 @@
           <p:cNvPr id="2" name="Titel 1">
             <a:extLst>
               <a:ext uri="{FF2B5EF4-FFF2-40B4-BE49-F238E27FC236}">
-                <a16:creationId xmlns:a16="http://schemas.microsoft.com/office/drawing/2014/main" id="{B8CAB6BE-1F33-48BC-ACC3-F8D377CFE7B5}"/>
+                <a16:creationId xmlns:a16="http://schemas.microsoft.com/office/drawing/2014/main" xmlns="" id="{B8CAB6BE-1F33-48BC-ACC3-F8D377CFE7B5}"/>
               </a:ext>
             </a:extLst>
           </p:cNvPr>
@@ -2227,7 +2229,7 @@
           <p:cNvPr id="3" name="Pladsholder til indhold 2">
             <a:extLst>
               <a:ext uri="{FF2B5EF4-FFF2-40B4-BE49-F238E27FC236}">
-                <a16:creationId xmlns:a16="http://schemas.microsoft.com/office/drawing/2014/main" id="{B22A5D56-EEB8-4540-B224-3C8BA54F9A8A}"/>
+                <a16:creationId xmlns:a16="http://schemas.microsoft.com/office/drawing/2014/main" xmlns="" id="{B22A5D56-EEB8-4540-B224-3C8BA54F9A8A}"/>
               </a:ext>
             </a:extLst>
           </p:cNvPr>
@@ -2318,7 +2320,7 @@
           <p:cNvPr id="4" name="Pladsholder til tekst 3">
             <a:extLst>
               <a:ext uri="{FF2B5EF4-FFF2-40B4-BE49-F238E27FC236}">
-                <a16:creationId xmlns:a16="http://schemas.microsoft.com/office/drawing/2014/main" id="{88AE391E-68DC-455A-A64E-ACF30903B30E}"/>
+                <a16:creationId xmlns:a16="http://schemas.microsoft.com/office/drawing/2014/main" xmlns="" id="{88AE391E-68DC-455A-A64E-ACF30903B30E}"/>
               </a:ext>
             </a:extLst>
           </p:cNvPr>
@@ -2389,7 +2391,7 @@
           <p:cNvPr id="5" name="Pladsholder til dato 4">
             <a:extLst>
               <a:ext uri="{FF2B5EF4-FFF2-40B4-BE49-F238E27FC236}">
-                <a16:creationId xmlns:a16="http://schemas.microsoft.com/office/drawing/2014/main" id="{A83B669A-A1C0-4CD2-A288-0DC3DBBA5A95}"/>
+                <a16:creationId xmlns:a16="http://schemas.microsoft.com/office/drawing/2014/main" xmlns="" id="{A83B669A-A1C0-4CD2-A288-0DC3DBBA5A95}"/>
               </a:ext>
             </a:extLst>
           </p:cNvPr>
@@ -2407,7 +2409,7 @@
           <a:p>
             <a:fld id="{C78CF14D-041E-46DD-BB74-A67E5581063B}" type="datetimeFigureOut">
               <a:rPr lang="aa-ET" smtClean="0"/>
-              <a:t>05/02/2018</a:t>
+              <a:t>02/05/2018</a:t>
             </a:fld>
             <a:endParaRPr lang="aa-ET"/>
           </a:p>
@@ -2418,7 +2420,7 @@
           <p:cNvPr id="6" name="Pladsholder til sidefod 5">
             <a:extLst>
               <a:ext uri="{FF2B5EF4-FFF2-40B4-BE49-F238E27FC236}">
-                <a16:creationId xmlns:a16="http://schemas.microsoft.com/office/drawing/2014/main" id="{CA72206F-5A01-4A27-A41F-494574FCA1EE}"/>
+                <a16:creationId xmlns:a16="http://schemas.microsoft.com/office/drawing/2014/main" xmlns="" id="{CA72206F-5A01-4A27-A41F-494574FCA1EE}"/>
               </a:ext>
             </a:extLst>
           </p:cNvPr>
@@ -2443,7 +2445,7 @@
           <p:cNvPr id="7" name="Pladsholder til slidenummer 6">
             <a:extLst>
               <a:ext uri="{FF2B5EF4-FFF2-40B4-BE49-F238E27FC236}">
-                <a16:creationId xmlns:a16="http://schemas.microsoft.com/office/drawing/2014/main" id="{711701F3-479D-4B39-BABF-7F564A46B881}"/>
+                <a16:creationId xmlns:a16="http://schemas.microsoft.com/office/drawing/2014/main" xmlns="" id="{711701F3-479D-4B39-BABF-7F564A46B881}"/>
               </a:ext>
             </a:extLst>
           </p:cNvPr>
@@ -2461,7 +2463,7 @@
           <a:p>
             <a:fld id="{2817A623-7236-4665-A594-D019834C30E7}" type="slidenum">
               <a:rPr lang="aa-ET" smtClean="0"/>
-              <a:t>‹nr.›</a:t>
+              <a:t>‹#›</a:t>
             </a:fld>
             <a:endParaRPr lang="aa-ET"/>
           </a:p>
@@ -2502,7 +2504,7 @@
           <p:cNvPr id="2" name="Titel 1">
             <a:extLst>
               <a:ext uri="{FF2B5EF4-FFF2-40B4-BE49-F238E27FC236}">
-                <a16:creationId xmlns:a16="http://schemas.microsoft.com/office/drawing/2014/main" id="{8F75623F-0E14-4329-A74C-9CF88B1203F4}"/>
+                <a16:creationId xmlns:a16="http://schemas.microsoft.com/office/drawing/2014/main" xmlns="" id="{8F75623F-0E14-4329-A74C-9CF88B1203F4}"/>
               </a:ext>
             </a:extLst>
           </p:cNvPr>
@@ -2540,7 +2542,7 @@
           <p:cNvPr id="3" name="Pladsholder til billede 2">
             <a:extLst>
               <a:ext uri="{FF2B5EF4-FFF2-40B4-BE49-F238E27FC236}">
-                <a16:creationId xmlns:a16="http://schemas.microsoft.com/office/drawing/2014/main" id="{7C008369-B664-4B99-A10B-18D730F8BC40}"/>
+                <a16:creationId xmlns:a16="http://schemas.microsoft.com/office/drawing/2014/main" xmlns="" id="{7C008369-B664-4B99-A10B-18D730F8BC40}"/>
               </a:ext>
             </a:extLst>
           </p:cNvPr>
@@ -2607,7 +2609,7 @@
           <p:cNvPr id="4" name="Pladsholder til tekst 3">
             <a:extLst>
               <a:ext uri="{FF2B5EF4-FFF2-40B4-BE49-F238E27FC236}">
-                <a16:creationId xmlns:a16="http://schemas.microsoft.com/office/drawing/2014/main" id="{1E8213EF-C11F-446C-B3D0-022C7FC4AF7E}"/>
+                <a16:creationId xmlns:a16="http://schemas.microsoft.com/office/drawing/2014/main" xmlns="" id="{1E8213EF-C11F-446C-B3D0-022C7FC4AF7E}"/>
               </a:ext>
             </a:extLst>
           </p:cNvPr>
@@ -2678,7 +2680,7 @@
           <p:cNvPr id="5" name="Pladsholder til dato 4">
             <a:extLst>
               <a:ext uri="{FF2B5EF4-FFF2-40B4-BE49-F238E27FC236}">
-                <a16:creationId xmlns:a16="http://schemas.microsoft.com/office/drawing/2014/main" id="{D7C658B9-ADF9-4487-B757-1C8C8D178535}"/>
+                <a16:creationId xmlns:a16="http://schemas.microsoft.com/office/drawing/2014/main" xmlns="" id="{D7C658B9-ADF9-4487-B757-1C8C8D178535}"/>
               </a:ext>
             </a:extLst>
           </p:cNvPr>
@@ -2696,7 +2698,7 @@
           <a:p>
             <a:fld id="{C78CF14D-041E-46DD-BB74-A67E5581063B}" type="datetimeFigureOut">
               <a:rPr lang="aa-ET" smtClean="0"/>
-              <a:t>05/02/2018</a:t>
+              <a:t>02/05/2018</a:t>
             </a:fld>
             <a:endParaRPr lang="aa-ET"/>
           </a:p>
@@ -2707,7 +2709,7 @@
           <p:cNvPr id="6" name="Pladsholder til sidefod 5">
             <a:extLst>
               <a:ext uri="{FF2B5EF4-FFF2-40B4-BE49-F238E27FC236}">
-                <a16:creationId xmlns:a16="http://schemas.microsoft.com/office/drawing/2014/main" id="{96E96B75-5E26-4D70-8F89-390D3955ACE2}"/>
+                <a16:creationId xmlns:a16="http://schemas.microsoft.com/office/drawing/2014/main" xmlns="" id="{96E96B75-5E26-4D70-8F89-390D3955ACE2}"/>
               </a:ext>
             </a:extLst>
           </p:cNvPr>
@@ -2732,7 +2734,7 @@
           <p:cNvPr id="7" name="Pladsholder til slidenummer 6">
             <a:extLst>
               <a:ext uri="{FF2B5EF4-FFF2-40B4-BE49-F238E27FC236}">
-                <a16:creationId xmlns:a16="http://schemas.microsoft.com/office/drawing/2014/main" id="{C60E841F-CB94-4AFD-B597-08D945070020}"/>
+                <a16:creationId xmlns:a16="http://schemas.microsoft.com/office/drawing/2014/main" xmlns="" id="{C60E841F-CB94-4AFD-B597-08D945070020}"/>
               </a:ext>
             </a:extLst>
           </p:cNvPr>
@@ -2750,7 +2752,7 @@
           <a:p>
             <a:fld id="{2817A623-7236-4665-A594-D019834C30E7}" type="slidenum">
               <a:rPr lang="aa-ET" smtClean="0"/>
-              <a:t>‹nr.›</a:t>
+              <a:t>‹#›</a:t>
             </a:fld>
             <a:endParaRPr lang="aa-ET"/>
           </a:p>
@@ -2796,7 +2798,7 @@
           <p:cNvPr id="2" name="Pladsholder til titel 1">
             <a:extLst>
               <a:ext uri="{FF2B5EF4-FFF2-40B4-BE49-F238E27FC236}">
-                <a16:creationId xmlns:a16="http://schemas.microsoft.com/office/drawing/2014/main" id="{3FA4AED4-20DF-475F-A5B9-6361C0877BF8}"/>
+                <a16:creationId xmlns:a16="http://schemas.microsoft.com/office/drawing/2014/main" xmlns="" id="{3FA4AED4-20DF-475F-A5B9-6361C0877BF8}"/>
               </a:ext>
             </a:extLst>
           </p:cNvPr>
@@ -2835,7 +2837,7 @@
           <p:cNvPr id="3" name="Pladsholder til tekst 2">
             <a:extLst>
               <a:ext uri="{FF2B5EF4-FFF2-40B4-BE49-F238E27FC236}">
-                <a16:creationId xmlns:a16="http://schemas.microsoft.com/office/drawing/2014/main" id="{C7050EAC-6B71-4482-B365-976D574AE415}"/>
+                <a16:creationId xmlns:a16="http://schemas.microsoft.com/office/drawing/2014/main" xmlns="" id="{C7050EAC-6B71-4482-B365-976D574AE415}"/>
               </a:ext>
             </a:extLst>
           </p:cNvPr>
@@ -2903,7 +2905,7 @@
           <p:cNvPr id="4" name="Pladsholder til dato 3">
             <a:extLst>
               <a:ext uri="{FF2B5EF4-FFF2-40B4-BE49-F238E27FC236}">
-                <a16:creationId xmlns:a16="http://schemas.microsoft.com/office/drawing/2014/main" id="{C2DA935C-C0C8-4B49-B1EA-FF82C5E4A83E}"/>
+                <a16:creationId xmlns:a16="http://schemas.microsoft.com/office/drawing/2014/main" xmlns="" id="{C2DA935C-C0C8-4B49-B1EA-FF82C5E4A83E}"/>
               </a:ext>
             </a:extLst>
           </p:cNvPr>
@@ -2939,7 +2941,7 @@
           <a:p>
             <a:fld id="{C78CF14D-041E-46DD-BB74-A67E5581063B}" type="datetimeFigureOut">
               <a:rPr lang="aa-ET" smtClean="0"/>
-              <a:t>05/02/2018</a:t>
+              <a:t>02/05/2018</a:t>
             </a:fld>
             <a:endParaRPr lang="aa-ET"/>
           </a:p>
@@ -2950,7 +2952,7 @@
           <p:cNvPr id="5" name="Pladsholder til sidefod 4">
             <a:extLst>
               <a:ext uri="{FF2B5EF4-FFF2-40B4-BE49-F238E27FC236}">
-                <a16:creationId xmlns:a16="http://schemas.microsoft.com/office/drawing/2014/main" id="{6C1F3EE7-5FB0-4025-A528-D7434E59F65E}"/>
+                <a16:creationId xmlns:a16="http://schemas.microsoft.com/office/drawing/2014/main" xmlns="" id="{6C1F3EE7-5FB0-4025-A528-D7434E59F65E}"/>
               </a:ext>
             </a:extLst>
           </p:cNvPr>
@@ -2993,7 +2995,7 @@
           <p:cNvPr id="6" name="Pladsholder til slidenummer 5">
             <a:extLst>
               <a:ext uri="{FF2B5EF4-FFF2-40B4-BE49-F238E27FC236}">
-                <a16:creationId xmlns:a16="http://schemas.microsoft.com/office/drawing/2014/main" id="{8F938C54-19BB-4DCC-A029-4695BBD15E4E}"/>
+                <a16:creationId xmlns:a16="http://schemas.microsoft.com/office/drawing/2014/main" xmlns="" id="{8F938C54-19BB-4DCC-A029-4695BBD15E4E}"/>
               </a:ext>
             </a:extLst>
           </p:cNvPr>
@@ -3029,7 +3031,7 @@
           <a:p>
             <a:fld id="{2817A623-7236-4665-A594-D019834C30E7}" type="slidenum">
               <a:rPr lang="aa-ET" smtClean="0"/>
-              <a:t>‹nr.›</a:t>
+              <a:t>‹#›</a:t>
             </a:fld>
             <a:endParaRPr lang="aa-ET"/>
           </a:p>
@@ -3369,7 +3371,7 @@
           <p:cNvPr id="10" name="Rectangle 9">
             <a:extLst>
               <a:ext uri="{FF2B5EF4-FFF2-40B4-BE49-F238E27FC236}">
-                <a16:creationId xmlns:a16="http://schemas.microsoft.com/office/drawing/2014/main" id="{6753252F-4873-4F63-801D-CC719279A7D5}"/>
+                <a16:creationId xmlns:a16="http://schemas.microsoft.com/office/drawing/2014/main" xmlns="" id="{6753252F-4873-4F63-801D-CC719279A7D5}"/>
               </a:ext>
             </a:extLst>
           </p:cNvPr>
@@ -3379,7 +3381,7 @@
           <p:nvPr>
             <p:extLst>
               <p:ext uri="{386F3935-93C4-4BCD-93E2-E3B085C9AB24}">
-                <p16:designElem xmlns:p16="http://schemas.microsoft.com/office/powerpoint/2015/main" val="1"/>
+                <p16:designElem xmlns:p16="http://schemas.microsoft.com/office/powerpoint/2015/main" xmlns="" val="1"/>
               </p:ext>
             </p:extLst>
           </p:nvPr>
@@ -3429,7 +3431,7 @@
           <p:cNvPr id="12" name="Rectangle 11">
             <a:extLst>
               <a:ext uri="{FF2B5EF4-FFF2-40B4-BE49-F238E27FC236}">
-                <a16:creationId xmlns:a16="http://schemas.microsoft.com/office/drawing/2014/main" id="{047C8CCB-F95D-4249-92DD-651249D3535A}"/>
+                <a16:creationId xmlns:a16="http://schemas.microsoft.com/office/drawing/2014/main" xmlns="" id="{047C8CCB-F95D-4249-92DD-651249D3535A}"/>
               </a:ext>
             </a:extLst>
           </p:cNvPr>
@@ -3439,7 +3441,7 @@
           <p:nvPr>
             <p:extLst>
               <p:ext uri="{386F3935-93C4-4BCD-93E2-E3B085C9AB24}">
-                <p16:designElem xmlns:p16="http://schemas.microsoft.com/office/powerpoint/2015/main" val="1"/>
+                <p16:designElem xmlns:p16="http://schemas.microsoft.com/office/powerpoint/2015/main" xmlns="" val="1"/>
               </p:ext>
             </p:extLst>
           </p:nvPr>
@@ -3489,7 +3491,7 @@
           <p:cNvPr id="5" name="Billede 4">
             <a:extLst>
               <a:ext uri="{FF2B5EF4-FFF2-40B4-BE49-F238E27FC236}">
-                <a16:creationId xmlns:a16="http://schemas.microsoft.com/office/drawing/2014/main" id="{E17B0ADA-7545-4640-BDBD-913B05D2092C}"/>
+                <a16:creationId xmlns:a16="http://schemas.microsoft.com/office/drawing/2014/main" xmlns="" id="{E17B0ADA-7545-4640-BDBD-913B05D2092C}"/>
               </a:ext>
             </a:extLst>
           </p:cNvPr>
@@ -3525,7 +3527,7 @@
           <p:cNvPr id="2" name="Titel 1">
             <a:extLst>
               <a:ext uri="{FF2B5EF4-FFF2-40B4-BE49-F238E27FC236}">
-                <a16:creationId xmlns:a16="http://schemas.microsoft.com/office/drawing/2014/main" id="{D0FE11DB-6070-4804-BE97-6EC5D33B84F9}"/>
+                <a16:creationId xmlns:a16="http://schemas.microsoft.com/office/drawing/2014/main" xmlns="" id="{D0FE11DB-6070-4804-BE97-6EC5D33B84F9}"/>
               </a:ext>
             </a:extLst>
           </p:cNvPr>
@@ -3588,6 +3590,656 @@
 </file>
 
 <file path=ppt/slides/slide10.xml><?xml version="1.0" encoding="utf-8"?>
+<p:sld xmlns:a="http://schemas.openxmlformats.org/drawingml/2006/main" xmlns:r="http://schemas.openxmlformats.org/officeDocument/2006/relationships" xmlns:p="http://schemas.openxmlformats.org/presentationml/2006/main">
+  <p:cSld>
+    <p:spTree>
+      <p:nvGrpSpPr>
+        <p:cNvPr id="1" name=""/>
+        <p:cNvGrpSpPr/>
+        <p:nvPr/>
+      </p:nvGrpSpPr>
+      <p:grpSpPr>
+        <a:xfrm>
+          <a:off x="0" y="0"/>
+          <a:ext cx="0" cy="0"/>
+          <a:chOff x="0" y="0"/>
+          <a:chExt cx="0" cy="0"/>
+        </a:xfrm>
+      </p:grpSpPr>
+      <p:sp>
+        <p:nvSpPr>
+          <p:cNvPr id="4" name="Rectangle 3">
+            <a:extLst>
+              <a:ext uri="{FF2B5EF4-FFF2-40B4-BE49-F238E27FC236}">
+                <a16:creationId xmlns:a16="http://schemas.microsoft.com/office/drawing/2014/main" xmlns="" id="{867D4867-5BA7-4462-B2F6-A23F4A622AA7}"/>
+              </a:ext>
+            </a:extLst>
+          </p:cNvPr>
+          <p:cNvSpPr>
+            <a:spLocks noGrp="1" noRot="1" noChangeAspect="1" noMove="1" noResize="1" noEditPoints="1" noAdjustHandles="1" noChangeArrowheads="1" noChangeShapeType="1" noTextEdit="1"/>
+          </p:cNvSpPr>
+          <p:nvPr>
+            <p:extLst>
+              <p:ext uri="{386F3935-93C4-4BCD-93E2-E3B085C9AB24}">
+                <p16:designElem xmlns:p16="http://schemas.microsoft.com/office/powerpoint/2015/main" xmlns="" val="1"/>
+              </p:ext>
+            </p:extLst>
+          </p:nvPr>
+        </p:nvSpPr>
+        <p:spPr>
+          <a:xfrm>
+            <a:off x="0" y="0"/>
+            <a:ext cx="4654296" cy="6858000"/>
+          </a:xfrm>
+          <a:prstGeom prst="rect">
+            <a:avLst/>
+          </a:prstGeom>
+          <a:solidFill>
+            <a:schemeClr val="tx1">
+              <a:lumMod val="75000"/>
+              <a:lumOff val="25000"/>
+            </a:schemeClr>
+          </a:solidFill>
+          <a:ln>
+            <a:noFill/>
+          </a:ln>
+        </p:spPr>
+        <p:style>
+          <a:lnRef idx="0">
+            <a:scrgbClr r="0" g="0" b="0"/>
+          </a:lnRef>
+          <a:fillRef idx="0">
+            <a:scrgbClr r="0" g="0" b="0"/>
+          </a:fillRef>
+          <a:effectRef idx="0">
+            <a:scrgbClr r="0" g="0" b="0"/>
+          </a:effectRef>
+          <a:fontRef idx="minor">
+            <a:schemeClr val="lt1"/>
+          </a:fontRef>
+        </p:style>
+        <p:txBody>
+          <a:bodyPr rtlCol="0" anchor="ctr"/>
+          <a:lstStyle/>
+          <a:p>
+            <a:pPr algn="ctr"/>
+            <a:endParaRPr lang="en-US"/>
+          </a:p>
+        </p:txBody>
+      </p:sp>
+      <p:pic>
+        <p:nvPicPr>
+          <p:cNvPr id="5" name="Picture 4">
+            <a:extLst>
+              <a:ext uri="{FF2B5EF4-FFF2-40B4-BE49-F238E27FC236}">
+                <a16:creationId xmlns:a16="http://schemas.microsoft.com/office/drawing/2014/main" xmlns="" id="{B29B5DD1-0262-4872-844E-5166BEC99EC6}"/>
+              </a:ext>
+            </a:extLst>
+          </p:cNvPr>
+          <p:cNvPicPr/>
+          <p:nvPr/>
+        </p:nvPicPr>
+        <p:blipFill>
+          <a:blip r:embed="rId2"/>
+          <a:stretch>
+            <a:fillRect/>
+          </a:stretch>
+        </p:blipFill>
+        <p:spPr>
+          <a:xfrm>
+            <a:off x="5678505" y="143443"/>
+            <a:ext cx="5581971" cy="3154561"/>
+          </a:xfrm>
+          <a:prstGeom prst="rect">
+            <a:avLst/>
+          </a:prstGeom>
+        </p:spPr>
+      </p:pic>
+      <p:pic>
+        <p:nvPicPr>
+          <p:cNvPr id="10" name="Picture 9"/>
+          <p:cNvPicPr>
+            <a:picLocks noChangeAspect="1"/>
+          </p:cNvPicPr>
+          <p:nvPr/>
+        </p:nvPicPr>
+        <p:blipFill>
+          <a:blip r:embed="rId3"/>
+          <a:stretch>
+            <a:fillRect/>
+          </a:stretch>
+        </p:blipFill>
+        <p:spPr>
+          <a:xfrm>
+            <a:off x="6109802" y="3429000"/>
+            <a:ext cx="5048250" cy="3267075"/>
+          </a:xfrm>
+          <a:prstGeom prst="rect">
+            <a:avLst/>
+          </a:prstGeom>
+        </p:spPr>
+      </p:pic>
+      <p:sp>
+        <p:nvSpPr>
+          <p:cNvPr id="12" name="Titel 1">
+            <a:extLst>
+              <a:ext uri="{FF2B5EF4-FFF2-40B4-BE49-F238E27FC236}">
+                <a16:creationId xmlns:a16="http://schemas.microsoft.com/office/drawing/2014/main" xmlns="" id="{9FB4A506-2702-4600-A2CA-F98C4422D0FA}"/>
+              </a:ext>
+            </a:extLst>
+          </p:cNvPr>
+          <p:cNvSpPr>
+            <a:spLocks noGrp="1"/>
+          </p:cNvSpPr>
+          <p:nvPr>
+            <p:ph type="title"/>
+          </p:nvPr>
+        </p:nvSpPr>
+        <p:spPr>
+          <a:xfrm>
+            <a:off x="643467" y="643467"/>
+            <a:ext cx="3363974" cy="1597315"/>
+          </a:xfrm>
+          <a:noFill/>
+          <a:ln w="19050">
+            <a:solidFill>
+              <a:schemeClr val="bg1"/>
+            </a:solidFill>
+          </a:ln>
+        </p:spPr>
+        <p:txBody>
+          <a:bodyPr wrap="square">
+            <a:normAutofit/>
+          </a:bodyPr>
+          <a:lstStyle/>
+          <a:p>
+            <a:pPr algn="ctr"/>
+            <a:r>
+              <a:rPr lang="en-US" sz="2800" dirty="0" smtClean="0">
+                <a:solidFill>
+                  <a:schemeClr val="bg1"/>
+                </a:solidFill>
+              </a:rPr>
+              <a:t>To hop or not – the algorithm</a:t>
+            </a:r>
+            <a:endParaRPr lang="aa-ET" sz="2800" dirty="0">
+              <a:solidFill>
+                <a:schemeClr val="bg1"/>
+              </a:solidFill>
+            </a:endParaRPr>
+          </a:p>
+        </p:txBody>
+      </p:sp>
+      <p:sp>
+        <p:nvSpPr>
+          <p:cNvPr id="13" name="Content Placeholder 8">
+            <a:extLst>
+              <a:ext uri="{FF2B5EF4-FFF2-40B4-BE49-F238E27FC236}">
+                <a16:creationId xmlns:a16="http://schemas.microsoft.com/office/drawing/2014/main" xmlns="" id="{CA83A435-01F2-4983-A087-5E0473CD6185}"/>
+              </a:ext>
+            </a:extLst>
+          </p:cNvPr>
+          <p:cNvSpPr>
+            <a:spLocks noGrp="1"/>
+          </p:cNvSpPr>
+          <p:nvPr>
+            <p:ph idx="1"/>
+          </p:nvPr>
+        </p:nvSpPr>
+        <p:spPr>
+          <a:xfrm>
+            <a:off x="491816" y="2591391"/>
+            <a:ext cx="3324404" cy="3415622"/>
+          </a:xfrm>
+        </p:spPr>
+        <p:txBody>
+          <a:bodyPr>
+            <a:normAutofit/>
+          </a:bodyPr>
+          <a:lstStyle/>
+          <a:p>
+            <a:r>
+              <a:rPr lang="en-US" sz="2000" dirty="0" smtClean="0">
+                <a:solidFill>
+                  <a:schemeClr val="bg1"/>
+                </a:solidFill>
+              </a:rPr>
+              <a:t>Indicators we used:</a:t>
+            </a:r>
+          </a:p>
+          <a:p>
+            <a:pPr lvl="1"/>
+            <a:r>
+              <a:rPr lang="en-US" sz="1600" dirty="0" smtClean="0">
+                <a:solidFill>
+                  <a:schemeClr val="bg1"/>
+                </a:solidFill>
+              </a:rPr>
+              <a:t>Signal strength (RSSI, the RF input power in </a:t>
+            </a:r>
+            <a:r>
+              <a:rPr lang="en-US" sz="1600" dirty="0" err="1" smtClean="0">
+                <a:solidFill>
+                  <a:schemeClr val="bg1"/>
+                </a:solidFill>
+              </a:rPr>
+              <a:t>dbm</a:t>
+            </a:r>
+            <a:r>
+              <a:rPr lang="en-US" sz="1600" dirty="0" smtClean="0">
+                <a:solidFill>
+                  <a:schemeClr val="bg1"/>
+                </a:solidFill>
+              </a:rPr>
+              <a:t> – </a:t>
+            </a:r>
+            <a:r>
+              <a:rPr lang="en-US" sz="1600" dirty="0">
+                <a:solidFill>
+                  <a:schemeClr val="bg1"/>
+                </a:solidFill>
+              </a:rPr>
+              <a:t>45</a:t>
+            </a:r>
+            <a:r>
+              <a:rPr lang="en-US" sz="1600" dirty="0" smtClean="0">
+                <a:solidFill>
+                  <a:schemeClr val="bg1"/>
+                </a:solidFill>
+              </a:rPr>
+              <a:t>. Threshold level is -84dBm.</a:t>
+            </a:r>
+            <a:endParaRPr lang="en-US" sz="1600" dirty="0">
+              <a:solidFill>
+                <a:schemeClr val="bg1"/>
+              </a:solidFill>
+            </a:endParaRPr>
+          </a:p>
+          <a:p>
+            <a:pPr lvl="1"/>
+            <a:r>
+              <a:rPr lang="en-US" sz="1600" dirty="0" smtClean="0">
+                <a:solidFill>
+                  <a:schemeClr val="bg1"/>
+                </a:solidFill>
+              </a:rPr>
+              <a:t>Dropped packets (errors)</a:t>
+            </a:r>
+          </a:p>
+          <a:p>
+            <a:pPr lvl="1"/>
+            <a:r>
+              <a:rPr lang="en-US" sz="1600" dirty="0" smtClean="0">
+                <a:solidFill>
+                  <a:schemeClr val="bg1"/>
+                </a:solidFill>
+              </a:rPr>
+              <a:t>History of past events.</a:t>
+            </a:r>
+            <a:endParaRPr lang="en-US" sz="2000" dirty="0" smtClean="0">
+              <a:solidFill>
+                <a:schemeClr val="bg1"/>
+              </a:solidFill>
+            </a:endParaRPr>
+          </a:p>
+          <a:p>
+            <a:r>
+              <a:rPr lang="en-US" sz="2000" dirty="0" smtClean="0">
+                <a:solidFill>
+                  <a:schemeClr val="bg1"/>
+                </a:solidFill>
+              </a:rPr>
+              <a:t>Other useful indicators:</a:t>
+            </a:r>
+          </a:p>
+          <a:p>
+            <a:pPr lvl="1"/>
+            <a:r>
+              <a:rPr lang="en-US" sz="1600" dirty="0" smtClean="0">
+                <a:solidFill>
+                  <a:schemeClr val="bg1"/>
+                </a:solidFill>
+              </a:rPr>
+              <a:t>Link quality (LQI)</a:t>
+            </a:r>
+          </a:p>
+          <a:p>
+            <a:pPr lvl="1"/>
+            <a:r>
+              <a:rPr lang="en-US" sz="1600" dirty="0" smtClean="0">
+                <a:solidFill>
+                  <a:schemeClr val="bg1"/>
+                </a:solidFill>
+              </a:rPr>
+              <a:t>Location of runner</a:t>
+            </a:r>
+            <a:endParaRPr lang="en-US" sz="1600" dirty="0">
+              <a:solidFill>
+                <a:schemeClr val="bg1"/>
+              </a:solidFill>
+            </a:endParaRPr>
+          </a:p>
+          <a:p>
+            <a:pPr marL="0" indent="0">
+              <a:buNone/>
+            </a:pPr>
+            <a:endParaRPr lang="en-US" sz="2000" dirty="0">
+              <a:solidFill>
+                <a:schemeClr val="bg1"/>
+              </a:solidFill>
+            </a:endParaRPr>
+          </a:p>
+        </p:txBody>
+      </p:sp>
+    </p:spTree>
+    <p:extLst>
+      <p:ext uri="{BB962C8B-B14F-4D97-AF65-F5344CB8AC3E}">
+        <p14:creationId xmlns:p14="http://schemas.microsoft.com/office/powerpoint/2010/main" val="1041248191"/>
+      </p:ext>
+    </p:extLst>
+  </p:cSld>
+  <p:clrMapOvr>
+    <a:masterClrMapping/>
+  </p:clrMapOvr>
+</p:sld>
+</file>
+
+<file path=ppt/slides/slide11.xml><?xml version="1.0" encoding="utf-8"?>
+<p:sld xmlns:a="http://schemas.openxmlformats.org/drawingml/2006/main" xmlns:r="http://schemas.openxmlformats.org/officeDocument/2006/relationships" xmlns:p="http://schemas.openxmlformats.org/presentationml/2006/main">
+  <p:cSld>
+    <p:bg>
+      <p:bgPr>
+        <a:solidFill>
+          <a:schemeClr val="bg1"/>
+        </a:solidFill>
+        <a:effectLst/>
+      </p:bgPr>
+    </p:bg>
+    <p:spTree>
+      <p:nvGrpSpPr>
+        <p:cNvPr id="1" name=""/>
+        <p:cNvGrpSpPr/>
+        <p:nvPr/>
+      </p:nvGrpSpPr>
+      <p:grpSpPr>
+        <a:xfrm>
+          <a:off x="0" y="0"/>
+          <a:ext cx="0" cy="0"/>
+          <a:chOff x="0" y="0"/>
+          <a:chExt cx="0" cy="0"/>
+        </a:xfrm>
+      </p:grpSpPr>
+      <p:sp>
+        <p:nvSpPr>
+          <p:cNvPr id="22" name="Rectangle 21">
+            <a:extLst>
+              <a:ext uri="{FF2B5EF4-FFF2-40B4-BE49-F238E27FC236}">
+                <a16:creationId xmlns:a16="http://schemas.microsoft.com/office/drawing/2014/main" xmlns="" id="{867D4867-5BA7-4462-B2F6-A23F4A622AA7}"/>
+              </a:ext>
+            </a:extLst>
+          </p:cNvPr>
+          <p:cNvSpPr>
+            <a:spLocks noGrp="1" noRot="1" noChangeAspect="1" noMove="1" noResize="1" noEditPoints="1" noAdjustHandles="1" noChangeArrowheads="1" noChangeShapeType="1" noTextEdit="1"/>
+          </p:cNvSpPr>
+          <p:nvPr>
+            <p:extLst>
+              <p:ext uri="{386F3935-93C4-4BCD-93E2-E3B085C9AB24}">
+                <p16:designElem xmlns:p16="http://schemas.microsoft.com/office/powerpoint/2015/main" xmlns="" val="1"/>
+              </p:ext>
+            </p:extLst>
+          </p:nvPr>
+        </p:nvSpPr>
+        <p:spPr>
+          <a:xfrm>
+            <a:off x="0" y="0"/>
+            <a:ext cx="4654296" cy="6858000"/>
+          </a:xfrm>
+          <a:prstGeom prst="rect">
+            <a:avLst/>
+          </a:prstGeom>
+          <a:solidFill>
+            <a:schemeClr val="tx1">
+              <a:lumMod val="75000"/>
+              <a:lumOff val="25000"/>
+            </a:schemeClr>
+          </a:solidFill>
+          <a:ln>
+            <a:noFill/>
+          </a:ln>
+        </p:spPr>
+        <p:style>
+          <a:lnRef idx="0">
+            <a:scrgbClr r="0" g="0" b="0"/>
+          </a:lnRef>
+          <a:fillRef idx="0">
+            <a:scrgbClr r="0" g="0" b="0"/>
+          </a:fillRef>
+          <a:effectRef idx="0">
+            <a:scrgbClr r="0" g="0" b="0"/>
+          </a:effectRef>
+          <a:fontRef idx="minor">
+            <a:schemeClr val="lt1"/>
+          </a:fontRef>
+        </p:style>
+        <p:txBody>
+          <a:bodyPr rtlCol="0" anchor="ctr"/>
+          <a:lstStyle/>
+          <a:p>
+            <a:pPr algn="ctr"/>
+            <a:endParaRPr lang="en-US"/>
+          </a:p>
+        </p:txBody>
+      </p:sp>
+      <p:pic>
+        <p:nvPicPr>
+          <p:cNvPr id="4" name="Billede 3">
+            <a:extLst>
+              <a:ext uri="{FF2B5EF4-FFF2-40B4-BE49-F238E27FC236}">
+                <a16:creationId xmlns:a16="http://schemas.microsoft.com/office/drawing/2014/main" xmlns="" id="{3F9CE619-F003-4C99-BDC0-326C4E384054}"/>
+              </a:ext>
+            </a:extLst>
+          </p:cNvPr>
+          <p:cNvPicPr>
+            <a:picLocks noChangeAspect="1"/>
+          </p:cNvPicPr>
+          <p:nvPr/>
+        </p:nvPicPr>
+        <p:blipFill>
+          <a:blip r:embed="rId2">
+            <a:extLst>
+              <a:ext uri="{28A0092B-C50C-407E-A947-70E740481C1C}">
+                <a14:useLocalDpi xmlns:a14="http://schemas.microsoft.com/office/drawing/2010/main" val="0"/>
+              </a:ext>
+            </a:extLst>
+          </a:blip>
+          <a:stretch>
+            <a:fillRect/>
+          </a:stretch>
+        </p:blipFill>
+        <p:spPr>
+          <a:xfrm>
+            <a:off x="5297763" y="1270186"/>
+            <a:ext cx="6250769" cy="4156761"/>
+          </a:xfrm>
+          <a:prstGeom prst="rect">
+            <a:avLst/>
+          </a:prstGeom>
+        </p:spPr>
+      </p:pic>
+      <p:sp>
+        <p:nvSpPr>
+          <p:cNvPr id="2" name="Titel 1">
+            <a:extLst>
+              <a:ext uri="{FF2B5EF4-FFF2-40B4-BE49-F238E27FC236}">
+                <a16:creationId xmlns:a16="http://schemas.microsoft.com/office/drawing/2014/main" xmlns="" id="{9FB4A506-2702-4600-A2CA-F98C4422D0FA}"/>
+              </a:ext>
+            </a:extLst>
+          </p:cNvPr>
+          <p:cNvSpPr>
+            <a:spLocks noGrp="1"/>
+          </p:cNvSpPr>
+          <p:nvPr>
+            <p:ph type="title"/>
+          </p:nvPr>
+        </p:nvSpPr>
+        <p:spPr>
+          <a:xfrm>
+            <a:off x="643467" y="643467"/>
+            <a:ext cx="3363974" cy="1597315"/>
+          </a:xfrm>
+          <a:noFill/>
+          <a:ln w="19050">
+            <a:solidFill>
+              <a:schemeClr val="bg1"/>
+            </a:solidFill>
+          </a:ln>
+        </p:spPr>
+        <p:txBody>
+          <a:bodyPr wrap="square">
+            <a:normAutofit/>
+          </a:bodyPr>
+          <a:lstStyle/>
+          <a:p>
+            <a:pPr algn="ctr"/>
+            <a:r>
+              <a:rPr lang="en-US" sz="2800" dirty="0">
+                <a:solidFill>
+                  <a:schemeClr val="bg1"/>
+                </a:solidFill>
+              </a:rPr>
+              <a:t>Results</a:t>
+            </a:r>
+            <a:endParaRPr lang="aa-ET" sz="2800" dirty="0">
+              <a:solidFill>
+                <a:schemeClr val="bg1"/>
+              </a:solidFill>
+            </a:endParaRPr>
+          </a:p>
+        </p:txBody>
+      </p:sp>
+      <p:sp>
+        <p:nvSpPr>
+          <p:cNvPr id="9" name="Content Placeholder 8">
+            <a:extLst>
+              <a:ext uri="{FF2B5EF4-FFF2-40B4-BE49-F238E27FC236}">
+                <a16:creationId xmlns:a16="http://schemas.microsoft.com/office/drawing/2014/main" xmlns="" id="{CA83A435-01F2-4983-A087-5E0473CD6185}"/>
+              </a:ext>
+            </a:extLst>
+          </p:cNvPr>
+          <p:cNvSpPr>
+            <a:spLocks noGrp="1"/>
+          </p:cNvSpPr>
+          <p:nvPr>
+            <p:ph idx="1"/>
+          </p:nvPr>
+        </p:nvSpPr>
+        <p:spPr>
+          <a:xfrm>
+            <a:off x="643468" y="2638044"/>
+            <a:ext cx="3363974" cy="3415622"/>
+          </a:xfrm>
+        </p:spPr>
+        <p:txBody>
+          <a:bodyPr>
+            <a:normAutofit/>
+          </a:bodyPr>
+          <a:lstStyle/>
+          <a:p>
+            <a:pPr marL="0" indent="0">
+              <a:buNone/>
+            </a:pPr>
+            <a:endParaRPr lang="en-US" sz="2000" dirty="0">
+              <a:solidFill>
+                <a:schemeClr val="bg1"/>
+              </a:solidFill>
+            </a:endParaRPr>
+          </a:p>
+          <a:p>
+            <a:r>
+              <a:rPr lang="en-US" sz="2000" dirty="0">
+                <a:solidFill>
+                  <a:schemeClr val="bg1"/>
+                </a:solidFill>
+              </a:rPr>
+              <a:t>Best to hop when</a:t>
+            </a:r>
+          </a:p>
+          <a:p>
+            <a:pPr lvl="1"/>
+            <a:r>
+              <a:rPr lang="en-US" sz="1600" dirty="0">
+                <a:solidFill>
+                  <a:schemeClr val="bg1"/>
+                </a:solidFill>
+              </a:rPr>
+              <a:t>Out of range</a:t>
+            </a:r>
+          </a:p>
+          <a:p>
+            <a:pPr lvl="1"/>
+            <a:r>
+              <a:rPr lang="en-US" sz="1600" dirty="0">
+                <a:solidFill>
+                  <a:schemeClr val="bg1"/>
+                </a:solidFill>
+              </a:rPr>
+              <a:t>RSSI -40</a:t>
+            </a:r>
+          </a:p>
+          <a:p>
+            <a:pPr lvl="1"/>
+            <a:r>
+              <a:rPr lang="en-US" sz="1600" dirty="0">
+                <a:solidFill>
+                  <a:schemeClr val="bg1"/>
+                </a:solidFill>
+              </a:rPr>
+              <a:t>Deep fading</a:t>
+            </a:r>
+          </a:p>
+          <a:p>
+            <a:endParaRPr lang="en-US" sz="2000" dirty="0">
+              <a:solidFill>
+                <a:schemeClr val="bg1"/>
+              </a:solidFill>
+            </a:endParaRPr>
+          </a:p>
+          <a:p>
+            <a:r>
+              <a:rPr lang="en-US" sz="2000" dirty="0">
+                <a:solidFill>
+                  <a:schemeClr val="bg1"/>
+                </a:solidFill>
+              </a:rPr>
+              <a:t>The antenna is expensive battery wise.</a:t>
+            </a:r>
+          </a:p>
+          <a:p>
+            <a:pPr marL="0" indent="0">
+              <a:buNone/>
+            </a:pPr>
+            <a:endParaRPr lang="en-US" sz="2000" dirty="0">
+              <a:solidFill>
+                <a:schemeClr val="bg1"/>
+              </a:solidFill>
+            </a:endParaRPr>
+          </a:p>
+        </p:txBody>
+      </p:sp>
+    </p:spTree>
+    <p:extLst>
+      <p:ext uri="{BB962C8B-B14F-4D97-AF65-F5344CB8AC3E}">
+        <p14:creationId xmlns:p14="http://schemas.microsoft.com/office/powerpoint/2010/main" val="1801400649"/>
+      </p:ext>
+    </p:extLst>
+  </p:cSld>
+  <p:clrMapOvr>
+    <a:masterClrMapping/>
+  </p:clrMapOvr>
+</p:sld>
+</file>
+
+<file path=ppt/slides/slide12.xml><?xml version="1.0" encoding="utf-8"?>
 <p:sld xmlns:a="http://schemas.openxmlformats.org/drawingml/2006/main" xmlns:r="http://schemas.openxmlformats.org/officeDocument/2006/relationships" xmlns:p="http://schemas.openxmlformats.org/presentationml/2006/main">
   <p:cSld>
     <p:bg>
@@ -3620,7 +4272,7 @@
           <p:cNvPr id="28" name="Freeform: Shape 27">
             <a:extLst>
               <a:ext uri="{FF2B5EF4-FFF2-40B4-BE49-F238E27FC236}">
-                <a16:creationId xmlns:a16="http://schemas.microsoft.com/office/drawing/2014/main" id="{E862BE82-D00D-42C1-BF16-93AA37870C32}"/>
+                <a16:creationId xmlns:a16="http://schemas.microsoft.com/office/drawing/2014/main" xmlns="" id="{E862BE82-D00D-42C1-BF16-93AA37870C32}"/>
               </a:ext>
             </a:extLst>
           </p:cNvPr>
@@ -3630,7 +4282,7 @@
           <p:nvPr>
             <p:extLst>
               <p:ext uri="{386F3935-93C4-4BCD-93E2-E3B085C9AB24}">
-                <p16:designElem xmlns:p16="http://schemas.microsoft.com/office/powerpoint/2015/main" val="1"/>
+                <p16:designElem xmlns:p16="http://schemas.microsoft.com/office/powerpoint/2015/main" xmlns="" val="1"/>
               </p:ext>
             </p:extLst>
           </p:nvPr>
@@ -3784,7 +4436,7 @@
           <p:cNvPr id="30" name="Freeform: Shape 29">
             <a:extLst>
               <a:ext uri="{FF2B5EF4-FFF2-40B4-BE49-F238E27FC236}">
-                <a16:creationId xmlns:a16="http://schemas.microsoft.com/office/drawing/2014/main" id="{F6D92C2D-1D3D-4974-918C-06579FB354A9}"/>
+                <a16:creationId xmlns:a16="http://schemas.microsoft.com/office/drawing/2014/main" xmlns="" id="{F6D92C2D-1D3D-4974-918C-06579FB354A9}"/>
               </a:ext>
             </a:extLst>
           </p:cNvPr>
@@ -3794,7 +4446,7 @@
           <p:nvPr>
             <p:extLst>
               <p:ext uri="{386F3935-93C4-4BCD-93E2-E3B085C9AB24}">
-                <p16:designElem xmlns:p16="http://schemas.microsoft.com/office/powerpoint/2015/main" val="1"/>
+                <p16:designElem xmlns:p16="http://schemas.microsoft.com/office/powerpoint/2015/main" xmlns="" val="1"/>
               </p:ext>
             </p:extLst>
           </p:nvPr>
@@ -3950,7 +4602,7 @@
           <p:cNvPr id="9" name="Picture 8">
             <a:extLst>
               <a:ext uri="{FF2B5EF4-FFF2-40B4-BE49-F238E27FC236}">
-                <a16:creationId xmlns:a16="http://schemas.microsoft.com/office/drawing/2014/main" id="{B29B5DD1-0262-4872-844E-5166BEC99EC6}"/>
+                <a16:creationId xmlns:a16="http://schemas.microsoft.com/office/drawing/2014/main" xmlns="" id="{B29B5DD1-0262-4872-844E-5166BEC99EC6}"/>
               </a:ext>
             </a:extLst>
           </p:cNvPr>
@@ -3978,7 +4630,7 @@
           <p:cNvPr id="2" name="Titel 1">
             <a:extLst>
               <a:ext uri="{FF2B5EF4-FFF2-40B4-BE49-F238E27FC236}">
-                <a16:creationId xmlns:a16="http://schemas.microsoft.com/office/drawing/2014/main" id="{3E1A747B-9675-4981-ACB2-9927B952BFB3}"/>
+                <a16:creationId xmlns:a16="http://schemas.microsoft.com/office/drawing/2014/main" xmlns="" id="{3E1A747B-9675-4981-ACB2-9927B952BFB3}"/>
               </a:ext>
             </a:extLst>
           </p:cNvPr>
@@ -4014,7 +4666,7 @@
           <p:cNvPr id="14" name="Content Placeholder 9">
             <a:extLst>
               <a:ext uri="{FF2B5EF4-FFF2-40B4-BE49-F238E27FC236}">
-                <a16:creationId xmlns:a16="http://schemas.microsoft.com/office/drawing/2014/main" id="{F6FD5C6F-1FDA-48CD-BEC0-12B68866E584}"/>
+                <a16:creationId xmlns:a16="http://schemas.microsoft.com/office/drawing/2014/main" xmlns="" id="{F6FD5C6F-1FDA-48CD-BEC0-12B68866E584}"/>
               </a:ext>
             </a:extLst>
           </p:cNvPr>
@@ -4146,7 +4798,7 @@
           <p:cNvPr id="13" name="Rectangle 12">
             <a:extLst>
               <a:ext uri="{FF2B5EF4-FFF2-40B4-BE49-F238E27FC236}">
-                <a16:creationId xmlns:a16="http://schemas.microsoft.com/office/drawing/2014/main" id="{867D4867-5BA7-4462-B2F6-A23F4A622AA7}"/>
+                <a16:creationId xmlns:a16="http://schemas.microsoft.com/office/drawing/2014/main" xmlns="" id="{867D4867-5BA7-4462-B2F6-A23F4A622AA7}"/>
               </a:ext>
             </a:extLst>
           </p:cNvPr>
@@ -4156,7 +4808,7 @@
           <p:nvPr>
             <p:extLst>
               <p:ext uri="{386F3935-93C4-4BCD-93E2-E3B085C9AB24}">
-                <p16:designElem xmlns:p16="http://schemas.microsoft.com/office/powerpoint/2015/main" val="1"/>
+                <p16:designElem xmlns:p16="http://schemas.microsoft.com/office/powerpoint/2015/main" xmlns="" val="1"/>
               </p:ext>
             </p:extLst>
           </p:nvPr>
@@ -4207,7 +4859,7 @@
           <p:cNvPr id="12" name="Pladsholder til indhold 4">
             <a:extLst>
               <a:ext uri="{FF2B5EF4-FFF2-40B4-BE49-F238E27FC236}">
-                <a16:creationId xmlns:a16="http://schemas.microsoft.com/office/drawing/2014/main" id="{22500B17-2276-435F-82C8-3471B0D75421}"/>
+                <a16:creationId xmlns:a16="http://schemas.microsoft.com/office/drawing/2014/main" xmlns="" id="{22500B17-2276-435F-82C8-3471B0D75421}"/>
               </a:ext>
             </a:extLst>
           </p:cNvPr>
@@ -4243,7 +4895,7 @@
           <p:cNvPr id="2" name="Titel 1">
             <a:extLst>
               <a:ext uri="{FF2B5EF4-FFF2-40B4-BE49-F238E27FC236}">
-                <a16:creationId xmlns:a16="http://schemas.microsoft.com/office/drawing/2014/main" id="{3E1A747B-9675-4981-ACB2-9927B952BFB3}"/>
+                <a16:creationId xmlns:a16="http://schemas.microsoft.com/office/drawing/2014/main" xmlns="" id="{3E1A747B-9675-4981-ACB2-9927B952BFB3}"/>
               </a:ext>
             </a:extLst>
           </p:cNvPr>
@@ -4294,7 +4946,7 @@
           <p:cNvPr id="14" name="Content Placeholder 9">
             <a:extLst>
               <a:ext uri="{FF2B5EF4-FFF2-40B4-BE49-F238E27FC236}">
-                <a16:creationId xmlns:a16="http://schemas.microsoft.com/office/drawing/2014/main" id="{F6FD5C6F-1FDA-48CD-BEC0-12B68866E584}"/>
+                <a16:creationId xmlns:a16="http://schemas.microsoft.com/office/drawing/2014/main" xmlns="" id="{F6FD5C6F-1FDA-48CD-BEC0-12B68866E584}"/>
               </a:ext>
             </a:extLst>
           </p:cNvPr>
@@ -4427,7 +5079,7 @@
           <p:cNvPr id="6" name="Picture 5">
             <a:extLst>
               <a:ext uri="{FF2B5EF4-FFF2-40B4-BE49-F238E27FC236}">
-                <a16:creationId xmlns:a16="http://schemas.microsoft.com/office/drawing/2014/main" id="{B73A3533-9974-4865-B57E-EF2F540AF4AA}"/>
+                <a16:creationId xmlns:a16="http://schemas.microsoft.com/office/drawing/2014/main" xmlns="" id="{B73A3533-9974-4865-B57E-EF2F540AF4AA}"/>
               </a:ext>
             </a:extLst>
           </p:cNvPr>
@@ -4455,7 +5107,7 @@
           <p:cNvPr id="7" name="Content Placeholder 3">
             <a:extLst>
               <a:ext uri="{FF2B5EF4-FFF2-40B4-BE49-F238E27FC236}">
-                <a16:creationId xmlns:a16="http://schemas.microsoft.com/office/drawing/2014/main" id="{3644AC71-A229-4066-8000-22652A69991D}"/>
+                <a16:creationId xmlns:a16="http://schemas.microsoft.com/office/drawing/2014/main" xmlns="" id="{3644AC71-A229-4066-8000-22652A69991D}"/>
               </a:ext>
             </a:extLst>
           </p:cNvPr>
@@ -4485,7 +5137,7 @@
           <p:cNvPr id="13" name="Rectangle 12">
             <a:extLst>
               <a:ext uri="{FF2B5EF4-FFF2-40B4-BE49-F238E27FC236}">
-                <a16:creationId xmlns:a16="http://schemas.microsoft.com/office/drawing/2014/main" id="{867D4867-5BA7-4462-B2F6-A23F4A622AA7}"/>
+                <a16:creationId xmlns:a16="http://schemas.microsoft.com/office/drawing/2014/main" xmlns="" id="{867D4867-5BA7-4462-B2F6-A23F4A622AA7}"/>
               </a:ext>
             </a:extLst>
           </p:cNvPr>
@@ -4495,7 +5147,7 @@
           <p:nvPr>
             <p:extLst>
               <p:ext uri="{386F3935-93C4-4BCD-93E2-E3B085C9AB24}">
-                <p16:designElem xmlns:p16="http://schemas.microsoft.com/office/powerpoint/2015/main" val="1"/>
+                <p16:designElem xmlns:p16="http://schemas.microsoft.com/office/powerpoint/2015/main" xmlns="" val="1"/>
               </p:ext>
             </p:extLst>
           </p:nvPr>
@@ -4546,7 +5198,7 @@
           <p:cNvPr id="2" name="Titel 1">
             <a:extLst>
               <a:ext uri="{FF2B5EF4-FFF2-40B4-BE49-F238E27FC236}">
-                <a16:creationId xmlns:a16="http://schemas.microsoft.com/office/drawing/2014/main" id="{3E1A747B-9675-4981-ACB2-9927B952BFB3}"/>
+                <a16:creationId xmlns:a16="http://schemas.microsoft.com/office/drawing/2014/main" xmlns="" id="{3E1A747B-9675-4981-ACB2-9927B952BFB3}"/>
               </a:ext>
             </a:extLst>
           </p:cNvPr>
@@ -4584,6 +5236,14 @@
               </a:rPr>
               <a:t>Base Station</a:t>
             </a:r>
+            <a:r>
+              <a:rPr lang="en-US" sz="2800">
+                <a:solidFill>
+                  <a:schemeClr val="bg1"/>
+                </a:solidFill>
+              </a:rPr>
+              <a:t/>
+            </a:r>
             <a:br>
               <a:rPr lang="en-US" sz="2800">
                 <a:solidFill>
@@ -4612,7 +5272,7 @@
           <p:cNvPr id="14" name="Content Placeholder 9">
             <a:extLst>
               <a:ext uri="{FF2B5EF4-FFF2-40B4-BE49-F238E27FC236}">
-                <a16:creationId xmlns:a16="http://schemas.microsoft.com/office/drawing/2014/main" id="{F6FD5C6F-1FDA-48CD-BEC0-12B68866E584}"/>
+                <a16:creationId xmlns:a16="http://schemas.microsoft.com/office/drawing/2014/main" xmlns="" id="{F6FD5C6F-1FDA-48CD-BEC0-12B68866E584}"/>
               </a:ext>
             </a:extLst>
           </p:cNvPr>
@@ -4760,7 +5420,7 @@
           <p:cNvPr id="8" name="Picture 7">
             <a:extLst>
               <a:ext uri="{FF2B5EF4-FFF2-40B4-BE49-F238E27FC236}">
-                <a16:creationId xmlns:a16="http://schemas.microsoft.com/office/drawing/2014/main" id="{E7BD49E1-7905-4BCB-B9CF-B6B8080DF5E0}"/>
+                <a16:creationId xmlns:a16="http://schemas.microsoft.com/office/drawing/2014/main" xmlns="" id="{E7BD49E1-7905-4BCB-B9CF-B6B8080DF5E0}"/>
               </a:ext>
             </a:extLst>
           </p:cNvPr>
@@ -4826,7 +5486,7 @@
           <p:cNvPr id="13" name="Rectangle 12">
             <a:extLst>
               <a:ext uri="{FF2B5EF4-FFF2-40B4-BE49-F238E27FC236}">
-                <a16:creationId xmlns:a16="http://schemas.microsoft.com/office/drawing/2014/main" id="{867D4867-5BA7-4462-B2F6-A23F4A622AA7}"/>
+                <a16:creationId xmlns:a16="http://schemas.microsoft.com/office/drawing/2014/main" xmlns="" id="{867D4867-5BA7-4462-B2F6-A23F4A622AA7}"/>
               </a:ext>
             </a:extLst>
           </p:cNvPr>
@@ -4836,7 +5496,7 @@
           <p:nvPr>
             <p:extLst>
               <p:ext uri="{386F3935-93C4-4BCD-93E2-E3B085C9AB24}">
-                <p16:designElem xmlns:p16="http://schemas.microsoft.com/office/powerpoint/2015/main" val="1"/>
+                <p16:designElem xmlns:p16="http://schemas.microsoft.com/office/powerpoint/2015/main" xmlns="" val="1"/>
               </p:ext>
             </p:extLst>
           </p:nvPr>
@@ -4887,7 +5547,7 @@
           <p:cNvPr id="2" name="Titel 1">
             <a:extLst>
               <a:ext uri="{FF2B5EF4-FFF2-40B4-BE49-F238E27FC236}">
-                <a16:creationId xmlns:a16="http://schemas.microsoft.com/office/drawing/2014/main" id="{3E1A747B-9675-4981-ACB2-9927B952BFB3}"/>
+                <a16:creationId xmlns:a16="http://schemas.microsoft.com/office/drawing/2014/main" xmlns="" id="{3E1A747B-9675-4981-ACB2-9927B952BFB3}"/>
               </a:ext>
             </a:extLst>
           </p:cNvPr>
@@ -4968,7 +5628,7 @@
           <p:cNvPr id="14" name="Content Placeholder 9">
             <a:extLst>
               <a:ext uri="{FF2B5EF4-FFF2-40B4-BE49-F238E27FC236}">
-                <a16:creationId xmlns:a16="http://schemas.microsoft.com/office/drawing/2014/main" id="{F6FD5C6F-1FDA-48CD-BEC0-12B68866E584}"/>
+                <a16:creationId xmlns:a16="http://schemas.microsoft.com/office/drawing/2014/main" xmlns="" id="{F6FD5C6F-1FDA-48CD-BEC0-12B68866E584}"/>
               </a:ext>
             </a:extLst>
           </p:cNvPr>
@@ -5134,7 +5794,7 @@
           <p:cNvPr id="3" name="Picture 2">
             <a:extLst>
               <a:ext uri="{FF2B5EF4-FFF2-40B4-BE49-F238E27FC236}">
-                <a16:creationId xmlns:a16="http://schemas.microsoft.com/office/drawing/2014/main" id="{4166C394-F86C-4469-A462-184937F08C3F}"/>
+                <a16:creationId xmlns:a16="http://schemas.microsoft.com/office/drawing/2014/main" xmlns="" id="{4166C394-F86C-4469-A462-184937F08C3F}"/>
               </a:ext>
             </a:extLst>
           </p:cNvPr>
@@ -5164,7 +5824,7 @@
           <p:cNvPr id="4" name="Picture 3">
             <a:extLst>
               <a:ext uri="{FF2B5EF4-FFF2-40B4-BE49-F238E27FC236}">
-                <a16:creationId xmlns:a16="http://schemas.microsoft.com/office/drawing/2014/main" id="{5F7F593E-72F2-4703-B531-94BFF21491F1}"/>
+                <a16:creationId xmlns:a16="http://schemas.microsoft.com/office/drawing/2014/main" xmlns="" id="{5F7F593E-72F2-4703-B531-94BFF21491F1}"/>
               </a:ext>
             </a:extLst>
           </p:cNvPr>
@@ -5194,7 +5854,7 @@
           <p:cNvPr id="5" name="Picture 4">
             <a:extLst>
               <a:ext uri="{FF2B5EF4-FFF2-40B4-BE49-F238E27FC236}">
-                <a16:creationId xmlns:a16="http://schemas.microsoft.com/office/drawing/2014/main" id="{CCFD3D16-F503-4DEC-81E8-1A314B976AEE}"/>
+                <a16:creationId xmlns:a16="http://schemas.microsoft.com/office/drawing/2014/main" xmlns="" id="{CCFD3D16-F503-4DEC-81E8-1A314B976AEE}"/>
               </a:ext>
             </a:extLst>
           </p:cNvPr>
@@ -5224,7 +5884,7 @@
           <p:cNvPr id="9" name="Picture 8">
             <a:extLst>
               <a:ext uri="{FF2B5EF4-FFF2-40B4-BE49-F238E27FC236}">
-                <a16:creationId xmlns:a16="http://schemas.microsoft.com/office/drawing/2014/main" id="{B61CAADB-5ADC-4D07-8820-D3D5A6394A63}"/>
+                <a16:creationId xmlns:a16="http://schemas.microsoft.com/office/drawing/2014/main" xmlns="" id="{B61CAADB-5ADC-4D07-8820-D3D5A6394A63}"/>
               </a:ext>
             </a:extLst>
           </p:cNvPr>
@@ -5254,7 +5914,7 @@
           <p:cNvPr id="10" name="Picture 9">
             <a:extLst>
               <a:ext uri="{FF2B5EF4-FFF2-40B4-BE49-F238E27FC236}">
-                <a16:creationId xmlns:a16="http://schemas.microsoft.com/office/drawing/2014/main" id="{9C0F3696-66CE-4F00-A220-EDAD8F90B64F}"/>
+                <a16:creationId xmlns:a16="http://schemas.microsoft.com/office/drawing/2014/main" xmlns="" id="{9C0F3696-66CE-4F00-A220-EDAD8F90B64F}"/>
               </a:ext>
             </a:extLst>
           </p:cNvPr>
@@ -5284,7 +5944,7 @@
           <p:cNvPr id="11" name="Picture 10">
             <a:extLst>
               <a:ext uri="{FF2B5EF4-FFF2-40B4-BE49-F238E27FC236}">
-                <a16:creationId xmlns:a16="http://schemas.microsoft.com/office/drawing/2014/main" id="{2D9D0505-6926-4D4C-9E83-73F19605E402}"/>
+                <a16:creationId xmlns:a16="http://schemas.microsoft.com/office/drawing/2014/main" xmlns="" id="{2D9D0505-6926-4D4C-9E83-73F19605E402}"/>
               </a:ext>
             </a:extLst>
           </p:cNvPr>
@@ -5352,7 +6012,7 @@
           <p:cNvPr id="13" name="Rectangle 12">
             <a:extLst>
               <a:ext uri="{FF2B5EF4-FFF2-40B4-BE49-F238E27FC236}">
-                <a16:creationId xmlns:a16="http://schemas.microsoft.com/office/drawing/2014/main" id="{867D4867-5BA7-4462-B2F6-A23F4A622AA7}"/>
+                <a16:creationId xmlns:a16="http://schemas.microsoft.com/office/drawing/2014/main" xmlns="" id="{867D4867-5BA7-4462-B2F6-A23F4A622AA7}"/>
               </a:ext>
             </a:extLst>
           </p:cNvPr>
@@ -5362,7 +6022,7 @@
           <p:nvPr>
             <p:extLst>
               <p:ext uri="{386F3935-93C4-4BCD-93E2-E3B085C9AB24}">
-                <p16:designElem xmlns:p16="http://schemas.microsoft.com/office/powerpoint/2015/main" val="1"/>
+                <p16:designElem xmlns:p16="http://schemas.microsoft.com/office/powerpoint/2015/main" xmlns="" val="1"/>
               </p:ext>
             </p:extLst>
           </p:nvPr>
@@ -5413,7 +6073,7 @@
           <p:cNvPr id="2" name="Titel 1">
             <a:extLst>
               <a:ext uri="{FF2B5EF4-FFF2-40B4-BE49-F238E27FC236}">
-                <a16:creationId xmlns:a16="http://schemas.microsoft.com/office/drawing/2014/main" id="{3E1A747B-9675-4981-ACB2-9927B952BFB3}"/>
+                <a16:creationId xmlns:a16="http://schemas.microsoft.com/office/drawing/2014/main" xmlns="" id="{3E1A747B-9675-4981-ACB2-9927B952BFB3}"/>
               </a:ext>
             </a:extLst>
           </p:cNvPr>
@@ -5464,7 +6124,7 @@
           <p:cNvPr id="14" name="Content Placeholder 9">
             <a:extLst>
               <a:ext uri="{FF2B5EF4-FFF2-40B4-BE49-F238E27FC236}">
-                <a16:creationId xmlns:a16="http://schemas.microsoft.com/office/drawing/2014/main" id="{F6FD5C6F-1FDA-48CD-BEC0-12B68866E584}"/>
+                <a16:creationId xmlns:a16="http://schemas.microsoft.com/office/drawing/2014/main" xmlns="" id="{F6FD5C6F-1FDA-48CD-BEC0-12B68866E584}"/>
               </a:ext>
             </a:extLst>
           </p:cNvPr>
@@ -5752,7 +6412,7 @@
           <p:cNvPr id="3" name="Picture 2">
             <a:extLst>
               <a:ext uri="{FF2B5EF4-FFF2-40B4-BE49-F238E27FC236}">
-                <a16:creationId xmlns:a16="http://schemas.microsoft.com/office/drawing/2014/main" id="{D220B874-3DFD-4B20-8990-AC529311DBBD}"/>
+                <a16:creationId xmlns:a16="http://schemas.microsoft.com/office/drawing/2014/main" xmlns="" id="{D220B874-3DFD-4B20-8990-AC529311DBBD}"/>
               </a:ext>
             </a:extLst>
           </p:cNvPr>
@@ -5782,7 +6442,7 @@
           <p:cNvPr id="4" name="Picture 3">
             <a:extLst>
               <a:ext uri="{FF2B5EF4-FFF2-40B4-BE49-F238E27FC236}">
-                <a16:creationId xmlns:a16="http://schemas.microsoft.com/office/drawing/2014/main" id="{86817D02-719F-4E10-8F3A-C0743EFD9A52}"/>
+                <a16:creationId xmlns:a16="http://schemas.microsoft.com/office/drawing/2014/main" xmlns="" id="{86817D02-719F-4E10-8F3A-C0743EFD9A52}"/>
               </a:ext>
             </a:extLst>
           </p:cNvPr>
@@ -5850,7 +6510,7 @@
           <p:cNvPr id="13" name="Rectangle 12">
             <a:extLst>
               <a:ext uri="{FF2B5EF4-FFF2-40B4-BE49-F238E27FC236}">
-                <a16:creationId xmlns:a16="http://schemas.microsoft.com/office/drawing/2014/main" id="{867D4867-5BA7-4462-B2F6-A23F4A622AA7}"/>
+                <a16:creationId xmlns:a16="http://schemas.microsoft.com/office/drawing/2014/main" xmlns="" id="{867D4867-5BA7-4462-B2F6-A23F4A622AA7}"/>
               </a:ext>
             </a:extLst>
           </p:cNvPr>
@@ -5860,7 +6520,7 @@
           <p:nvPr>
             <p:extLst>
               <p:ext uri="{386F3935-93C4-4BCD-93E2-E3B085C9AB24}">
-                <p16:designElem xmlns:p16="http://schemas.microsoft.com/office/powerpoint/2015/main" val="1"/>
+                <p16:designElem xmlns:p16="http://schemas.microsoft.com/office/powerpoint/2015/main" xmlns="" val="1"/>
               </p:ext>
             </p:extLst>
           </p:nvPr>
@@ -5911,7 +6571,7 @@
           <p:cNvPr id="2" name="Titel 1">
             <a:extLst>
               <a:ext uri="{FF2B5EF4-FFF2-40B4-BE49-F238E27FC236}">
-                <a16:creationId xmlns:a16="http://schemas.microsoft.com/office/drawing/2014/main" id="{3E1A747B-9675-4981-ACB2-9927B952BFB3}"/>
+                <a16:creationId xmlns:a16="http://schemas.microsoft.com/office/drawing/2014/main" xmlns="" id="{3E1A747B-9675-4981-ACB2-9927B952BFB3}"/>
               </a:ext>
             </a:extLst>
           </p:cNvPr>
@@ -5962,7 +6622,7 @@
           <p:cNvPr id="14" name="Content Placeholder 9">
             <a:extLst>
               <a:ext uri="{FF2B5EF4-FFF2-40B4-BE49-F238E27FC236}">
-                <a16:creationId xmlns:a16="http://schemas.microsoft.com/office/drawing/2014/main" id="{F6FD5C6F-1FDA-48CD-BEC0-12B68866E584}"/>
+                <a16:creationId xmlns:a16="http://schemas.microsoft.com/office/drawing/2014/main" xmlns="" id="{F6FD5C6F-1FDA-48CD-BEC0-12B68866E584}"/>
               </a:ext>
             </a:extLst>
           </p:cNvPr>
@@ -6086,7 +6746,7 @@
           <p:cNvPr id="7" name="Picture 6">
             <a:extLst>
               <a:ext uri="{FF2B5EF4-FFF2-40B4-BE49-F238E27FC236}">
-                <a16:creationId xmlns:a16="http://schemas.microsoft.com/office/drawing/2014/main" id="{E7807DF7-F24A-40B9-8828-E41C422461EB}"/>
+                <a16:creationId xmlns:a16="http://schemas.microsoft.com/office/drawing/2014/main" xmlns="" id="{E7807DF7-F24A-40B9-8828-E41C422461EB}"/>
               </a:ext>
             </a:extLst>
           </p:cNvPr>
@@ -6114,7 +6774,7 @@
           <p:cNvPr id="8" name="Picture 7">
             <a:extLst>
               <a:ext uri="{FF2B5EF4-FFF2-40B4-BE49-F238E27FC236}">
-                <a16:creationId xmlns:a16="http://schemas.microsoft.com/office/drawing/2014/main" id="{8A53F9F8-B224-4ADD-9954-5898B41D8C71}"/>
+                <a16:creationId xmlns:a16="http://schemas.microsoft.com/office/drawing/2014/main" xmlns="" id="{8A53F9F8-B224-4ADD-9954-5898B41D8C71}"/>
               </a:ext>
             </a:extLst>
           </p:cNvPr>
@@ -6183,7 +6843,7 @@
           <p:cNvPr id="28" name="Freeform: Shape 27">
             <a:extLst>
               <a:ext uri="{FF2B5EF4-FFF2-40B4-BE49-F238E27FC236}">
-                <a16:creationId xmlns:a16="http://schemas.microsoft.com/office/drawing/2014/main" id="{E862BE82-D00D-42C1-BF16-93AA37870C32}"/>
+                <a16:creationId xmlns:a16="http://schemas.microsoft.com/office/drawing/2014/main" xmlns="" id="{E862BE82-D00D-42C1-BF16-93AA37870C32}"/>
               </a:ext>
             </a:extLst>
           </p:cNvPr>
@@ -6193,7 +6853,7 @@
           <p:nvPr>
             <p:extLst>
               <p:ext uri="{386F3935-93C4-4BCD-93E2-E3B085C9AB24}">
-                <p16:designElem xmlns:p16="http://schemas.microsoft.com/office/powerpoint/2015/main" val="1"/>
+                <p16:designElem xmlns:p16="http://schemas.microsoft.com/office/powerpoint/2015/main" xmlns="" val="1"/>
               </p:ext>
             </p:extLst>
           </p:nvPr>
@@ -6347,7 +7007,7 @@
           <p:cNvPr id="30" name="Freeform: Shape 29">
             <a:extLst>
               <a:ext uri="{FF2B5EF4-FFF2-40B4-BE49-F238E27FC236}">
-                <a16:creationId xmlns:a16="http://schemas.microsoft.com/office/drawing/2014/main" id="{F6D92C2D-1D3D-4974-918C-06579FB354A9}"/>
+                <a16:creationId xmlns:a16="http://schemas.microsoft.com/office/drawing/2014/main" xmlns="" id="{F6D92C2D-1D3D-4974-918C-06579FB354A9}"/>
               </a:ext>
             </a:extLst>
           </p:cNvPr>
@@ -6357,7 +7017,7 @@
           <p:nvPr>
             <p:extLst>
               <p:ext uri="{386F3935-93C4-4BCD-93E2-E3B085C9AB24}">
-                <p16:designElem xmlns:p16="http://schemas.microsoft.com/office/powerpoint/2015/main" val="1"/>
+                <p16:designElem xmlns:p16="http://schemas.microsoft.com/office/powerpoint/2015/main" xmlns="" val="1"/>
               </p:ext>
             </p:extLst>
           </p:nvPr>
@@ -6513,7 +7173,7 @@
           <p:cNvPr id="2" name="Titel 1">
             <a:extLst>
               <a:ext uri="{FF2B5EF4-FFF2-40B4-BE49-F238E27FC236}">
-                <a16:creationId xmlns:a16="http://schemas.microsoft.com/office/drawing/2014/main" id="{3E1A747B-9675-4981-ACB2-9927B952BFB3}"/>
+                <a16:creationId xmlns:a16="http://schemas.microsoft.com/office/drawing/2014/main" xmlns="" id="{3E1A747B-9675-4981-ACB2-9927B952BFB3}"/>
               </a:ext>
             </a:extLst>
           </p:cNvPr>
@@ -6549,7 +7209,7 @@
           <p:cNvPr id="14" name="Content Placeholder 9">
             <a:extLst>
               <a:ext uri="{FF2B5EF4-FFF2-40B4-BE49-F238E27FC236}">
-                <a16:creationId xmlns:a16="http://schemas.microsoft.com/office/drawing/2014/main" id="{F6FD5C6F-1FDA-48CD-BEC0-12B68866E584}"/>
+                <a16:creationId xmlns:a16="http://schemas.microsoft.com/office/drawing/2014/main" xmlns="" id="{F6FD5C6F-1FDA-48CD-BEC0-12B68866E584}"/>
               </a:ext>
             </a:extLst>
           </p:cNvPr>
@@ -6660,7 +7320,7 @@
           <p:cNvPr id="4" name="Table 3">
             <a:extLst>
               <a:ext uri="{FF2B5EF4-FFF2-40B4-BE49-F238E27FC236}">
-                <a16:creationId xmlns:a16="http://schemas.microsoft.com/office/drawing/2014/main" id="{959E7F3A-E83D-4CBB-9F28-82915AB6878A}"/>
+                <a16:creationId xmlns:a16="http://schemas.microsoft.com/office/drawing/2014/main" xmlns="" id="{959E7F3A-E83D-4CBB-9F28-82915AB6878A}"/>
               </a:ext>
             </a:extLst>
           </p:cNvPr>
@@ -6689,35 +7349,35 @@
                 <a:gridCol w="762000">
                   <a:extLst>
                     <a:ext uri="{9D8B030D-6E8A-4147-A177-3AD203B41FA5}">
-                      <a16:colId xmlns:a16="http://schemas.microsoft.com/office/drawing/2014/main" val="877155824"/>
+                      <a16:colId xmlns:a16="http://schemas.microsoft.com/office/drawing/2014/main" xmlns="" val="877155824"/>
                     </a:ext>
                   </a:extLst>
                 </a:gridCol>
                 <a:gridCol w="1130300">
                   <a:extLst>
                     <a:ext uri="{9D8B030D-6E8A-4147-A177-3AD203B41FA5}">
-                      <a16:colId xmlns:a16="http://schemas.microsoft.com/office/drawing/2014/main" val="2150856818"/>
+                      <a16:colId xmlns:a16="http://schemas.microsoft.com/office/drawing/2014/main" xmlns="" val="2150856818"/>
                     </a:ext>
                   </a:extLst>
                 </a:gridCol>
                 <a:gridCol w="609600">
                   <a:extLst>
                     <a:ext uri="{9D8B030D-6E8A-4147-A177-3AD203B41FA5}">
-                      <a16:colId xmlns:a16="http://schemas.microsoft.com/office/drawing/2014/main" val="1694212619"/>
+                      <a16:colId xmlns:a16="http://schemas.microsoft.com/office/drawing/2014/main" xmlns="" val="1694212619"/>
                     </a:ext>
                   </a:extLst>
                 </a:gridCol>
                 <a:gridCol w="1282700">
                   <a:extLst>
                     <a:ext uri="{9D8B030D-6E8A-4147-A177-3AD203B41FA5}">
-                      <a16:colId xmlns:a16="http://schemas.microsoft.com/office/drawing/2014/main" val="3811761826"/>
+                      <a16:colId xmlns:a16="http://schemas.microsoft.com/office/drawing/2014/main" xmlns="" val="3811761826"/>
                     </a:ext>
                   </a:extLst>
                 </a:gridCol>
                 <a:gridCol w="2400300">
                   <a:extLst>
                     <a:ext uri="{9D8B030D-6E8A-4147-A177-3AD203B41FA5}">
-                      <a16:colId xmlns:a16="http://schemas.microsoft.com/office/drawing/2014/main" val="2662422115"/>
+                      <a16:colId xmlns:a16="http://schemas.microsoft.com/office/drawing/2014/main" xmlns="" val="2662422115"/>
                     </a:ext>
                   </a:extLst>
                 </a:gridCol>
@@ -6788,7 +7448,7 @@
                 </a:tc>
                 <a:extLst>
                   <a:ext uri="{0D108BD9-81ED-4DB2-BD59-A6C34878D82A}">
-                    <a16:rowId xmlns:a16="http://schemas.microsoft.com/office/drawing/2014/main" val="2384365693"/>
+                    <a16:rowId xmlns:a16="http://schemas.microsoft.com/office/drawing/2014/main" xmlns="" val="2384365693"/>
                   </a:ext>
                 </a:extLst>
               </a:tr>
@@ -6910,7 +7570,7 @@
                 </a:tc>
                 <a:extLst>
                   <a:ext uri="{0D108BD9-81ED-4DB2-BD59-A6C34878D82A}">
-                    <a16:rowId xmlns:a16="http://schemas.microsoft.com/office/drawing/2014/main" val="1375811977"/>
+                    <a16:rowId xmlns:a16="http://schemas.microsoft.com/office/drawing/2014/main" xmlns="" val="1375811977"/>
                   </a:ext>
                 </a:extLst>
               </a:tr>
@@ -7032,7 +7692,7 @@
                 </a:tc>
                 <a:extLst>
                   <a:ext uri="{0D108BD9-81ED-4DB2-BD59-A6C34878D82A}">
-                    <a16:rowId xmlns:a16="http://schemas.microsoft.com/office/drawing/2014/main" val="1873742886"/>
+                    <a16:rowId xmlns:a16="http://schemas.microsoft.com/office/drawing/2014/main" xmlns="" val="1873742886"/>
                   </a:ext>
                 </a:extLst>
               </a:tr>
@@ -7154,7 +7814,7 @@
                 </a:tc>
                 <a:extLst>
                   <a:ext uri="{0D108BD9-81ED-4DB2-BD59-A6C34878D82A}">
-                    <a16:rowId xmlns:a16="http://schemas.microsoft.com/office/drawing/2014/main" val="2010052062"/>
+                    <a16:rowId xmlns:a16="http://schemas.microsoft.com/office/drawing/2014/main" xmlns="" val="2010052062"/>
                   </a:ext>
                 </a:extLst>
               </a:tr>
@@ -7276,7 +7936,7 @@
                 </a:tc>
                 <a:extLst>
                   <a:ext uri="{0D108BD9-81ED-4DB2-BD59-A6C34878D82A}">
-                    <a16:rowId xmlns:a16="http://schemas.microsoft.com/office/drawing/2014/main" val="4250045817"/>
+                    <a16:rowId xmlns:a16="http://schemas.microsoft.com/office/drawing/2014/main" xmlns="" val="4250045817"/>
                   </a:ext>
                 </a:extLst>
               </a:tr>
@@ -7398,7 +8058,7 @@
                 </a:tc>
                 <a:extLst>
                   <a:ext uri="{0D108BD9-81ED-4DB2-BD59-A6C34878D82A}">
-                    <a16:rowId xmlns:a16="http://schemas.microsoft.com/office/drawing/2014/main" val="2076959296"/>
+                    <a16:rowId xmlns:a16="http://schemas.microsoft.com/office/drawing/2014/main" xmlns="" val="2076959296"/>
                   </a:ext>
                 </a:extLst>
               </a:tr>
@@ -7520,7 +8180,7 @@
                 </a:tc>
                 <a:extLst>
                   <a:ext uri="{0D108BD9-81ED-4DB2-BD59-A6C34878D82A}">
-                    <a16:rowId xmlns:a16="http://schemas.microsoft.com/office/drawing/2014/main" val="1684318783"/>
+                    <a16:rowId xmlns:a16="http://schemas.microsoft.com/office/drawing/2014/main" xmlns="" val="1684318783"/>
                   </a:ext>
                 </a:extLst>
               </a:tr>
@@ -7642,7 +8302,7 @@
                 </a:tc>
                 <a:extLst>
                   <a:ext uri="{0D108BD9-81ED-4DB2-BD59-A6C34878D82A}">
-                    <a16:rowId xmlns:a16="http://schemas.microsoft.com/office/drawing/2014/main" val="605236144"/>
+                    <a16:rowId xmlns:a16="http://schemas.microsoft.com/office/drawing/2014/main" xmlns="" val="605236144"/>
                   </a:ext>
                 </a:extLst>
               </a:tr>
@@ -7655,7 +8315,7 @@
           <p:cNvPr id="6" name="Picture 5">
             <a:extLst>
               <a:ext uri="{FF2B5EF4-FFF2-40B4-BE49-F238E27FC236}">
-                <a16:creationId xmlns:a16="http://schemas.microsoft.com/office/drawing/2014/main" id="{C74AD04A-027D-4AF3-B0A0-726F309BD204}"/>
+                <a16:creationId xmlns:a16="http://schemas.microsoft.com/office/drawing/2014/main" xmlns="" id="{C74AD04A-027D-4AF3-B0A0-726F309BD204}"/>
               </a:ext>
             </a:extLst>
           </p:cNvPr>
@@ -7684,7 +8344,7 @@
           <p:cNvPr id="8" name="Picture 7">
             <a:extLst>
               <a:ext uri="{FF2B5EF4-FFF2-40B4-BE49-F238E27FC236}">
-                <a16:creationId xmlns:a16="http://schemas.microsoft.com/office/drawing/2014/main" id="{91BB3BE5-EEFC-4FC5-B2F5-9DFA4C6EA18F}"/>
+                <a16:creationId xmlns:a16="http://schemas.microsoft.com/office/drawing/2014/main" xmlns="" id="{91BB3BE5-EEFC-4FC5-B2F5-9DFA4C6EA18F}"/>
               </a:ext>
             </a:extLst>
           </p:cNvPr>
@@ -7694,7 +8354,7 @@
           <p:nvPr/>
         </p:nvPicPr>
         <p:blipFill rotWithShape="1">
-          <a:blip r:embed="rId3">
+          <a:blip r:embed="rId3" cstate="print">
             <a:extLst>
               <a:ext uri="{28A0092B-C50C-407E-A947-70E740481C1C}">
                 <a14:useLocalDpi xmlns:a14="http://schemas.microsoft.com/office/drawing/2010/main" val="0"/>
@@ -7719,7 +8379,7 @@
           <p:cNvPr id="9" name="TextBox 8">
             <a:extLst>
               <a:ext uri="{FF2B5EF4-FFF2-40B4-BE49-F238E27FC236}">
-                <a16:creationId xmlns:a16="http://schemas.microsoft.com/office/drawing/2014/main" id="{A3B57D34-1F20-45F8-A497-3DD06CDD445F}"/>
+                <a16:creationId xmlns:a16="http://schemas.microsoft.com/office/drawing/2014/main" xmlns="" id="{A3B57D34-1F20-45F8-A497-3DD06CDD445F}"/>
               </a:ext>
             </a:extLst>
           </p:cNvPr>
@@ -7771,7 +8431,7 @@
           <p:cNvPr id="13" name="TextBox 12">
             <a:extLst>
               <a:ext uri="{FF2B5EF4-FFF2-40B4-BE49-F238E27FC236}">
-                <a16:creationId xmlns:a16="http://schemas.microsoft.com/office/drawing/2014/main" id="{EC1DAF15-A3F3-4B86-864C-F084FFF9511A}"/>
+                <a16:creationId xmlns:a16="http://schemas.microsoft.com/office/drawing/2014/main" xmlns="" id="{EC1DAF15-A3F3-4B86-864C-F084FFF9511A}"/>
               </a:ext>
             </a:extLst>
           </p:cNvPr>
@@ -7810,7 +8470,7 @@
           <p:cNvPr id="15" name="TextBox 14">
             <a:extLst>
               <a:ext uri="{FF2B5EF4-FFF2-40B4-BE49-F238E27FC236}">
-                <a16:creationId xmlns:a16="http://schemas.microsoft.com/office/drawing/2014/main" id="{554553E5-A934-4CB6-96E7-84AB36168D71}"/>
+                <a16:creationId xmlns:a16="http://schemas.microsoft.com/office/drawing/2014/main" xmlns="" id="{554553E5-A934-4CB6-96E7-84AB36168D71}"/>
               </a:ext>
             </a:extLst>
           </p:cNvPr>
@@ -7884,7 +8544,7 @@
           <p:cNvPr id="17" name="Rectangle 16">
             <a:extLst>
               <a:ext uri="{FF2B5EF4-FFF2-40B4-BE49-F238E27FC236}">
-                <a16:creationId xmlns:a16="http://schemas.microsoft.com/office/drawing/2014/main" id="{867D4867-5BA7-4462-B2F6-A23F4A622AA7}"/>
+                <a16:creationId xmlns:a16="http://schemas.microsoft.com/office/drawing/2014/main" xmlns="" id="{867D4867-5BA7-4462-B2F6-A23F4A622AA7}"/>
               </a:ext>
             </a:extLst>
           </p:cNvPr>
@@ -7894,7 +8554,7 @@
           <p:nvPr>
             <p:extLst>
               <p:ext uri="{386F3935-93C4-4BCD-93E2-E3B085C9AB24}">
-                <p16:designElem xmlns:p16="http://schemas.microsoft.com/office/powerpoint/2015/main" val="1"/>
+                <p16:designElem xmlns:p16="http://schemas.microsoft.com/office/powerpoint/2015/main" xmlns="" val="1"/>
               </p:ext>
             </p:extLst>
           </p:nvPr>
@@ -7945,7 +8605,7 @@
           <p:cNvPr id="2" name="Titel 1">
             <a:extLst>
               <a:ext uri="{FF2B5EF4-FFF2-40B4-BE49-F238E27FC236}">
-                <a16:creationId xmlns:a16="http://schemas.microsoft.com/office/drawing/2014/main" id="{9FB4A506-2702-4600-A2CA-F98C4422D0FA}"/>
+                <a16:creationId xmlns:a16="http://schemas.microsoft.com/office/drawing/2014/main" xmlns="" id="{9FB4A506-2702-4600-A2CA-F98C4422D0FA}"/>
               </a:ext>
             </a:extLst>
           </p:cNvPr>
@@ -7996,7 +8656,7 @@
           <p:cNvPr id="9" name="Content Placeholder 8">
             <a:extLst>
               <a:ext uri="{FF2B5EF4-FFF2-40B4-BE49-F238E27FC236}">
-                <a16:creationId xmlns:a16="http://schemas.microsoft.com/office/drawing/2014/main" id="{CA83A435-01F2-4983-A087-5E0473CD6185}"/>
+                <a16:creationId xmlns:a16="http://schemas.microsoft.com/office/drawing/2014/main" xmlns="" id="{CA83A435-01F2-4983-A087-5E0473CD6185}"/>
               </a:ext>
             </a:extLst>
           </p:cNvPr>
@@ -8119,7 +8779,7 @@
           <p:cNvPr id="5" name="Picture 4">
             <a:extLst>
               <a:ext uri="{FF2B5EF4-FFF2-40B4-BE49-F238E27FC236}">
-                <a16:creationId xmlns:a16="http://schemas.microsoft.com/office/drawing/2014/main" id="{011262E8-AAA1-4E75-AEBA-E31B0E177ABA}"/>
+                <a16:creationId xmlns:a16="http://schemas.microsoft.com/office/drawing/2014/main" xmlns="" id="{011262E8-AAA1-4E75-AEBA-E31B0E177ABA}"/>
               </a:ext>
             </a:extLst>
           </p:cNvPr>
@@ -8129,7 +8789,7 @@
           <p:nvPr/>
         </p:nvPicPr>
         <p:blipFill rotWithShape="1">
-          <a:blip r:embed="rId2">
+          <a:blip r:embed="rId2" cstate="print">
             <a:extLst>
               <a:ext uri="{28A0092B-C50C-407E-A947-70E740481C1C}">
                 <a14:useLocalDpi xmlns:a14="http://schemas.microsoft.com/office/drawing/2010/main" val="0"/>
@@ -8154,7 +8814,7 @@
           <p:cNvPr id="7" name="Picture 6">
             <a:extLst>
               <a:ext uri="{FF2B5EF4-FFF2-40B4-BE49-F238E27FC236}">
-                <a16:creationId xmlns:a16="http://schemas.microsoft.com/office/drawing/2014/main" id="{DEA0A99F-CFC7-48AD-ADA6-8BBCBC4E6ED1}"/>
+                <a16:creationId xmlns:a16="http://schemas.microsoft.com/office/drawing/2014/main" xmlns="" id="{DEA0A99F-CFC7-48AD-ADA6-8BBCBC4E6ED1}"/>
               </a:ext>
             </a:extLst>
           </p:cNvPr>
@@ -8164,7 +8824,7 @@
           <p:nvPr/>
         </p:nvPicPr>
         <p:blipFill rotWithShape="1">
-          <a:blip r:embed="rId3">
+          <a:blip r:embed="rId3" cstate="print">
             <a:extLst>
               <a:ext uri="{28A0092B-C50C-407E-A947-70E740481C1C}">
                 <a14:useLocalDpi xmlns:a14="http://schemas.microsoft.com/office/drawing/2010/main" val="0"/>
@@ -8189,7 +8849,7 @@
           <p:cNvPr id="10" name="Picture 9">
             <a:extLst>
               <a:ext uri="{FF2B5EF4-FFF2-40B4-BE49-F238E27FC236}">
-                <a16:creationId xmlns:a16="http://schemas.microsoft.com/office/drawing/2014/main" id="{7F3A80E0-B048-415F-AB4C-A153E92C21CE}"/>
+                <a16:creationId xmlns:a16="http://schemas.microsoft.com/office/drawing/2014/main" xmlns="" id="{7F3A80E0-B048-415F-AB4C-A153E92C21CE}"/>
               </a:ext>
             </a:extLst>
           </p:cNvPr>
@@ -8199,7 +8859,7 @@
           <p:nvPr/>
         </p:nvPicPr>
         <p:blipFill rotWithShape="1">
-          <a:blip r:embed="rId4">
+          <a:blip r:embed="rId4" cstate="print">
             <a:extLst>
               <a:ext uri="{28A0092B-C50C-407E-A947-70E740481C1C}">
                 <a14:useLocalDpi xmlns:a14="http://schemas.microsoft.com/office/drawing/2010/main" val="0"/>
@@ -8224,7 +8884,7 @@
           <p:cNvPr id="12" name="Picture 11">
             <a:extLst>
               <a:ext uri="{FF2B5EF4-FFF2-40B4-BE49-F238E27FC236}">
-                <a16:creationId xmlns:a16="http://schemas.microsoft.com/office/drawing/2014/main" id="{ED22EA4C-5BCC-427A-AD1F-F631B61D1CE2}"/>
+                <a16:creationId xmlns:a16="http://schemas.microsoft.com/office/drawing/2014/main" xmlns="" id="{ED22EA4C-5BCC-427A-AD1F-F631B61D1CE2}"/>
               </a:ext>
             </a:extLst>
           </p:cNvPr>
@@ -8234,7 +8894,7 @@
           <p:nvPr/>
         </p:nvPicPr>
         <p:blipFill rotWithShape="1">
-          <a:blip r:embed="rId5">
+          <a:blip r:embed="rId5" cstate="print">
             <a:extLst>
               <a:ext uri="{28A0092B-C50C-407E-A947-70E740481C1C}">
                 <a14:useLocalDpi xmlns:a14="http://schemas.microsoft.com/office/drawing/2010/main" val="0"/>
@@ -8259,7 +8919,7 @@
           <p:cNvPr id="13" name="TextBox 12">
             <a:extLst>
               <a:ext uri="{FF2B5EF4-FFF2-40B4-BE49-F238E27FC236}">
-                <a16:creationId xmlns:a16="http://schemas.microsoft.com/office/drawing/2014/main" id="{E5E247B4-ECEA-497B-9DEB-0E12D6535242}"/>
+                <a16:creationId xmlns:a16="http://schemas.microsoft.com/office/drawing/2014/main" xmlns="" id="{E5E247B4-ECEA-497B-9DEB-0E12D6535242}"/>
               </a:ext>
             </a:extLst>
           </p:cNvPr>
@@ -8307,7 +8967,7 @@
           <p:cNvPr id="15" name="TextBox 14">
             <a:extLst>
               <a:ext uri="{FF2B5EF4-FFF2-40B4-BE49-F238E27FC236}">
-                <a16:creationId xmlns:a16="http://schemas.microsoft.com/office/drawing/2014/main" id="{AFB2501D-A3D8-45EE-A7A7-14ADB798AC36}"/>
+                <a16:creationId xmlns:a16="http://schemas.microsoft.com/office/drawing/2014/main" xmlns="" id="{AFB2501D-A3D8-45EE-A7A7-14ADB798AC36}"/>
               </a:ext>
             </a:extLst>
           </p:cNvPr>
@@ -8346,7 +9006,7 @@
           <p:cNvPr id="16" name="TextBox 15">
             <a:extLst>
               <a:ext uri="{FF2B5EF4-FFF2-40B4-BE49-F238E27FC236}">
-                <a16:creationId xmlns:a16="http://schemas.microsoft.com/office/drawing/2014/main" id="{93002084-F56D-4370-8577-B7B1C8402038}"/>
+                <a16:creationId xmlns:a16="http://schemas.microsoft.com/office/drawing/2014/main" xmlns="" id="{93002084-F56D-4370-8577-B7B1C8402038}"/>
               </a:ext>
             </a:extLst>
           </p:cNvPr>
@@ -8385,7 +9045,7 @@
           <p:cNvPr id="18" name="TextBox 17">
             <a:extLst>
               <a:ext uri="{FF2B5EF4-FFF2-40B4-BE49-F238E27FC236}">
-                <a16:creationId xmlns:a16="http://schemas.microsoft.com/office/drawing/2014/main" id="{852B37DD-6C80-4362-8214-A2C744B97236}"/>
+                <a16:creationId xmlns:a16="http://schemas.microsoft.com/office/drawing/2014/main" xmlns="" id="{852B37DD-6C80-4362-8214-A2C744B97236}"/>
               </a:ext>
             </a:extLst>
           </p:cNvPr>
@@ -8435,14 +9095,6 @@
 <file path=ppt/slides/slide9.xml><?xml version="1.0" encoding="utf-8"?>
 <p:sld xmlns:a="http://schemas.openxmlformats.org/drawingml/2006/main" xmlns:r="http://schemas.openxmlformats.org/officeDocument/2006/relationships" xmlns:p="http://schemas.openxmlformats.org/presentationml/2006/main">
   <p:cSld>
-    <p:bg>
-      <p:bgPr>
-        <a:solidFill>
-          <a:schemeClr val="bg1"/>
-        </a:solidFill>
-        <a:effectLst/>
-      </p:bgPr>
-    </p:bg>
     <p:spTree>
       <p:nvGrpSpPr>
         <p:cNvPr id="1" name=""/>
@@ -8459,10 +9111,10 @@
       </p:grpSpPr>
       <p:sp>
         <p:nvSpPr>
-          <p:cNvPr id="22" name="Rectangle 21">
-            <a:extLst>
-              <a:ext uri="{FF2B5EF4-FFF2-40B4-BE49-F238E27FC236}">
-                <a16:creationId xmlns:a16="http://schemas.microsoft.com/office/drawing/2014/main" id="{867D4867-5BA7-4462-B2F6-A23F4A622AA7}"/>
+          <p:cNvPr id="4" name="Rectangle 3">
+            <a:extLst>
+              <a:ext uri="{FF2B5EF4-FFF2-40B4-BE49-F238E27FC236}">
+                <a16:creationId xmlns:a16="http://schemas.microsoft.com/office/drawing/2014/main" xmlns="" id="{867D4867-5BA7-4462-B2F6-A23F4A622AA7}"/>
               </a:ext>
             </a:extLst>
           </p:cNvPr>
@@ -8472,7 +9124,7 @@
           <p:nvPr>
             <p:extLst>
               <p:ext uri="{386F3935-93C4-4BCD-93E2-E3B085C9AB24}">
-                <p16:designElem xmlns:p16="http://schemas.microsoft.com/office/powerpoint/2015/main" val="1"/>
+                <p16:designElem xmlns:p16="http://schemas.microsoft.com/office/powerpoint/2015/main" xmlns="" val="1"/>
               </p:ext>
             </p:extLst>
           </p:nvPr>
@@ -8518,48 +9170,12 @@
           </a:p>
         </p:txBody>
       </p:sp>
-      <p:pic>
-        <p:nvPicPr>
-          <p:cNvPr id="4" name="Billede 3">
-            <a:extLst>
-              <a:ext uri="{FF2B5EF4-FFF2-40B4-BE49-F238E27FC236}">
-                <a16:creationId xmlns:a16="http://schemas.microsoft.com/office/drawing/2014/main" id="{3F9CE619-F003-4C99-BDC0-326C4E384054}"/>
-              </a:ext>
-            </a:extLst>
-          </p:cNvPr>
-          <p:cNvPicPr>
-            <a:picLocks noChangeAspect="1"/>
-          </p:cNvPicPr>
-          <p:nvPr/>
-        </p:nvPicPr>
-        <p:blipFill>
-          <a:blip r:embed="rId2">
-            <a:extLst>
-              <a:ext uri="{28A0092B-C50C-407E-A947-70E740481C1C}">
-                <a14:useLocalDpi xmlns:a14="http://schemas.microsoft.com/office/drawing/2010/main" val="0"/>
-              </a:ext>
-            </a:extLst>
-          </a:blip>
-          <a:stretch>
-            <a:fillRect/>
-          </a:stretch>
-        </p:blipFill>
-        <p:spPr>
-          <a:xfrm>
-            <a:off x="5297763" y="1270186"/>
-            <a:ext cx="6250769" cy="4156761"/>
-          </a:xfrm>
-          <a:prstGeom prst="rect">
-            <a:avLst/>
-          </a:prstGeom>
-        </p:spPr>
-      </p:pic>
-      <p:sp>
-        <p:nvSpPr>
-          <p:cNvPr id="2" name="Titel 1">
-            <a:extLst>
-              <a:ext uri="{FF2B5EF4-FFF2-40B4-BE49-F238E27FC236}">
-                <a16:creationId xmlns:a16="http://schemas.microsoft.com/office/drawing/2014/main" id="{9FB4A506-2702-4600-A2CA-F98C4422D0FA}"/>
+      <p:sp>
+        <p:nvSpPr>
+          <p:cNvPr id="5" name="Titel 1">
+            <a:extLst>
+              <a:ext uri="{FF2B5EF4-FFF2-40B4-BE49-F238E27FC236}">
+                <a16:creationId xmlns:a16="http://schemas.microsoft.com/office/drawing/2014/main" xmlns="" id="{9FB4A506-2702-4600-A2CA-F98C4422D0FA}"/>
               </a:ext>
             </a:extLst>
           </p:cNvPr>
@@ -8590,12 +9206,12 @@
           <a:p>
             <a:pPr algn="ctr"/>
             <a:r>
-              <a:rPr lang="en-US" sz="2800" dirty="0">
-                <a:solidFill>
-                  <a:schemeClr val="bg1"/>
-                </a:solidFill>
-              </a:rPr>
-              <a:t>Results</a:t>
+              <a:rPr lang="en-US" sz="2800" dirty="0" smtClean="0">
+                <a:solidFill>
+                  <a:schemeClr val="bg1"/>
+                </a:solidFill>
+              </a:rPr>
+              <a:t>ARQ – stop-and-wait</a:t>
             </a:r>
             <a:endParaRPr lang="aa-ET" sz="2800" dirty="0">
               <a:solidFill>
@@ -8605,12 +9221,42 @@
           </a:p>
         </p:txBody>
       </p:sp>
-      <p:sp>
-        <p:nvSpPr>
-          <p:cNvPr id="9" name="Content Placeholder 8">
-            <a:extLst>
-              <a:ext uri="{FF2B5EF4-FFF2-40B4-BE49-F238E27FC236}">
-                <a16:creationId xmlns:a16="http://schemas.microsoft.com/office/drawing/2014/main" id="{CA83A435-01F2-4983-A087-5E0473CD6185}"/>
+      <p:pic>
+        <p:nvPicPr>
+          <p:cNvPr id="6" name="Picture 5"/>
+          <p:cNvPicPr>
+            <a:picLocks noChangeAspect="1"/>
+          </p:cNvPicPr>
+          <p:nvPr/>
+        </p:nvPicPr>
+        <p:blipFill>
+          <a:blip r:embed="rId2">
+            <a:extLst>
+              <a:ext uri="{28A0092B-C50C-407E-A947-70E740481C1C}">
+                <a14:useLocalDpi xmlns:a14="http://schemas.microsoft.com/office/drawing/2010/main" val="0"/>
+              </a:ext>
+            </a:extLst>
+          </a:blip>
+          <a:stretch>
+            <a:fillRect/>
+          </a:stretch>
+        </p:blipFill>
+        <p:spPr>
+          <a:xfrm>
+            <a:off x="4716223" y="951625"/>
+            <a:ext cx="7475777" cy="4581525"/>
+          </a:xfrm>
+          <a:prstGeom prst="rect">
+            <a:avLst/>
+          </a:prstGeom>
+        </p:spPr>
+      </p:pic>
+      <p:sp>
+        <p:nvSpPr>
+          <p:cNvPr id="7" name="Content Placeholder 8">
+            <a:extLst>
+              <a:ext uri="{FF2B5EF4-FFF2-40B4-BE49-F238E27FC236}">
+                <a16:creationId xmlns:a16="http://schemas.microsoft.com/office/drawing/2014/main" xmlns="" id="{CA83A435-01F2-4983-A087-5E0473CD6185}"/>
               </a:ext>
             </a:extLst>
           </p:cNvPr>
@@ -8632,6 +9278,77 @@
             <a:normAutofit/>
           </a:bodyPr>
           <a:lstStyle/>
+          <a:p>
+            <a:r>
+              <a:rPr lang="en-US" sz="2000" dirty="0" smtClean="0">
+                <a:solidFill>
+                  <a:schemeClr val="bg1"/>
+                </a:solidFill>
+              </a:rPr>
+              <a:t>Scenario 1 and 2 – directly and using the relay</a:t>
+            </a:r>
+            <a:endParaRPr lang="en-US" sz="2000" dirty="0" smtClean="0">
+              <a:solidFill>
+                <a:schemeClr val="bg1"/>
+              </a:solidFill>
+            </a:endParaRPr>
+          </a:p>
+          <a:p>
+            <a:r>
+              <a:rPr lang="en-US" sz="2000" dirty="0" smtClean="0">
+                <a:solidFill>
+                  <a:schemeClr val="bg1"/>
+                </a:solidFill>
+              </a:rPr>
+              <a:t>Each request starts a timer – acknowledgment</a:t>
+            </a:r>
+            <a:r>
+              <a:rPr lang="en-US" sz="2000" dirty="0">
+                <a:solidFill>
+                  <a:schemeClr val="bg1"/>
+                </a:solidFill>
+              </a:rPr>
+              <a:t> </a:t>
+            </a:r>
+            <a:r>
+              <a:rPr lang="en-US" sz="2000" dirty="0" smtClean="0">
+                <a:solidFill>
+                  <a:schemeClr val="bg1"/>
+                </a:solidFill>
+              </a:rPr>
+              <a:t>must come before timer runs out</a:t>
+            </a:r>
+            <a:endParaRPr lang="en-US" sz="2000" dirty="0" smtClean="0">
+              <a:solidFill>
+                <a:schemeClr val="bg1"/>
+              </a:solidFill>
+            </a:endParaRPr>
+          </a:p>
+          <a:p>
+            <a:r>
+              <a:rPr lang="en-US" sz="2000" dirty="0" smtClean="0">
+                <a:solidFill>
+                  <a:schemeClr val="bg1"/>
+                </a:solidFill>
+              </a:rPr>
+              <a:t>Uses a counter to set parity bit (0 or 1)</a:t>
+            </a:r>
+          </a:p>
+          <a:p>
+            <a:r>
+              <a:rPr lang="en-US" sz="2000" dirty="0" smtClean="0">
+                <a:solidFill>
+                  <a:schemeClr val="bg1"/>
+                </a:solidFill>
+              </a:rPr>
+              <a:t>Nodes drop a packet if parity bit does not match a counter.</a:t>
+            </a:r>
+            <a:endParaRPr lang="en-US" sz="1600" dirty="0">
+              <a:solidFill>
+                <a:schemeClr val="bg1"/>
+              </a:solidFill>
+            </a:endParaRPr>
+          </a:p>
           <a:p>
             <a:pPr marL="0" indent="0">
               <a:buNone/>
@@ -8642,82 +9359,12 @@
               </a:solidFill>
             </a:endParaRPr>
           </a:p>
-          <a:p>
-            <a:r>
-              <a:rPr lang="en-US" sz="2000" dirty="0">
-                <a:solidFill>
-                  <a:schemeClr val="bg1"/>
-                </a:solidFill>
-              </a:rPr>
-              <a:t>Best to hop when</a:t>
-            </a:r>
-          </a:p>
-          <a:p>
-            <a:pPr lvl="1"/>
-            <a:r>
-              <a:rPr lang="en-US" sz="1600" dirty="0">
-                <a:solidFill>
-                  <a:schemeClr val="bg1"/>
-                </a:solidFill>
-              </a:rPr>
-              <a:t>Out of range</a:t>
-            </a:r>
-          </a:p>
-          <a:p>
-            <a:pPr lvl="1"/>
-            <a:r>
-              <a:rPr lang="en-US" sz="1600" dirty="0">
-                <a:solidFill>
-                  <a:schemeClr val="bg1"/>
-                </a:solidFill>
-              </a:rPr>
-              <a:t>RSSI -40</a:t>
-            </a:r>
-          </a:p>
-          <a:p>
-            <a:pPr lvl="1"/>
-            <a:r>
-              <a:rPr lang="en-US" sz="1600" dirty="0">
-                <a:solidFill>
-                  <a:schemeClr val="bg1"/>
-                </a:solidFill>
-              </a:rPr>
-              <a:t>Deep fading</a:t>
-            </a:r>
-          </a:p>
-          <a:p>
-            <a:endParaRPr lang="en-US" sz="2000" dirty="0">
-              <a:solidFill>
-                <a:schemeClr val="bg1"/>
-              </a:solidFill>
-            </a:endParaRPr>
-          </a:p>
-          <a:p>
-            <a:r>
-              <a:rPr lang="en-US" sz="2000" dirty="0">
-                <a:solidFill>
-                  <a:schemeClr val="bg1"/>
-                </a:solidFill>
-              </a:rPr>
-              <a:t>The antenna is expensive battery wise.</a:t>
-            </a:r>
-          </a:p>
-          <a:p>
-            <a:pPr marL="0" indent="0">
-              <a:buNone/>
-            </a:pPr>
-            <a:endParaRPr lang="en-US" sz="2000" dirty="0">
-              <a:solidFill>
-                <a:schemeClr val="bg1"/>
-              </a:solidFill>
-            </a:endParaRPr>
-          </a:p>
         </p:txBody>
       </p:sp>
     </p:spTree>
     <p:extLst>
       <p:ext uri="{BB962C8B-B14F-4D97-AF65-F5344CB8AC3E}">
-        <p14:creationId xmlns:p14="http://schemas.microsoft.com/office/powerpoint/2010/main" val="1801400649"/>
+        <p14:creationId xmlns:p14="http://schemas.microsoft.com/office/powerpoint/2010/main" val="3032888191"/>
       </p:ext>
     </p:extLst>
   </p:cSld>

</xml_diff>

<commit_message>
Updated Range Equation PowerPoint!
</commit_message>
<xml_diff>
--- a/Hop or not to hop.pptx
+++ b/Hop or not to hop.pptx
@@ -276,7 +276,7 @@
           <a:p>
             <a:fld id="{C78CF14D-041E-46DD-BB74-A67E5581063B}" type="datetimeFigureOut">
               <a:rPr lang="aa-ET" smtClean="0"/>
-              <a:t>05/02/2018</a:t>
+              <a:t>05/03/2018</a:t>
             </a:fld>
             <a:endParaRPr lang="aa-ET"/>
           </a:p>
@@ -476,7 +476,7 @@
           <a:p>
             <a:fld id="{C78CF14D-041E-46DD-BB74-A67E5581063B}" type="datetimeFigureOut">
               <a:rPr lang="aa-ET" smtClean="0"/>
-              <a:t>05/02/2018</a:t>
+              <a:t>05/03/2018</a:t>
             </a:fld>
             <a:endParaRPr lang="aa-ET"/>
           </a:p>
@@ -686,7 +686,7 @@
           <a:p>
             <a:fld id="{C78CF14D-041E-46DD-BB74-A67E5581063B}" type="datetimeFigureOut">
               <a:rPr lang="aa-ET" smtClean="0"/>
-              <a:t>05/02/2018</a:t>
+              <a:t>05/03/2018</a:t>
             </a:fld>
             <a:endParaRPr lang="aa-ET"/>
           </a:p>
@@ -886,7 +886,7 @@
           <a:p>
             <a:fld id="{C78CF14D-041E-46DD-BB74-A67E5581063B}" type="datetimeFigureOut">
               <a:rPr lang="aa-ET" smtClean="0"/>
-              <a:t>05/02/2018</a:t>
+              <a:t>05/03/2018</a:t>
             </a:fld>
             <a:endParaRPr lang="aa-ET"/>
           </a:p>
@@ -1162,7 +1162,7 @@
           <a:p>
             <a:fld id="{C78CF14D-041E-46DD-BB74-A67E5581063B}" type="datetimeFigureOut">
               <a:rPr lang="aa-ET" smtClean="0"/>
-              <a:t>05/02/2018</a:t>
+              <a:t>05/03/2018</a:t>
             </a:fld>
             <a:endParaRPr lang="aa-ET"/>
           </a:p>
@@ -1430,7 +1430,7 @@
           <a:p>
             <a:fld id="{C78CF14D-041E-46DD-BB74-A67E5581063B}" type="datetimeFigureOut">
               <a:rPr lang="aa-ET" smtClean="0"/>
-              <a:t>05/02/2018</a:t>
+              <a:t>05/03/2018</a:t>
             </a:fld>
             <a:endParaRPr lang="aa-ET"/>
           </a:p>
@@ -1845,7 +1845,7 @@
           <a:p>
             <a:fld id="{C78CF14D-041E-46DD-BB74-A67E5581063B}" type="datetimeFigureOut">
               <a:rPr lang="aa-ET" smtClean="0"/>
-              <a:t>05/02/2018</a:t>
+              <a:t>05/03/2018</a:t>
             </a:fld>
             <a:endParaRPr lang="aa-ET"/>
           </a:p>
@@ -1987,7 +1987,7 @@
           <a:p>
             <a:fld id="{C78CF14D-041E-46DD-BB74-A67E5581063B}" type="datetimeFigureOut">
               <a:rPr lang="aa-ET" smtClean="0"/>
-              <a:t>05/02/2018</a:t>
+              <a:t>05/03/2018</a:t>
             </a:fld>
             <a:endParaRPr lang="aa-ET"/>
           </a:p>
@@ -2100,7 +2100,7 @@
           <a:p>
             <a:fld id="{C78CF14D-041E-46DD-BB74-A67E5581063B}" type="datetimeFigureOut">
               <a:rPr lang="aa-ET" smtClean="0"/>
-              <a:t>05/02/2018</a:t>
+              <a:t>05/03/2018</a:t>
             </a:fld>
             <a:endParaRPr lang="aa-ET"/>
           </a:p>
@@ -2413,7 +2413,7 @@
           <a:p>
             <a:fld id="{C78CF14D-041E-46DD-BB74-A67E5581063B}" type="datetimeFigureOut">
               <a:rPr lang="aa-ET" smtClean="0"/>
-              <a:t>05/02/2018</a:t>
+              <a:t>05/03/2018</a:t>
             </a:fld>
             <a:endParaRPr lang="aa-ET"/>
           </a:p>
@@ -2702,7 +2702,7 @@
           <a:p>
             <a:fld id="{C78CF14D-041E-46DD-BB74-A67E5581063B}" type="datetimeFigureOut">
               <a:rPr lang="aa-ET" smtClean="0"/>
-              <a:t>05/02/2018</a:t>
+              <a:t>05/03/2018</a:t>
             </a:fld>
             <a:endParaRPr lang="aa-ET"/>
           </a:p>
@@ -2945,7 +2945,7 @@
           <a:p>
             <a:fld id="{C78CF14D-041E-46DD-BB74-A67E5581063B}" type="datetimeFigureOut">
               <a:rPr lang="aa-ET" smtClean="0"/>
-              <a:t>05/02/2018</a:t>
+              <a:t>05/03/2018</a:t>
             </a:fld>
             <a:endParaRPr lang="aa-ET"/>
           </a:p>
@@ -4936,14 +4936,16 @@
       </p:sp>
       <p:pic>
         <p:nvPicPr>
-          <p:cNvPr id="8" name="Picture 7">
-            <a:extLst>
-              <a:ext uri="{FF2B5EF4-FFF2-40B4-BE49-F238E27FC236}">
-                <a16:creationId xmlns:a16="http://schemas.microsoft.com/office/drawing/2014/main" id="{E7BD49E1-7905-4BCB-B9CF-B6B8080DF5E0}"/>
-              </a:ext>
-            </a:extLst>
-          </p:cNvPr>
-          <p:cNvPicPr/>
+          <p:cNvPr id="3" name="Picture 2">
+            <a:extLst>
+              <a:ext uri="{FF2B5EF4-FFF2-40B4-BE49-F238E27FC236}">
+                <a16:creationId xmlns:a16="http://schemas.microsoft.com/office/drawing/2014/main" id="{E51D3144-9326-4B4B-B740-D2CCF944C846}"/>
+              </a:ext>
+            </a:extLst>
+          </p:cNvPr>
+          <p:cNvPicPr>
+            <a:picLocks noChangeAspect="1"/>
+          </p:cNvPicPr>
           <p:nvPr/>
         </p:nvPicPr>
         <p:blipFill>
@@ -4954,8 +4956,8 @@
         </p:blipFill>
         <p:spPr>
           <a:xfrm>
-            <a:off x="6349474" y="4611782"/>
-            <a:ext cx="4619625" cy="1657350"/>
+            <a:off x="6151087" y="4271322"/>
+            <a:ext cx="4743450" cy="2295525"/>
           </a:xfrm>
           <a:prstGeom prst="rect">
             <a:avLst/>

</xml_diff>